<commit_message>
hhhh Signed-off-by: YooSeongHyun <wtnghw@naver.com>
</commit_message>
<xml_diff>
--- a/flow.pptx
+++ b/flow.pptx
@@ -11,6 +11,7 @@
     <p:sldId id="259" r:id="rId5"/>
     <p:sldId id="260" r:id="rId6"/>
     <p:sldId id="261" r:id="rId7"/>
+    <p:sldId id="262" r:id="rId8"/>
   </p:sldIdLst>
   <p:sldSz cx="12192000" cy="6858000"/>
   <p:notesSz cx="6858000" cy="9144000"/>
@@ -111,7 +112,7 @@
   </p:defaultTextStyle>
   <p:extLst>
     <p:ext uri="{EFAFB233-063F-42B5-8137-9DF3F51BA10A}">
-      <p15:sldGuideLst xmlns:p15="http://schemas.microsoft.com/office/powerpoint/2012/main"/>
+      <p15:sldGuideLst xmlns="" xmlns:p15="http://schemas.microsoft.com/office/powerpoint/2012/main"/>
     </p:ext>
   </p:extLst>
 </p:presentation>
@@ -120,11 +121,7 @@
 <file path=ppt/commentAuthors.xml><?xml version="1.0" encoding="utf-8"?>
 <p:cmAuthorLst xmlns:a="http://schemas.openxmlformats.org/drawingml/2006/main" xmlns:r="http://schemas.openxmlformats.org/officeDocument/2006/relationships" xmlns:p="http://schemas.openxmlformats.org/presentationml/2006/main">
   <p:cmAuthor id="1" name="Hyun" initials="H" lastIdx="3" clrIdx="0">
-    <p:extLst>
-      <p:ext uri="{19B8F6BF-5375-455C-9EA6-DF929625EA0E}">
-        <p15:presenceInfo xmlns:p15="http://schemas.microsoft.com/office/powerpoint/2012/main" userId="Hyun" providerId="None"/>
-      </p:ext>
-    </p:extLst>
+    <p:extLst/>
   </p:cmAuthor>
 </p:cmAuthorLst>
 </file>
@@ -260,7 +257,7 @@
           <a:p>
             <a:fld id="{1B541D74-F2E1-4D1F-86F4-0EB70622BA76}" type="datetimeFigureOut">
               <a:rPr lang="ko-KR" altLang="en-US" smtClean="0"/>
-              <a:t>2015-09-24</a:t>
+              <a:t>2015-09-30</a:t>
             </a:fld>
             <a:endParaRPr lang="ko-KR" altLang="en-US"/>
           </a:p>
@@ -430,7 +427,7 @@
           <a:p>
             <a:fld id="{1B541D74-F2E1-4D1F-86F4-0EB70622BA76}" type="datetimeFigureOut">
               <a:rPr lang="ko-KR" altLang="en-US" smtClean="0"/>
-              <a:t>2015-09-24</a:t>
+              <a:t>2015-09-30</a:t>
             </a:fld>
             <a:endParaRPr lang="ko-KR" altLang="en-US"/>
           </a:p>
@@ -610,7 +607,7 @@
           <a:p>
             <a:fld id="{1B541D74-F2E1-4D1F-86F4-0EB70622BA76}" type="datetimeFigureOut">
               <a:rPr lang="ko-KR" altLang="en-US" smtClean="0"/>
-              <a:t>2015-09-24</a:t>
+              <a:t>2015-09-30</a:t>
             </a:fld>
             <a:endParaRPr lang="ko-KR" altLang="en-US"/>
           </a:p>
@@ -780,7 +777,7 @@
           <a:p>
             <a:fld id="{1B541D74-F2E1-4D1F-86F4-0EB70622BA76}" type="datetimeFigureOut">
               <a:rPr lang="ko-KR" altLang="en-US" smtClean="0"/>
-              <a:t>2015-09-24</a:t>
+              <a:t>2015-09-30</a:t>
             </a:fld>
             <a:endParaRPr lang="ko-KR" altLang="en-US"/>
           </a:p>
@@ -1026,7 +1023,7 @@
           <a:p>
             <a:fld id="{1B541D74-F2E1-4D1F-86F4-0EB70622BA76}" type="datetimeFigureOut">
               <a:rPr lang="ko-KR" altLang="en-US" smtClean="0"/>
-              <a:t>2015-09-24</a:t>
+              <a:t>2015-09-30</a:t>
             </a:fld>
             <a:endParaRPr lang="ko-KR" altLang="en-US"/>
           </a:p>
@@ -1258,7 +1255,7 @@
           <a:p>
             <a:fld id="{1B541D74-F2E1-4D1F-86F4-0EB70622BA76}" type="datetimeFigureOut">
               <a:rPr lang="ko-KR" altLang="en-US" smtClean="0"/>
-              <a:t>2015-09-24</a:t>
+              <a:t>2015-09-30</a:t>
             </a:fld>
             <a:endParaRPr lang="ko-KR" altLang="en-US"/>
           </a:p>
@@ -1625,7 +1622,7 @@
           <a:p>
             <a:fld id="{1B541D74-F2E1-4D1F-86F4-0EB70622BA76}" type="datetimeFigureOut">
               <a:rPr lang="ko-KR" altLang="en-US" smtClean="0"/>
-              <a:t>2015-09-24</a:t>
+              <a:t>2015-09-30</a:t>
             </a:fld>
             <a:endParaRPr lang="ko-KR" altLang="en-US"/>
           </a:p>
@@ -1743,7 +1740,7 @@
           <a:p>
             <a:fld id="{1B541D74-F2E1-4D1F-86F4-0EB70622BA76}" type="datetimeFigureOut">
               <a:rPr lang="ko-KR" altLang="en-US" smtClean="0"/>
-              <a:t>2015-09-24</a:t>
+              <a:t>2015-09-30</a:t>
             </a:fld>
             <a:endParaRPr lang="ko-KR" altLang="en-US"/>
           </a:p>
@@ -1838,7 +1835,7 @@
           <a:p>
             <a:fld id="{1B541D74-F2E1-4D1F-86F4-0EB70622BA76}" type="datetimeFigureOut">
               <a:rPr lang="ko-KR" altLang="en-US" smtClean="0"/>
-              <a:t>2015-09-24</a:t>
+              <a:t>2015-09-30</a:t>
             </a:fld>
             <a:endParaRPr lang="ko-KR" altLang="en-US"/>
           </a:p>
@@ -2115,7 +2112,7 @@
           <a:p>
             <a:fld id="{1B541D74-F2E1-4D1F-86F4-0EB70622BA76}" type="datetimeFigureOut">
               <a:rPr lang="ko-KR" altLang="en-US" smtClean="0"/>
-              <a:t>2015-09-24</a:t>
+              <a:t>2015-09-30</a:t>
             </a:fld>
             <a:endParaRPr lang="ko-KR" altLang="en-US"/>
           </a:p>
@@ -2368,7 +2365,7 @@
           <a:p>
             <a:fld id="{1B541D74-F2E1-4D1F-86F4-0EB70622BA76}" type="datetimeFigureOut">
               <a:rPr lang="ko-KR" altLang="en-US" smtClean="0"/>
-              <a:t>2015-09-24</a:t>
+              <a:t>2015-09-30</a:t>
             </a:fld>
             <a:endParaRPr lang="ko-KR" altLang="en-US"/>
           </a:p>
@@ -2581,7 +2578,7 @@
           <a:p>
             <a:fld id="{1B541D74-F2E1-4D1F-86F4-0EB70622BA76}" type="datetimeFigureOut">
               <a:rPr lang="ko-KR" altLang="en-US" smtClean="0"/>
-              <a:t>2015-09-24</a:t>
+              <a:t>2015-09-30</a:t>
             </a:fld>
             <a:endParaRPr lang="ko-KR" altLang="en-US"/>
           </a:p>
@@ -3917,11 +3914,6 @@
                 </a:rPr>
                 <a:t>B</a:t>
               </a:r>
-              <a:endParaRPr lang="en-US" altLang="ko-KR" dirty="0" smtClean="0">
-                <a:solidFill>
-                  <a:schemeClr val="tx1"/>
-                </a:solidFill>
-              </a:endParaRPr>
             </a:p>
             <a:p>
               <a:pPr algn="ctr"/>
@@ -3986,11 +3978,6 @@
                 </a:rPr>
                 <a:t>B</a:t>
               </a:r>
-              <a:endParaRPr lang="en-US" altLang="ko-KR" dirty="0" smtClean="0">
-                <a:solidFill>
-                  <a:schemeClr val="tx1"/>
-                </a:solidFill>
-              </a:endParaRPr>
             </a:p>
             <a:p>
               <a:pPr algn="ctr"/>
@@ -8967,7 +8954,7 @@
         </p:nvCxnSpPr>
         <p:spPr>
           <a:xfrm flipH="1">
-            <a:off x="106954" y="2051828"/>
+            <a:off x="-820780" y="-965645"/>
             <a:ext cx="1" cy="3133555"/>
           </a:xfrm>
           <a:prstGeom prst="line">
@@ -9066,111 +9053,6 @@
         <p:cxnSp>
           <p:nvCxnSpPr>
             <p:cNvPr id="40" name="직선 연결선 39"/>
-            <p:cNvCxnSpPr/>
-            <p:nvPr/>
-          </p:nvCxnSpPr>
-          <p:spPr>
-            <a:xfrm flipH="1">
-              <a:off x="8831268" y="1219200"/>
-              <a:ext cx="211136" cy="175571"/>
-            </a:xfrm>
-            <a:prstGeom prst="line">
-              <a:avLst/>
-            </a:prstGeom>
-          </p:spPr>
-          <p:style>
-            <a:lnRef idx="1">
-              <a:schemeClr val="accent1"/>
-            </a:lnRef>
-            <a:fillRef idx="0">
-              <a:schemeClr val="accent1"/>
-            </a:fillRef>
-            <a:effectRef idx="0">
-              <a:schemeClr val="accent1"/>
-            </a:effectRef>
-            <a:fontRef idx="minor">
-              <a:schemeClr val="tx1"/>
-            </a:fontRef>
-          </p:style>
-        </p:cxnSp>
-      </p:grpSp>
-      <p:grpSp>
-        <p:nvGrpSpPr>
-          <p:cNvPr id="51" name="그룹 50"/>
-          <p:cNvGrpSpPr/>
-          <p:nvPr/>
-        </p:nvGrpSpPr>
-        <p:grpSpPr>
-          <a:xfrm>
-            <a:off x="8577721" y="425562"/>
-            <a:ext cx="1771675" cy="351142"/>
-            <a:chOff x="7270729" y="1043629"/>
-            <a:chExt cx="1771675" cy="351142"/>
-          </a:xfrm>
-        </p:grpSpPr>
-        <p:cxnSp>
-          <p:nvCxnSpPr>
-            <p:cNvPr id="52" name="직선 연결선 51"/>
-            <p:cNvCxnSpPr/>
-            <p:nvPr/>
-          </p:nvCxnSpPr>
-          <p:spPr>
-            <a:xfrm>
-              <a:off x="7270729" y="1219200"/>
-              <a:ext cx="1771671" cy="0"/>
-            </a:xfrm>
-            <a:prstGeom prst="line">
-              <a:avLst/>
-            </a:prstGeom>
-          </p:spPr>
-          <p:style>
-            <a:lnRef idx="1">
-              <a:schemeClr val="accent1"/>
-            </a:lnRef>
-            <a:fillRef idx="0">
-              <a:schemeClr val="accent1"/>
-            </a:fillRef>
-            <a:effectRef idx="0">
-              <a:schemeClr val="accent1"/>
-            </a:effectRef>
-            <a:fontRef idx="minor">
-              <a:schemeClr val="tx1"/>
-            </a:fontRef>
-          </p:style>
-        </p:cxnSp>
-        <p:cxnSp>
-          <p:nvCxnSpPr>
-            <p:cNvPr id="53" name="직선 연결선 52"/>
-            <p:cNvCxnSpPr/>
-            <p:nvPr/>
-          </p:nvCxnSpPr>
-          <p:spPr>
-            <a:xfrm>
-              <a:off x="8873066" y="1043629"/>
-              <a:ext cx="169334" cy="175571"/>
-            </a:xfrm>
-            <a:prstGeom prst="line">
-              <a:avLst/>
-            </a:prstGeom>
-          </p:spPr>
-          <p:style>
-            <a:lnRef idx="1">
-              <a:schemeClr val="accent1"/>
-            </a:lnRef>
-            <a:fillRef idx="0">
-              <a:schemeClr val="accent1"/>
-            </a:fillRef>
-            <a:effectRef idx="0">
-              <a:schemeClr val="accent1"/>
-            </a:effectRef>
-            <a:fontRef idx="minor">
-              <a:schemeClr val="tx1"/>
-            </a:fontRef>
-          </p:style>
-        </p:cxnSp>
-        <p:cxnSp>
-          <p:nvCxnSpPr>
-            <p:cNvPr id="54" name="직선 연결선 53"/>
             <p:cNvCxnSpPr/>
             <p:nvPr/>
           </p:nvCxnSpPr>
@@ -9298,20 +9180,205 @@
           </a:p>
         </p:txBody>
       </p:sp>
+      <p:sp>
+        <p:nvSpPr>
+          <p:cNvPr id="122" name="직사각형 121"/>
+          <p:cNvSpPr/>
+          <p:nvPr/>
+        </p:nvSpPr>
+        <p:spPr>
+          <a:xfrm>
+            <a:off x="7634860" y="180029"/>
+            <a:ext cx="1839586" cy="632772"/>
+          </a:xfrm>
+          <a:prstGeom prst="rect">
+            <a:avLst/>
+          </a:prstGeom>
+          <a:noFill/>
+        </p:spPr>
+        <p:style>
+          <a:lnRef idx="2">
+            <a:schemeClr val="accent1">
+              <a:shade val="50000"/>
+            </a:schemeClr>
+          </a:lnRef>
+          <a:fillRef idx="1">
+            <a:schemeClr val="accent1"/>
+          </a:fillRef>
+          <a:effectRef idx="0">
+            <a:schemeClr val="accent1"/>
+          </a:effectRef>
+          <a:fontRef idx="minor">
+            <a:schemeClr val="lt1"/>
+          </a:fontRef>
+        </p:style>
+        <p:txBody>
+          <a:bodyPr rtlCol="0" anchor="ctr"/>
+          <a:lstStyle/>
+          <a:p>
+            <a:pPr algn="ctr"/>
+            <a:r>
+              <a:rPr lang="en-US" altLang="ko-KR" dirty="0" smtClean="0">
+                <a:solidFill>
+                  <a:schemeClr val="tx1"/>
+                </a:solidFill>
+              </a:rPr>
+              <a:t>S</a:t>
+            </a:r>
+          </a:p>
+          <a:p>
+            <a:pPr algn="ctr"/>
+            <a:r>
+              <a:rPr lang="en-US" altLang="ko-KR" dirty="0" smtClean="0">
+                <a:solidFill>
+                  <a:schemeClr val="tx1"/>
+                </a:solidFill>
+              </a:rPr>
+              <a:t>[ </a:t>
+            </a:r>
+            <a:r>
+              <a:rPr lang="en-US" altLang="ko-KR" dirty="0">
+                <a:solidFill>
+                  <a:schemeClr val="tx1"/>
+                </a:solidFill>
+              </a:rPr>
+              <a:t>S</a:t>
+            </a:r>
+            <a:r>
+              <a:rPr lang="en-US" altLang="ko-KR" dirty="0" smtClean="0">
+                <a:solidFill>
+                  <a:schemeClr val="tx1"/>
+                </a:solidFill>
+              </a:rPr>
+              <a:t>&amp;C Socket ]</a:t>
+            </a:r>
+            <a:endParaRPr lang="ko-KR" altLang="en-US" dirty="0">
+              <a:solidFill>
+                <a:schemeClr val="tx1"/>
+              </a:solidFill>
+            </a:endParaRPr>
+          </a:p>
+        </p:txBody>
+      </p:sp>
       <p:grpSp>
         <p:nvGrpSpPr>
-          <p:cNvPr id="29" name="그룹 28"/>
+          <p:cNvPr id="220" name="그룹 219"/>
           <p:cNvGrpSpPr/>
           <p:nvPr/>
         </p:nvGrpSpPr>
         <p:grpSpPr>
           <a:xfrm>
-            <a:off x="458849" y="1786022"/>
-            <a:ext cx="10811678" cy="5071978"/>
-            <a:chOff x="458849" y="1786022"/>
-            <a:chExt cx="10811678" cy="5071978"/>
+            <a:off x="85368" y="1918718"/>
+            <a:ext cx="13108412" cy="6006082"/>
+            <a:chOff x="85368" y="1918718"/>
+            <a:chExt cx="13108412" cy="6006082"/>
           </a:xfrm>
         </p:grpSpPr>
+        <p:grpSp>
+          <p:nvGrpSpPr>
+            <p:cNvPr id="51" name="그룹 50"/>
+            <p:cNvGrpSpPr/>
+            <p:nvPr/>
+          </p:nvGrpSpPr>
+          <p:grpSpPr>
+            <a:xfrm>
+              <a:off x="8025239" y="7305991"/>
+              <a:ext cx="4700712" cy="351142"/>
+              <a:chOff x="4341692" y="1043629"/>
+              <a:chExt cx="4700712" cy="351142"/>
+            </a:xfrm>
+          </p:grpSpPr>
+          <p:cxnSp>
+            <p:nvCxnSpPr>
+              <p:cNvPr id="52" name="직선 연결선 51"/>
+              <p:cNvCxnSpPr/>
+              <p:nvPr/>
+            </p:nvCxnSpPr>
+            <p:spPr>
+              <a:xfrm>
+                <a:off x="4341692" y="1219200"/>
+                <a:ext cx="4700708" cy="0"/>
+              </a:xfrm>
+              <a:prstGeom prst="line">
+                <a:avLst/>
+              </a:prstGeom>
+            </p:spPr>
+            <p:style>
+              <a:lnRef idx="1">
+                <a:schemeClr val="accent1"/>
+              </a:lnRef>
+              <a:fillRef idx="0">
+                <a:schemeClr val="accent1"/>
+              </a:fillRef>
+              <a:effectRef idx="0">
+                <a:schemeClr val="accent1"/>
+              </a:effectRef>
+              <a:fontRef idx="minor">
+                <a:schemeClr val="tx1"/>
+              </a:fontRef>
+            </p:style>
+          </p:cxnSp>
+          <p:cxnSp>
+            <p:nvCxnSpPr>
+              <p:cNvPr id="53" name="직선 연결선 52"/>
+              <p:cNvCxnSpPr/>
+              <p:nvPr/>
+            </p:nvCxnSpPr>
+            <p:spPr>
+              <a:xfrm>
+                <a:off x="8873066" y="1043629"/>
+                <a:ext cx="169334" cy="175571"/>
+              </a:xfrm>
+              <a:prstGeom prst="line">
+                <a:avLst/>
+              </a:prstGeom>
+            </p:spPr>
+            <p:style>
+              <a:lnRef idx="1">
+                <a:schemeClr val="accent1"/>
+              </a:lnRef>
+              <a:fillRef idx="0">
+                <a:schemeClr val="accent1"/>
+              </a:fillRef>
+              <a:effectRef idx="0">
+                <a:schemeClr val="accent1"/>
+              </a:effectRef>
+              <a:fontRef idx="minor">
+                <a:schemeClr val="tx1"/>
+              </a:fontRef>
+            </p:style>
+          </p:cxnSp>
+          <p:cxnSp>
+            <p:nvCxnSpPr>
+              <p:cNvPr id="54" name="직선 연결선 53"/>
+              <p:cNvCxnSpPr/>
+              <p:nvPr/>
+            </p:nvCxnSpPr>
+            <p:spPr>
+              <a:xfrm flipH="1">
+                <a:off x="8831268" y="1219200"/>
+                <a:ext cx="211136" cy="175571"/>
+              </a:xfrm>
+              <a:prstGeom prst="line">
+                <a:avLst/>
+              </a:prstGeom>
+            </p:spPr>
+            <p:style>
+              <a:lnRef idx="1">
+                <a:schemeClr val="accent1"/>
+              </a:lnRef>
+              <a:fillRef idx="0">
+                <a:schemeClr val="accent1"/>
+              </a:fillRef>
+              <a:effectRef idx="0">
+                <a:schemeClr val="accent1"/>
+              </a:effectRef>
+              <a:fontRef idx="minor">
+                <a:schemeClr val="tx1"/>
+              </a:fontRef>
+            </p:style>
+          </p:cxnSp>
+        </p:grpSp>
         <p:sp>
           <p:nvSpPr>
             <p:cNvPr id="9" name="직사각형 8"/>
@@ -9320,8 +9387,8 @@
           </p:nvSpPr>
           <p:spPr>
             <a:xfrm>
-              <a:off x="6008088" y="1808973"/>
-              <a:ext cx="1245133" cy="632772"/>
+              <a:off x="4498848" y="1926335"/>
+              <a:ext cx="986533" cy="515410"/>
             </a:xfrm>
             <a:prstGeom prst="rect">
               <a:avLst/>
@@ -9350,29 +9417,13 @@
             <a:p>
               <a:pPr algn="ctr"/>
               <a:r>
-                <a:rPr lang="en-US" altLang="ko-KR" dirty="0" smtClean="0">
+                <a:rPr lang="en-US" altLang="ko-KR" sz="1400" dirty="0" smtClean="0">
                   <a:solidFill>
                     <a:schemeClr val="tx1"/>
                   </a:solidFill>
                 </a:rPr>
                 <a:t>A </a:t>
               </a:r>
-            </a:p>
-            <a:p>
-              <a:pPr algn="ctr"/>
-              <a:r>
-                <a:rPr lang="en-US" altLang="ko-KR" dirty="0" smtClean="0">
-                  <a:solidFill>
-                    <a:schemeClr val="tx1"/>
-                  </a:solidFill>
-                </a:rPr>
-                <a:t>[ CURD ]</a:t>
-              </a:r>
-              <a:endParaRPr lang="ko-KR" altLang="en-US" dirty="0">
-                <a:solidFill>
-                  <a:schemeClr val="tx1"/>
-                </a:solidFill>
-              </a:endParaRPr>
             </a:p>
           </p:txBody>
         </p:sp>
@@ -9384,8 +9435,8 @@
           </p:nvSpPr>
           <p:spPr>
             <a:xfrm>
-              <a:off x="458849" y="1808973"/>
-              <a:ext cx="1245133" cy="632772"/>
+              <a:off x="85368" y="1926335"/>
+              <a:ext cx="923669" cy="515409"/>
             </a:xfrm>
             <a:prstGeom prst="rect">
               <a:avLst/>
@@ -9414,7 +9465,7 @@
             <a:p>
               <a:pPr algn="ctr"/>
               <a:r>
-                <a:rPr lang="en-US" altLang="ko-KR" dirty="0" smtClean="0">
+                <a:rPr lang="en-US" altLang="ko-KR" sz="1400" dirty="0" smtClean="0">
                   <a:solidFill>
                     <a:schemeClr val="tx1"/>
                   </a:solidFill>
@@ -9425,14 +9476,14 @@
             <a:p>
               <a:pPr algn="ctr"/>
               <a:r>
-                <a:rPr lang="en-US" altLang="ko-KR" dirty="0" smtClean="0">
+                <a:rPr lang="en-US" altLang="ko-KR" sz="1400" dirty="0" smtClean="0">
                   <a:solidFill>
                     <a:schemeClr val="tx1"/>
                   </a:solidFill>
                 </a:rPr>
                 <a:t>[ Client ]</a:t>
               </a:r>
-              <a:endParaRPr lang="ko-KR" altLang="en-US" dirty="0">
+              <a:endParaRPr lang="ko-KR" altLang="en-US" sz="1400" dirty="0">
                 <a:solidFill>
                   <a:schemeClr val="tx1"/>
                 </a:solidFill>
@@ -9448,8 +9499,8 @@
           </p:nvSpPr>
           <p:spPr>
             <a:xfrm>
-              <a:off x="1990782" y="1808973"/>
-              <a:ext cx="1721853" cy="632772"/>
+              <a:off x="1267968" y="1926335"/>
+              <a:ext cx="1371771" cy="515410"/>
             </a:xfrm>
             <a:prstGeom prst="rect">
               <a:avLst/>
@@ -9478,7 +9529,7 @@
             <a:p>
               <a:pPr algn="ctr"/>
               <a:r>
-                <a:rPr lang="en-US" altLang="ko-KR" dirty="0" smtClean="0">
+                <a:rPr lang="en-US" altLang="ko-KR" sz="1400" dirty="0" smtClean="0">
                   <a:solidFill>
                     <a:schemeClr val="tx1"/>
                   </a:solidFill>
@@ -9489,14 +9540,14 @@
             <a:p>
               <a:pPr algn="ctr"/>
               <a:r>
-                <a:rPr lang="en-US" altLang="ko-KR" dirty="0" smtClean="0">
+                <a:rPr lang="en-US" altLang="ko-KR" sz="1400" dirty="0" smtClean="0">
                   <a:solidFill>
                     <a:schemeClr val="tx1"/>
                   </a:solidFill>
                 </a:rPr>
                 <a:t>[ B&amp;C Socket ]</a:t>
               </a:r>
-              <a:endParaRPr lang="ko-KR" altLang="en-US" dirty="0">
+              <a:endParaRPr lang="ko-KR" altLang="en-US" sz="1400" dirty="0">
                 <a:solidFill>
                   <a:schemeClr val="tx1"/>
                 </a:solidFill>
@@ -9512,8 +9563,8 @@
           </p:nvSpPr>
           <p:spPr>
             <a:xfrm>
-              <a:off x="3999435" y="1808973"/>
-              <a:ext cx="1721853" cy="632772"/>
+              <a:off x="2909726" y="1926335"/>
+              <a:ext cx="1348521" cy="515410"/>
             </a:xfrm>
             <a:prstGeom prst="rect">
               <a:avLst/>
@@ -9542,7 +9593,7 @@
             <a:p>
               <a:pPr algn="ctr"/>
               <a:r>
-                <a:rPr lang="en-US" altLang="ko-KR" dirty="0" smtClean="0">
+                <a:rPr lang="en-US" altLang="ko-KR" sz="1400" dirty="0" smtClean="0">
                   <a:solidFill>
                     <a:schemeClr val="tx1"/>
                   </a:solidFill>
@@ -9553,14 +9604,14 @@
             <a:p>
               <a:pPr algn="ctr"/>
               <a:r>
-                <a:rPr lang="en-US" altLang="ko-KR" dirty="0" smtClean="0">
+                <a:rPr lang="en-US" altLang="ko-KR" sz="1400" dirty="0" smtClean="0">
                   <a:solidFill>
                     <a:schemeClr val="tx1"/>
                   </a:solidFill>
                 </a:rPr>
                 <a:t>[ A&amp;B Socket ]</a:t>
               </a:r>
-              <a:endParaRPr lang="ko-KR" altLang="en-US" dirty="0">
+              <a:endParaRPr lang="ko-KR" altLang="en-US" sz="1400" dirty="0">
                 <a:solidFill>
                   <a:schemeClr val="tx1"/>
                 </a:solidFill>
@@ -9576,8 +9627,8 @@
           </p:nvCxnSpPr>
           <p:spPr>
             <a:xfrm flipH="1">
-              <a:off x="1099732" y="2432834"/>
-              <a:ext cx="1" cy="4425166"/>
+              <a:off x="551094" y="2432834"/>
+              <a:ext cx="1" cy="5375852"/>
             </a:xfrm>
             <a:prstGeom prst="line">
               <a:avLst/>
@@ -9606,8 +9657,8 @@
           </p:nvCxnSpPr>
           <p:spPr>
             <a:xfrm flipH="1">
-              <a:off x="2851710" y="2441745"/>
-              <a:ext cx="1" cy="4416255"/>
+              <a:off x="1937312" y="2441745"/>
+              <a:ext cx="1" cy="5483055"/>
             </a:xfrm>
             <a:prstGeom prst="line">
               <a:avLst/>
@@ -9636,8 +9687,8 @@
           </p:nvCxnSpPr>
           <p:spPr>
             <a:xfrm flipH="1">
-              <a:off x="4860364" y="2432833"/>
-              <a:ext cx="1" cy="4425167"/>
+              <a:off x="3580206" y="2432833"/>
+              <a:ext cx="1" cy="5491967"/>
             </a:xfrm>
             <a:prstGeom prst="line">
               <a:avLst/>
@@ -9666,8 +9717,8 @@
           </p:nvCxnSpPr>
           <p:spPr>
             <a:xfrm flipH="1">
-              <a:off x="6630657" y="2441745"/>
-              <a:ext cx="1" cy="4416255"/>
+              <a:off x="4996931" y="2441745"/>
+              <a:ext cx="1" cy="5366941"/>
             </a:xfrm>
             <a:prstGeom prst="line">
               <a:avLst/>
@@ -9696,10 +9747,10 @@
           </p:nvGrpSpPr>
           <p:grpSpPr>
             <a:xfrm>
-              <a:off x="1081415" y="2633364"/>
-              <a:ext cx="1771675" cy="351142"/>
-              <a:chOff x="7270729" y="1043629"/>
-              <a:chExt cx="1771675" cy="351142"/>
+              <a:off x="547202" y="2633364"/>
+              <a:ext cx="1379296" cy="351142"/>
+              <a:chOff x="7663108" y="1043629"/>
+              <a:chExt cx="1379296" cy="351142"/>
             </a:xfrm>
           </p:grpSpPr>
           <p:cxnSp>
@@ -9710,8 +9761,8 @@
             </p:nvCxnSpPr>
             <p:spPr>
               <a:xfrm>
-                <a:off x="7270729" y="1219200"/>
-                <a:ext cx="1771671" cy="0"/>
+                <a:off x="7663108" y="1219200"/>
+                <a:ext cx="1379292" cy="0"/>
               </a:xfrm>
               <a:prstGeom prst="line">
                 <a:avLst/>
@@ -9801,10 +9852,10 @@
           </p:nvGrpSpPr>
           <p:grpSpPr>
             <a:xfrm>
-              <a:off x="2851708" y="2714682"/>
-              <a:ext cx="2003475" cy="351142"/>
-              <a:chOff x="7038929" y="1043629"/>
-              <a:chExt cx="2003475" cy="351142"/>
+              <a:off x="1937311" y="2714682"/>
+              <a:ext cx="1637712" cy="351142"/>
+              <a:chOff x="7404692" y="1043629"/>
+              <a:chExt cx="1637712" cy="351142"/>
             </a:xfrm>
           </p:grpSpPr>
           <p:cxnSp>
@@ -9815,8 +9866,8 @@
             </p:nvCxnSpPr>
             <p:spPr>
               <a:xfrm>
-                <a:off x="7038929" y="1219200"/>
-                <a:ext cx="2003471" cy="0"/>
+                <a:off x="7404692" y="1219200"/>
+                <a:ext cx="1637708" cy="0"/>
               </a:xfrm>
               <a:prstGeom prst="line">
                 <a:avLst/>
@@ -9906,8 +9957,8 @@
           </p:nvGrpSpPr>
           <p:grpSpPr>
             <a:xfrm>
-              <a:off x="4856472" y="2844690"/>
-              <a:ext cx="1771675" cy="351142"/>
+              <a:off x="3583986" y="2848779"/>
+              <a:ext cx="1409616" cy="351142"/>
               <a:chOff x="7270729" y="1043629"/>
               <a:chExt cx="1771675" cy="351142"/>
             </a:xfrm>
@@ -10011,10 +10062,10 @@
           </p:nvGrpSpPr>
           <p:grpSpPr>
             <a:xfrm rot="10800000">
-              <a:off x="4864932" y="3392895"/>
-              <a:ext cx="1772964" cy="351142"/>
-              <a:chOff x="7269440" y="1043629"/>
-              <a:chExt cx="1772964" cy="351142"/>
+              <a:off x="3596964" y="3283167"/>
+              <a:ext cx="1399966" cy="351142"/>
+              <a:chOff x="7642438" y="1043629"/>
+              <a:chExt cx="1399966" cy="351142"/>
             </a:xfrm>
           </p:grpSpPr>
           <p:cxnSp>
@@ -10025,8 +10076,8 @@
             </p:nvCxnSpPr>
             <p:spPr>
               <a:xfrm rot="10800000" flipH="1">
-                <a:off x="7269440" y="1219200"/>
-                <a:ext cx="1772960" cy="0"/>
+                <a:off x="7642438" y="1219200"/>
+                <a:ext cx="1399962" cy="0"/>
               </a:xfrm>
               <a:prstGeom prst="line">
                 <a:avLst/>
@@ -10116,10 +10167,10 @@
           </p:nvGrpSpPr>
           <p:grpSpPr>
             <a:xfrm rot="10800000">
-              <a:off x="2851708" y="3579839"/>
-              <a:ext cx="2003470" cy="351142"/>
-              <a:chOff x="7038934" y="1043629"/>
-              <a:chExt cx="2003470" cy="351142"/>
+              <a:off x="1937308" y="3409151"/>
+              <a:ext cx="1646678" cy="351142"/>
+              <a:chOff x="7395726" y="1043629"/>
+              <a:chExt cx="1646678" cy="351142"/>
             </a:xfrm>
           </p:grpSpPr>
           <p:cxnSp>
@@ -10129,9 +10180,9 @@
               <p:nvPr/>
             </p:nvCxnSpPr>
             <p:spPr>
-              <a:xfrm rot="10800000" flipH="1">
-                <a:off x="7038934" y="1219200"/>
-                <a:ext cx="2003465" cy="0"/>
+              <a:xfrm rot="10800000" flipH="1" flipV="1">
+                <a:off x="7395726" y="1219199"/>
+                <a:ext cx="1646672" cy="1"/>
               </a:xfrm>
               <a:prstGeom prst="line">
                 <a:avLst/>
@@ -10221,10 +10272,10 @@
           </p:nvGrpSpPr>
           <p:grpSpPr>
             <a:xfrm rot="10800000">
-              <a:off x="1118046" y="3718651"/>
-              <a:ext cx="1733661" cy="351142"/>
-              <a:chOff x="7308743" y="1043629"/>
-              <a:chExt cx="1733661" cy="351142"/>
+              <a:off x="557214" y="3560155"/>
+              <a:ext cx="1384447" cy="351142"/>
+              <a:chOff x="7657957" y="1043629"/>
+              <a:chExt cx="1384447" cy="351142"/>
             </a:xfrm>
           </p:grpSpPr>
           <p:cxnSp>
@@ -10235,8 +10286,8 @@
             </p:nvCxnSpPr>
             <p:spPr>
               <a:xfrm rot="10800000" flipH="1">
-                <a:off x="7308743" y="1219200"/>
-                <a:ext cx="1733655" cy="0"/>
+                <a:off x="7657957" y="1219200"/>
+                <a:ext cx="1384440" cy="0"/>
               </a:xfrm>
               <a:prstGeom prst="line">
                 <a:avLst/>
@@ -10326,8 +10377,8 @@
           </p:nvSpPr>
           <p:spPr>
             <a:xfrm>
-              <a:off x="1029160" y="2501461"/>
-              <a:ext cx="1766638" cy="307777"/>
+              <a:off x="476448" y="2501461"/>
+              <a:ext cx="1433405" cy="261610"/>
             </a:xfrm>
             <a:prstGeom prst="rect">
               <a:avLst/>
@@ -10342,10 +10393,10 @@
             <a:p>
               <a:pPr algn="ctr"/>
               <a:r>
-                <a:rPr lang="en-US" altLang="ko-KR" sz="1400" dirty="0" smtClean="0"/>
+                <a:rPr lang="en-US" altLang="ko-KR" sz="1100" dirty="0" smtClean="0"/>
                 <a:t>request Chat Room</a:t>
               </a:r>
-              <a:endParaRPr lang="ko-KR" altLang="en-US" sz="1400" dirty="0"/>
+              <a:endParaRPr lang="ko-KR" altLang="en-US" sz="1100" dirty="0"/>
             </a:p>
           </p:txBody>
         </p:sp>
@@ -10357,10 +10408,10 @@
           </p:nvGrpSpPr>
           <p:grpSpPr>
             <a:xfrm>
-              <a:off x="1118046" y="4153013"/>
-              <a:ext cx="1731592" cy="351142"/>
-              <a:chOff x="7310812" y="1043629"/>
-              <a:chExt cx="1731592" cy="351142"/>
+              <a:off x="557221" y="3829336"/>
+              <a:ext cx="7454560" cy="351142"/>
+              <a:chOff x="1587844" y="1043629"/>
+              <a:chExt cx="7454560" cy="351142"/>
             </a:xfrm>
           </p:grpSpPr>
           <p:cxnSp>
@@ -10370,9 +10421,9 @@
               <p:nvPr/>
             </p:nvCxnSpPr>
             <p:spPr>
-              <a:xfrm>
-                <a:off x="7310812" y="1219200"/>
-                <a:ext cx="1731588" cy="0"/>
+              <a:xfrm flipV="1">
+                <a:off x="1587844" y="1219200"/>
+                <a:ext cx="7454556" cy="4459"/>
               </a:xfrm>
               <a:prstGeom prst="line">
                 <a:avLst/>
@@ -10462,10 +10513,10 @@
           </p:nvGrpSpPr>
           <p:grpSpPr>
             <a:xfrm>
-              <a:off x="2860473" y="4278780"/>
-              <a:ext cx="2003475" cy="351142"/>
-              <a:chOff x="7038929" y="1043629"/>
-              <a:chExt cx="2003475" cy="351142"/>
+              <a:off x="547208" y="5389723"/>
+              <a:ext cx="1394453" cy="351142"/>
+              <a:chOff x="7647951" y="1043629"/>
+              <a:chExt cx="1394453" cy="351142"/>
             </a:xfrm>
           </p:grpSpPr>
           <p:cxnSp>
@@ -10476,8 +10527,8 @@
             </p:nvCxnSpPr>
             <p:spPr>
               <a:xfrm>
-                <a:off x="7038929" y="1219200"/>
-                <a:ext cx="2003471" cy="0"/>
+                <a:off x="7647951" y="1219200"/>
+                <a:ext cx="1394449" cy="0"/>
               </a:xfrm>
               <a:prstGeom prst="line">
                 <a:avLst/>
@@ -10559,381 +10610,6 @@
             </p:style>
           </p:cxnSp>
         </p:grpSp>
-        <p:grpSp>
-          <p:nvGrpSpPr>
-            <p:cNvPr id="90" name="그룹 89"/>
-            <p:cNvGrpSpPr/>
-            <p:nvPr/>
-          </p:nvGrpSpPr>
-          <p:grpSpPr>
-            <a:xfrm>
-              <a:off x="4856468" y="4405561"/>
-              <a:ext cx="1771675" cy="351142"/>
-              <a:chOff x="7270729" y="1043629"/>
-              <a:chExt cx="1771675" cy="351142"/>
-            </a:xfrm>
-          </p:grpSpPr>
-          <p:cxnSp>
-            <p:nvCxnSpPr>
-              <p:cNvPr id="91" name="직선 연결선 90"/>
-              <p:cNvCxnSpPr/>
-              <p:nvPr/>
-            </p:nvCxnSpPr>
-            <p:spPr>
-              <a:xfrm>
-                <a:off x="7270729" y="1219200"/>
-                <a:ext cx="1771671" cy="0"/>
-              </a:xfrm>
-              <a:prstGeom prst="line">
-                <a:avLst/>
-              </a:prstGeom>
-            </p:spPr>
-            <p:style>
-              <a:lnRef idx="1">
-                <a:schemeClr val="accent1"/>
-              </a:lnRef>
-              <a:fillRef idx="0">
-                <a:schemeClr val="accent1"/>
-              </a:fillRef>
-              <a:effectRef idx="0">
-                <a:schemeClr val="accent1"/>
-              </a:effectRef>
-              <a:fontRef idx="minor">
-                <a:schemeClr val="tx1"/>
-              </a:fontRef>
-            </p:style>
-          </p:cxnSp>
-          <p:cxnSp>
-            <p:nvCxnSpPr>
-              <p:cNvPr id="92" name="직선 연결선 91"/>
-              <p:cNvCxnSpPr/>
-              <p:nvPr/>
-            </p:nvCxnSpPr>
-            <p:spPr>
-              <a:xfrm>
-                <a:off x="8873066" y="1043629"/>
-                <a:ext cx="169334" cy="175571"/>
-              </a:xfrm>
-              <a:prstGeom prst="line">
-                <a:avLst/>
-              </a:prstGeom>
-            </p:spPr>
-            <p:style>
-              <a:lnRef idx="1">
-                <a:schemeClr val="accent1"/>
-              </a:lnRef>
-              <a:fillRef idx="0">
-                <a:schemeClr val="accent1"/>
-              </a:fillRef>
-              <a:effectRef idx="0">
-                <a:schemeClr val="accent1"/>
-              </a:effectRef>
-              <a:fontRef idx="minor">
-                <a:schemeClr val="tx1"/>
-              </a:fontRef>
-            </p:style>
-          </p:cxnSp>
-          <p:cxnSp>
-            <p:nvCxnSpPr>
-              <p:cNvPr id="93" name="직선 연결선 92"/>
-              <p:cNvCxnSpPr/>
-              <p:nvPr/>
-            </p:nvCxnSpPr>
-            <p:spPr>
-              <a:xfrm flipH="1">
-                <a:off x="8831268" y="1219200"/>
-                <a:ext cx="211136" cy="175571"/>
-              </a:xfrm>
-              <a:prstGeom prst="line">
-                <a:avLst/>
-              </a:prstGeom>
-            </p:spPr>
-            <p:style>
-              <a:lnRef idx="1">
-                <a:schemeClr val="accent1"/>
-              </a:lnRef>
-              <a:fillRef idx="0">
-                <a:schemeClr val="accent1"/>
-              </a:fillRef>
-              <a:effectRef idx="0">
-                <a:schemeClr val="accent1"/>
-              </a:effectRef>
-              <a:fontRef idx="minor">
-                <a:schemeClr val="tx1"/>
-              </a:fontRef>
-            </p:style>
-          </p:cxnSp>
-        </p:grpSp>
-        <p:grpSp>
-          <p:nvGrpSpPr>
-            <p:cNvPr id="94" name="그룹 93"/>
-            <p:cNvGrpSpPr/>
-            <p:nvPr/>
-          </p:nvGrpSpPr>
-          <p:grpSpPr>
-            <a:xfrm>
-              <a:off x="6637377" y="3145032"/>
-              <a:ext cx="435112" cy="472792"/>
-              <a:chOff x="8876043" y="4277448"/>
-              <a:chExt cx="435112" cy="472792"/>
-            </a:xfrm>
-          </p:grpSpPr>
-          <p:cxnSp>
-            <p:nvCxnSpPr>
-              <p:cNvPr id="95" name="직선 연결선 94"/>
-              <p:cNvCxnSpPr/>
-              <p:nvPr/>
-            </p:nvCxnSpPr>
-            <p:spPr>
-              <a:xfrm flipH="1">
-                <a:off x="8876047" y="4574669"/>
-                <a:ext cx="435108" cy="0"/>
-              </a:xfrm>
-              <a:prstGeom prst="line">
-                <a:avLst/>
-              </a:prstGeom>
-            </p:spPr>
-            <p:style>
-              <a:lnRef idx="1">
-                <a:schemeClr val="accent1"/>
-              </a:lnRef>
-              <a:fillRef idx="0">
-                <a:schemeClr val="accent1"/>
-              </a:fillRef>
-              <a:effectRef idx="0">
-                <a:schemeClr val="accent1"/>
-              </a:effectRef>
-              <a:fontRef idx="minor">
-                <a:schemeClr val="tx1"/>
-              </a:fontRef>
-            </p:style>
-          </p:cxnSp>
-          <p:cxnSp>
-            <p:nvCxnSpPr>
-              <p:cNvPr id="96" name="직선 연결선 95"/>
-              <p:cNvCxnSpPr/>
-              <p:nvPr/>
-            </p:nvCxnSpPr>
-            <p:spPr>
-              <a:xfrm rot="10800000">
-                <a:off x="8876047" y="4574669"/>
-                <a:ext cx="169334" cy="175571"/>
-              </a:xfrm>
-              <a:prstGeom prst="line">
-                <a:avLst/>
-              </a:prstGeom>
-            </p:spPr>
-            <p:style>
-              <a:lnRef idx="1">
-                <a:schemeClr val="accent1"/>
-              </a:lnRef>
-              <a:fillRef idx="0">
-                <a:schemeClr val="accent1"/>
-              </a:fillRef>
-              <a:effectRef idx="0">
-                <a:schemeClr val="accent1"/>
-              </a:effectRef>
-              <a:fontRef idx="minor">
-                <a:schemeClr val="tx1"/>
-              </a:fontRef>
-            </p:style>
-          </p:cxnSp>
-          <p:cxnSp>
-            <p:nvCxnSpPr>
-              <p:cNvPr id="97" name="직선 연결선 96"/>
-              <p:cNvCxnSpPr/>
-              <p:nvPr/>
-            </p:nvCxnSpPr>
-            <p:spPr>
-              <a:xfrm rot="10800000" flipH="1">
-                <a:off x="8876043" y="4399098"/>
-                <a:ext cx="211136" cy="175571"/>
-              </a:xfrm>
-              <a:prstGeom prst="line">
-                <a:avLst/>
-              </a:prstGeom>
-            </p:spPr>
-            <p:style>
-              <a:lnRef idx="1">
-                <a:schemeClr val="accent1"/>
-              </a:lnRef>
-              <a:fillRef idx="0">
-                <a:schemeClr val="accent1"/>
-              </a:fillRef>
-              <a:effectRef idx="0">
-                <a:schemeClr val="accent1"/>
-              </a:effectRef>
-              <a:fontRef idx="minor">
-                <a:schemeClr val="tx1"/>
-              </a:fontRef>
-            </p:style>
-          </p:cxnSp>
-          <p:cxnSp>
-            <p:nvCxnSpPr>
-              <p:cNvPr id="98" name="직선 연결선 97"/>
-              <p:cNvCxnSpPr/>
-              <p:nvPr/>
-            </p:nvCxnSpPr>
-            <p:spPr>
-              <a:xfrm>
-                <a:off x="8876043" y="4277448"/>
-                <a:ext cx="435112" cy="0"/>
-              </a:xfrm>
-              <a:prstGeom prst="line">
-                <a:avLst/>
-              </a:prstGeom>
-            </p:spPr>
-            <p:style>
-              <a:lnRef idx="1">
-                <a:schemeClr val="accent1"/>
-              </a:lnRef>
-              <a:fillRef idx="0">
-                <a:schemeClr val="accent1"/>
-              </a:fillRef>
-              <a:effectRef idx="0">
-                <a:schemeClr val="accent1"/>
-              </a:effectRef>
-              <a:fontRef idx="minor">
-                <a:schemeClr val="tx1"/>
-              </a:fontRef>
-            </p:style>
-          </p:cxnSp>
-          <p:cxnSp>
-            <p:nvCxnSpPr>
-              <p:cNvPr id="99" name="직선 연결선 98"/>
-              <p:cNvCxnSpPr/>
-              <p:nvPr/>
-            </p:nvCxnSpPr>
-            <p:spPr>
-              <a:xfrm>
-                <a:off x="9311155" y="4277448"/>
-                <a:ext cx="0" cy="284749"/>
-              </a:xfrm>
-              <a:prstGeom prst="line">
-                <a:avLst/>
-              </a:prstGeom>
-            </p:spPr>
-            <p:style>
-              <a:lnRef idx="1">
-                <a:schemeClr val="accent1"/>
-              </a:lnRef>
-              <a:fillRef idx="0">
-                <a:schemeClr val="accent1"/>
-              </a:fillRef>
-              <a:effectRef idx="0">
-                <a:schemeClr val="accent1"/>
-              </a:effectRef>
-              <a:fontRef idx="minor">
-                <a:schemeClr val="tx1"/>
-              </a:fontRef>
-            </p:style>
-          </p:cxnSp>
-        </p:grpSp>
-        <p:grpSp>
-          <p:nvGrpSpPr>
-            <p:cNvPr id="101" name="그룹 100"/>
-            <p:cNvGrpSpPr/>
-            <p:nvPr/>
-          </p:nvGrpSpPr>
-          <p:grpSpPr>
-            <a:xfrm rot="10800000">
-              <a:off x="4855179" y="4922026"/>
-              <a:ext cx="1772964" cy="351142"/>
-              <a:chOff x="7269440" y="1043629"/>
-              <a:chExt cx="1772964" cy="351142"/>
-            </a:xfrm>
-          </p:grpSpPr>
-          <p:cxnSp>
-            <p:nvCxnSpPr>
-              <p:cNvPr id="102" name="직선 연결선 101"/>
-              <p:cNvCxnSpPr/>
-              <p:nvPr/>
-            </p:nvCxnSpPr>
-            <p:spPr>
-              <a:xfrm rot="10800000" flipH="1">
-                <a:off x="7269440" y="1219200"/>
-                <a:ext cx="1772960" cy="0"/>
-              </a:xfrm>
-              <a:prstGeom prst="line">
-                <a:avLst/>
-              </a:prstGeom>
-            </p:spPr>
-            <p:style>
-              <a:lnRef idx="1">
-                <a:schemeClr val="accent1"/>
-              </a:lnRef>
-              <a:fillRef idx="0">
-                <a:schemeClr val="accent1"/>
-              </a:fillRef>
-              <a:effectRef idx="0">
-                <a:schemeClr val="accent1"/>
-              </a:effectRef>
-              <a:fontRef idx="minor">
-                <a:schemeClr val="tx1"/>
-              </a:fontRef>
-            </p:style>
-          </p:cxnSp>
-          <p:cxnSp>
-            <p:nvCxnSpPr>
-              <p:cNvPr id="103" name="직선 연결선 102"/>
-              <p:cNvCxnSpPr/>
-              <p:nvPr/>
-            </p:nvCxnSpPr>
-            <p:spPr>
-              <a:xfrm>
-                <a:off x="8873066" y="1043629"/>
-                <a:ext cx="169334" cy="175571"/>
-              </a:xfrm>
-              <a:prstGeom prst="line">
-                <a:avLst/>
-              </a:prstGeom>
-            </p:spPr>
-            <p:style>
-              <a:lnRef idx="1">
-                <a:schemeClr val="accent1"/>
-              </a:lnRef>
-              <a:fillRef idx="0">
-                <a:schemeClr val="accent1"/>
-              </a:fillRef>
-              <a:effectRef idx="0">
-                <a:schemeClr val="accent1"/>
-              </a:effectRef>
-              <a:fontRef idx="minor">
-                <a:schemeClr val="tx1"/>
-              </a:fontRef>
-            </p:style>
-          </p:cxnSp>
-          <p:cxnSp>
-            <p:nvCxnSpPr>
-              <p:cNvPr id="104" name="직선 연결선 103"/>
-              <p:cNvCxnSpPr/>
-              <p:nvPr/>
-            </p:nvCxnSpPr>
-            <p:spPr>
-              <a:xfrm flipH="1">
-                <a:off x="8831268" y="1219200"/>
-                <a:ext cx="211136" cy="175571"/>
-              </a:xfrm>
-              <a:prstGeom prst="line">
-                <a:avLst/>
-              </a:prstGeom>
-            </p:spPr>
-            <p:style>
-              <a:lnRef idx="1">
-                <a:schemeClr val="accent1"/>
-              </a:lnRef>
-              <a:fillRef idx="0">
-                <a:schemeClr val="accent1"/>
-              </a:fillRef>
-              <a:effectRef idx="0">
-                <a:schemeClr val="accent1"/>
-              </a:effectRef>
-              <a:fontRef idx="minor">
-                <a:schemeClr val="tx1"/>
-              </a:fontRef>
-            </p:style>
-          </p:cxnSp>
-        </p:grpSp>
         <p:sp>
           <p:nvSpPr>
             <p:cNvPr id="115" name="직사각형 114"/>
@@ -10942,8 +10618,8 @@
           </p:nvSpPr>
           <p:spPr>
             <a:xfrm>
-              <a:off x="7540021" y="1786022"/>
-              <a:ext cx="1721853" cy="632772"/>
+              <a:off x="8948928" y="1926335"/>
+              <a:ext cx="1485373" cy="492458"/>
             </a:xfrm>
             <a:prstGeom prst="rect">
               <a:avLst/>
@@ -10972,7 +10648,7 @@
             <a:p>
               <a:pPr algn="ctr"/>
               <a:r>
-                <a:rPr lang="en-US" altLang="ko-KR" dirty="0" smtClean="0">
+                <a:rPr lang="en-US" altLang="ko-KR" sz="1400" dirty="0" smtClean="0">
                   <a:solidFill>
                     <a:schemeClr val="tx1"/>
                   </a:solidFill>
@@ -10983,14 +10659,14 @@
             <a:p>
               <a:pPr algn="ctr"/>
               <a:r>
-                <a:rPr lang="en-US" altLang="ko-KR" dirty="0" smtClean="0">
+                <a:rPr lang="en-US" altLang="ko-KR" sz="1400" dirty="0" smtClean="0">
                   <a:solidFill>
                     <a:schemeClr val="tx1"/>
                   </a:solidFill>
                 </a:rPr>
                 <a:t>[ A&amp;B Socket ]</a:t>
               </a:r>
-              <a:endParaRPr lang="ko-KR" altLang="en-US" dirty="0">
+              <a:endParaRPr lang="ko-KR" altLang="en-US" sz="1400" dirty="0">
                 <a:solidFill>
                   <a:schemeClr val="tx1"/>
                 </a:solidFill>
@@ -11006,8 +10682,8 @@
           </p:nvSpPr>
           <p:spPr>
             <a:xfrm>
-              <a:off x="9548674" y="1788477"/>
-              <a:ext cx="1721853" cy="632772"/>
+              <a:off x="10668000" y="1926335"/>
+              <a:ext cx="1372618" cy="494914"/>
             </a:xfrm>
             <a:prstGeom prst="rect">
               <a:avLst/>
@@ -11036,7 +10712,7 @@
             <a:p>
               <a:pPr algn="ctr"/>
               <a:r>
-                <a:rPr lang="en-US" altLang="ko-KR" dirty="0" smtClean="0">
+                <a:rPr lang="en-US" altLang="ko-KR" sz="1400" dirty="0" smtClean="0">
                   <a:solidFill>
                     <a:schemeClr val="tx1"/>
                   </a:solidFill>
@@ -11047,14 +10723,14 @@
             <a:p>
               <a:pPr algn="ctr"/>
               <a:r>
-                <a:rPr lang="en-US" altLang="ko-KR" dirty="0" smtClean="0">
+                <a:rPr lang="en-US" altLang="ko-KR" sz="1400" dirty="0" smtClean="0">
                   <a:solidFill>
                     <a:schemeClr val="tx1"/>
                   </a:solidFill>
                 </a:rPr>
                 <a:t>[ B&amp;C Socket ]</a:t>
               </a:r>
-              <a:endParaRPr lang="ko-KR" altLang="en-US" dirty="0">
+              <a:endParaRPr lang="ko-KR" altLang="en-US" sz="1400" dirty="0">
                 <a:solidFill>
                   <a:schemeClr val="tx1"/>
                 </a:solidFill>
@@ -11070,8 +10746,8 @@
           </p:nvCxnSpPr>
           <p:spPr>
             <a:xfrm flipH="1">
-              <a:off x="8467457" y="2420690"/>
-              <a:ext cx="1" cy="4437310"/>
+              <a:off x="9639886" y="2420690"/>
+              <a:ext cx="1" cy="5387996"/>
             </a:xfrm>
             <a:prstGeom prst="line">
               <a:avLst/>
@@ -11100,8 +10776,8 @@
           </p:nvCxnSpPr>
           <p:spPr>
             <a:xfrm flipH="1">
-              <a:off x="10438222" y="2437288"/>
-              <a:ext cx="1" cy="4420712"/>
+              <a:off x="11354620" y="2437288"/>
+              <a:ext cx="1" cy="5371398"/>
             </a:xfrm>
             <a:prstGeom prst="line">
               <a:avLst/>
@@ -11130,8 +10806,8 @@
           </p:nvSpPr>
           <p:spPr>
             <a:xfrm>
-              <a:off x="7066509" y="3024350"/>
-              <a:ext cx="1119024" cy="523220"/>
+              <a:off x="5450961" y="4532346"/>
+              <a:ext cx="925253" cy="430887"/>
             </a:xfrm>
             <a:prstGeom prst="rect">
               <a:avLst/>
@@ -11145,13 +10821,13 @@
             <a:lstStyle/>
             <a:p>
               <a:r>
-                <a:rPr lang="en-US" altLang="ko-KR" sz="1400" dirty="0" smtClean="0"/>
+                <a:rPr lang="en-US" altLang="ko-KR" sz="1100" dirty="0" smtClean="0"/>
                 <a:t>INSERT DB </a:t>
               </a:r>
             </a:p>
             <a:p>
               <a:r>
-                <a:rPr lang="en-US" altLang="ko-KR" sz="1400" dirty="0" smtClean="0"/>
+                <a:rPr lang="en-US" altLang="ko-KR" sz="1100" dirty="0" smtClean="0"/>
                 <a:t>Chat Room</a:t>
               </a:r>
             </a:p>
@@ -11165,8 +10841,8 @@
           </p:nvSpPr>
           <p:spPr>
             <a:xfrm>
-              <a:off x="5218630" y="3276365"/>
-              <a:ext cx="1292021" cy="307777"/>
+              <a:off x="3592805" y="3191021"/>
+              <a:ext cx="1398140" cy="261610"/>
             </a:xfrm>
             <a:prstGeom prst="rect">
               <a:avLst/>
@@ -11181,10 +10857,10 @@
             <a:p>
               <a:pPr algn="ctr"/>
               <a:r>
-                <a:rPr lang="en-US" altLang="ko-KR" sz="1400" dirty="0" smtClean="0"/>
-                <a:t>Return result </a:t>
+                <a:rPr lang="en-US" altLang="ko-KR" sz="1100" dirty="0" smtClean="0"/>
+                <a:t>Return S Node’s IP</a:t>
               </a:r>
-              <a:endParaRPr lang="ko-KR" altLang="en-US" sz="1400" dirty="0"/>
+              <a:endParaRPr lang="ko-KR" altLang="en-US" sz="1100" dirty="0"/>
             </a:p>
           </p:txBody>
         </p:sp>
@@ -11196,8 +10872,8 @@
           </p:nvSpPr>
           <p:spPr>
             <a:xfrm>
-              <a:off x="1321190" y="3403892"/>
-              <a:ext cx="1593706" cy="523220"/>
+              <a:off x="516767" y="3306356"/>
+              <a:ext cx="1398140" cy="261610"/>
             </a:xfrm>
             <a:prstGeom prst="rect">
               <a:avLst/>
@@ -11212,17 +10888,10 @@
             <a:p>
               <a:pPr algn="ctr"/>
               <a:r>
-                <a:rPr lang="en-US" altLang="ko-KR" sz="1400" dirty="0" smtClean="0"/>
-                <a:t>Return result</a:t>
+                <a:rPr lang="en-US" altLang="ko-KR" sz="1100" dirty="0" smtClean="0"/>
+                <a:t>Return S Node’s IP</a:t>
               </a:r>
-            </a:p>
-            <a:p>
-              <a:pPr algn="ctr"/>
-              <a:r>
-                <a:rPr lang="en-US" altLang="ko-KR" sz="1400" dirty="0" smtClean="0"/>
-                <a:t>Make chat room </a:t>
-              </a:r>
-              <a:endParaRPr lang="ko-KR" altLang="en-US" sz="1400" dirty="0"/>
+              <a:endParaRPr lang="ko-KR" altLang="en-US" sz="1100" dirty="0"/>
             </a:p>
           </p:txBody>
         </p:sp>
@@ -11234,8 +10903,8 @@
           </p:nvSpPr>
           <p:spPr>
             <a:xfrm>
-              <a:off x="1094734" y="4307398"/>
-              <a:ext cx="1712456" cy="307777"/>
+              <a:off x="489407" y="5282758"/>
+              <a:ext cx="1386918" cy="261610"/>
             </a:xfrm>
             <a:prstGeom prst="rect">
               <a:avLst/>
@@ -11250,10 +10919,10 @@
             <a:p>
               <a:pPr algn="ctr"/>
               <a:r>
-                <a:rPr lang="en-US" altLang="ko-KR" sz="1400" dirty="0" smtClean="0"/>
+                <a:rPr lang="en-US" altLang="ko-KR" sz="1100" dirty="0" smtClean="0"/>
                 <a:t>Invite login friends</a:t>
               </a:r>
-              <a:endParaRPr lang="ko-KR" altLang="en-US" sz="1400" dirty="0"/>
+              <a:endParaRPr lang="ko-KR" altLang="en-US" sz="1100" dirty="0"/>
             </a:p>
           </p:txBody>
         </p:sp>
@@ -11265,7 +10934,7 @@
           </p:nvGrpSpPr>
           <p:grpSpPr>
             <a:xfrm>
-              <a:off x="6637385" y="4687100"/>
+              <a:off x="5015849" y="4626140"/>
               <a:ext cx="435112" cy="472792"/>
               <a:chOff x="8876043" y="4277448"/>
               <a:chExt cx="435112" cy="472792"/>
@@ -11279,7 +10948,7 @@
             </p:nvCxnSpPr>
             <p:spPr>
               <a:xfrm flipH="1">
-                <a:off x="8876047" y="4574669"/>
+                <a:off x="8876047" y="4562477"/>
                 <a:ext cx="435108" cy="0"/>
               </a:xfrm>
               <a:prstGeom prst="line">
@@ -11339,7 +11008,7 @@
             </p:nvCxnSpPr>
             <p:spPr>
               <a:xfrm rot="10800000" flipH="1">
-                <a:off x="8876043" y="4399098"/>
+                <a:off x="8876043" y="4386906"/>
                 <a:ext cx="211136" cy="175571"/>
               </a:xfrm>
               <a:prstGeom prst="line">
@@ -11430,8 +11099,8 @@
           </p:nvSpPr>
           <p:spPr>
             <a:xfrm>
-              <a:off x="7048507" y="4583547"/>
-              <a:ext cx="1223605" cy="738664"/>
+              <a:off x="5450961" y="5709292"/>
+              <a:ext cx="1008609" cy="600164"/>
             </a:xfrm>
             <a:prstGeom prst="rect">
               <a:avLst/>
@@ -11445,99 +11114,33 @@
             <a:lstStyle/>
             <a:p>
               <a:r>
-                <a:rPr lang="en-US" altLang="ko-KR" sz="1400" dirty="0" smtClean="0"/>
+                <a:rPr lang="en-US" altLang="ko-KR" sz="1100" dirty="0" smtClean="0"/>
                 <a:t>SELECT DB </a:t>
               </a:r>
             </a:p>
             <a:p>
               <a:r>
-                <a:rPr lang="en-US" altLang="ko-KR" sz="1400" dirty="0" smtClean="0"/>
+                <a:rPr lang="en-US" altLang="ko-KR" sz="1100" dirty="0" smtClean="0"/>
                 <a:t>Friend’s IP</a:t>
               </a:r>
               <a:r>
-                <a:rPr lang="en-US" altLang="ko-KR" sz="1400" dirty="0"/>
+                <a:rPr lang="en-US" altLang="ko-KR" sz="1100" dirty="0"/>
                 <a:t> </a:t>
               </a:r>
               <a:r>
-                <a:rPr lang="en-US" altLang="ko-KR" sz="1400" dirty="0" smtClean="0"/>
+                <a:rPr lang="en-US" altLang="ko-KR" sz="1100" dirty="0" smtClean="0"/>
                 <a:t>&amp;</a:t>
               </a:r>
             </a:p>
             <a:p>
               <a:r>
-                <a:rPr lang="en-US" altLang="ko-KR" sz="1400" dirty="0" err="1" smtClean="0"/>
+                <a:rPr lang="en-US" altLang="ko-KR" sz="1100" dirty="0" err="1" smtClean="0"/>
                 <a:t>B_Node</a:t>
               </a:r>
               <a:r>
-                <a:rPr lang="en-US" altLang="ko-KR" sz="1400" dirty="0" smtClean="0"/>
+                <a:rPr lang="en-US" altLang="ko-KR" sz="1100" dirty="0" smtClean="0"/>
                 <a:t> IP</a:t>
               </a:r>
-            </a:p>
-          </p:txBody>
-        </p:sp>
-        <p:sp>
-          <p:nvSpPr>
-            <p:cNvPr id="130" name="TextBox 129"/>
-            <p:cNvSpPr txBox="1"/>
-            <p:nvPr/>
-          </p:nvSpPr>
-          <p:spPr>
-            <a:xfrm>
-              <a:off x="5237804" y="4533480"/>
-              <a:ext cx="937116" cy="307777"/>
-            </a:xfrm>
-            <a:prstGeom prst="rect">
-              <a:avLst/>
-            </a:prstGeom>
-            <a:noFill/>
-          </p:spPr>
-          <p:txBody>
-            <a:bodyPr wrap="none" rtlCol="0">
-              <a:spAutoFit/>
-            </a:bodyPr>
-            <a:lstStyle/>
-            <a:p>
-              <a:pPr algn="ctr"/>
-              <a:r>
-                <a:rPr lang="en-US" altLang="ko-KR" sz="1400" dirty="0" smtClean="0"/>
-                <a:t>Search </a:t>
-              </a:r>
-              <a:r>
-                <a:rPr lang="en-US" altLang="ko-KR" sz="1400" dirty="0" err="1" smtClean="0"/>
-                <a:t>ip</a:t>
-              </a:r>
-              <a:endParaRPr lang="ko-KR" altLang="en-US" sz="1400" dirty="0"/>
-            </a:p>
-          </p:txBody>
-        </p:sp>
-        <p:sp>
-          <p:nvSpPr>
-            <p:cNvPr id="131" name="TextBox 130"/>
-            <p:cNvSpPr txBox="1"/>
-            <p:nvPr/>
-          </p:nvSpPr>
-          <p:spPr>
-            <a:xfrm>
-              <a:off x="5195404" y="5072107"/>
-              <a:ext cx="1292021" cy="307777"/>
-            </a:xfrm>
-            <a:prstGeom prst="rect">
-              <a:avLst/>
-            </a:prstGeom>
-            <a:noFill/>
-          </p:spPr>
-          <p:txBody>
-            <a:bodyPr wrap="none" rtlCol="0">
-              <a:spAutoFit/>
-            </a:bodyPr>
-            <a:lstStyle/>
-            <a:p>
-              <a:pPr algn="ctr"/>
-              <a:r>
-                <a:rPr lang="en-US" altLang="ko-KR" sz="1400" dirty="0" smtClean="0"/>
-                <a:t>Return result </a:t>
-              </a:r>
-              <a:endParaRPr lang="ko-KR" altLang="en-US" sz="1400" dirty="0"/>
             </a:p>
           </p:txBody>
         </p:sp>
@@ -11549,10 +11152,10 @@
           </p:nvGrpSpPr>
           <p:grpSpPr>
             <a:xfrm rot="10800000">
-              <a:off x="2852134" y="5102873"/>
-              <a:ext cx="2003470" cy="351142"/>
-              <a:chOff x="7038934" y="1043629"/>
-              <a:chExt cx="2003470" cy="351142"/>
+              <a:off x="547202" y="4890127"/>
+              <a:ext cx="7478029" cy="351142"/>
+              <a:chOff x="1564375" y="1043629"/>
+              <a:chExt cx="7478029" cy="351142"/>
             </a:xfrm>
           </p:grpSpPr>
           <p:cxnSp>
@@ -11563,8 +11166,8 @@
             </p:nvCxnSpPr>
             <p:spPr>
               <a:xfrm rot="10800000" flipH="1">
-                <a:off x="7038934" y="1219200"/>
-                <a:ext cx="2003465" cy="0"/>
+                <a:off x="1564375" y="1219200"/>
+                <a:ext cx="7478023" cy="0"/>
               </a:xfrm>
               <a:prstGeom prst="line">
                 <a:avLst/>
@@ -11648,121 +11251,16 @@
         </p:grpSp>
         <p:grpSp>
           <p:nvGrpSpPr>
-            <p:cNvPr id="144" name="그룹 143"/>
-            <p:cNvGrpSpPr/>
-            <p:nvPr/>
-          </p:nvGrpSpPr>
-          <p:grpSpPr>
-            <a:xfrm>
-              <a:off x="2860473" y="5384580"/>
-              <a:ext cx="5606795" cy="351142"/>
-              <a:chOff x="3435609" y="1043629"/>
-              <a:chExt cx="5606795" cy="351142"/>
-            </a:xfrm>
-          </p:grpSpPr>
-          <p:cxnSp>
-            <p:nvCxnSpPr>
-              <p:cNvPr id="145" name="직선 연결선 144"/>
-              <p:cNvCxnSpPr/>
-              <p:nvPr/>
-            </p:nvCxnSpPr>
-            <p:spPr>
-              <a:xfrm>
-                <a:off x="3435609" y="1219200"/>
-                <a:ext cx="5606791" cy="0"/>
-              </a:xfrm>
-              <a:prstGeom prst="line">
-                <a:avLst/>
-              </a:prstGeom>
-            </p:spPr>
-            <p:style>
-              <a:lnRef idx="1">
-                <a:schemeClr val="accent1"/>
-              </a:lnRef>
-              <a:fillRef idx="0">
-                <a:schemeClr val="accent1"/>
-              </a:fillRef>
-              <a:effectRef idx="0">
-                <a:schemeClr val="accent1"/>
-              </a:effectRef>
-              <a:fontRef idx="minor">
-                <a:schemeClr val="tx1"/>
-              </a:fontRef>
-            </p:style>
-          </p:cxnSp>
-          <p:cxnSp>
-            <p:nvCxnSpPr>
-              <p:cNvPr id="146" name="직선 연결선 145"/>
-              <p:cNvCxnSpPr/>
-              <p:nvPr/>
-            </p:nvCxnSpPr>
-            <p:spPr>
-              <a:xfrm>
-                <a:off x="8873066" y="1043629"/>
-                <a:ext cx="169334" cy="175571"/>
-              </a:xfrm>
-              <a:prstGeom prst="line">
-                <a:avLst/>
-              </a:prstGeom>
-            </p:spPr>
-            <p:style>
-              <a:lnRef idx="1">
-                <a:schemeClr val="accent1"/>
-              </a:lnRef>
-              <a:fillRef idx="0">
-                <a:schemeClr val="accent1"/>
-              </a:fillRef>
-              <a:effectRef idx="0">
-                <a:schemeClr val="accent1"/>
-              </a:effectRef>
-              <a:fontRef idx="minor">
-                <a:schemeClr val="tx1"/>
-              </a:fontRef>
-            </p:style>
-          </p:cxnSp>
-          <p:cxnSp>
-            <p:nvCxnSpPr>
-              <p:cNvPr id="147" name="직선 연결선 146"/>
-              <p:cNvCxnSpPr/>
-              <p:nvPr/>
-            </p:nvCxnSpPr>
-            <p:spPr>
-              <a:xfrm flipH="1">
-                <a:off x="8831268" y="1219200"/>
-                <a:ext cx="211136" cy="175571"/>
-              </a:xfrm>
-              <a:prstGeom prst="line">
-                <a:avLst/>
-              </a:prstGeom>
-            </p:spPr>
-            <p:style>
-              <a:lnRef idx="1">
-                <a:schemeClr val="accent1"/>
-              </a:lnRef>
-              <a:fillRef idx="0">
-                <a:schemeClr val="accent1"/>
-              </a:fillRef>
-              <a:effectRef idx="0">
-                <a:schemeClr val="accent1"/>
-              </a:effectRef>
-              <a:fontRef idx="minor">
-                <a:schemeClr val="tx1"/>
-              </a:fontRef>
-            </p:style>
-          </p:cxnSp>
-        </p:grpSp>
-        <p:grpSp>
-          <p:nvGrpSpPr>
             <p:cNvPr id="148" name="그룹 147"/>
             <p:cNvGrpSpPr/>
             <p:nvPr/>
           </p:nvGrpSpPr>
           <p:grpSpPr>
             <a:xfrm>
-              <a:off x="8467264" y="5497765"/>
-              <a:ext cx="1970957" cy="351142"/>
-              <a:chOff x="7071447" y="1043629"/>
-              <a:chExt cx="1970957" cy="351142"/>
+              <a:off x="9628352" y="6428042"/>
+              <a:ext cx="1711509" cy="351142"/>
+              <a:chOff x="7330895" y="1043629"/>
+              <a:chExt cx="1711509" cy="351142"/>
             </a:xfrm>
           </p:grpSpPr>
           <p:cxnSp>
@@ -11773,8 +11271,8 @@
             </p:nvCxnSpPr>
             <p:spPr>
               <a:xfrm>
-                <a:off x="7071447" y="1219200"/>
-                <a:ext cx="1970953" cy="0"/>
+                <a:off x="7330895" y="1219200"/>
+                <a:ext cx="1711505" cy="0"/>
               </a:xfrm>
               <a:prstGeom prst="line">
                 <a:avLst/>
@@ -11856,75 +11354,6 @@
             </p:style>
           </p:cxnSp>
         </p:grpSp>
-        <p:sp>
-          <p:nvSpPr>
-            <p:cNvPr id="152" name="TextBox 151"/>
-            <p:cNvSpPr txBox="1"/>
-            <p:nvPr/>
-          </p:nvSpPr>
-          <p:spPr>
-            <a:xfrm>
-              <a:off x="4802320" y="5551686"/>
-              <a:ext cx="1863139" cy="307777"/>
-            </a:xfrm>
-            <a:prstGeom prst="rect">
-              <a:avLst/>
-            </a:prstGeom>
-            <a:noFill/>
-          </p:spPr>
-          <p:txBody>
-            <a:bodyPr wrap="none" rtlCol="0">
-              <a:spAutoFit/>
-            </a:bodyPr>
-            <a:lstStyle/>
-            <a:p>
-              <a:pPr algn="ctr"/>
-              <a:r>
-                <a:rPr lang="en-US" altLang="ko-KR" sz="1400" dirty="0" smtClean="0"/>
-                <a:t>Send invite message</a:t>
-              </a:r>
-              <a:endParaRPr lang="ko-KR" altLang="en-US" sz="1400" dirty="0"/>
-            </a:p>
-          </p:txBody>
-        </p:sp>
-        <p:sp>
-          <p:nvSpPr>
-            <p:cNvPr id="153" name="TextBox 152"/>
-            <p:cNvSpPr txBox="1"/>
-            <p:nvPr/>
-          </p:nvSpPr>
-          <p:spPr>
-            <a:xfrm>
-              <a:off x="8562677" y="5652807"/>
-              <a:ext cx="1741181" cy="523220"/>
-            </a:xfrm>
-            <a:prstGeom prst="rect">
-              <a:avLst/>
-            </a:prstGeom>
-            <a:noFill/>
-          </p:spPr>
-          <p:txBody>
-            <a:bodyPr wrap="none" rtlCol="0">
-              <a:spAutoFit/>
-            </a:bodyPr>
-            <a:lstStyle/>
-            <a:p>
-              <a:pPr algn="ctr"/>
-              <a:r>
-                <a:rPr lang="en-US" altLang="ko-KR" sz="1400" dirty="0" smtClean="0"/>
-                <a:t>Make chat room &amp;</a:t>
-              </a:r>
-            </a:p>
-            <a:p>
-              <a:pPr algn="ctr"/>
-              <a:r>
-                <a:rPr lang="en-US" altLang="ko-KR" sz="1400" dirty="0" smtClean="0"/>
-                <a:t>message</a:t>
-              </a:r>
-              <a:endParaRPr lang="ko-KR" altLang="en-US" sz="1400" dirty="0"/>
-            </a:p>
-          </p:txBody>
-        </p:sp>
         <p:grpSp>
           <p:nvGrpSpPr>
             <p:cNvPr id="158" name="그룹 157"/>
@@ -11933,10 +11362,10 @@
           </p:nvGrpSpPr>
           <p:grpSpPr>
             <a:xfrm>
-              <a:off x="1107602" y="5937764"/>
-              <a:ext cx="1731592" cy="351142"/>
-              <a:chOff x="7310812" y="1043629"/>
-              <a:chExt cx="1731592" cy="351142"/>
+              <a:off x="557221" y="7130420"/>
+              <a:ext cx="7449724" cy="351142"/>
+              <a:chOff x="-321677" y="1043629"/>
+              <a:chExt cx="9364081" cy="351142"/>
             </a:xfrm>
           </p:grpSpPr>
           <p:cxnSp>
@@ -11947,8 +11376,8 @@
             </p:nvCxnSpPr>
             <p:spPr>
               <a:xfrm>
-                <a:off x="7310812" y="1219200"/>
-                <a:ext cx="1731588" cy="0"/>
+                <a:off x="-321677" y="1219200"/>
+                <a:ext cx="9364077" cy="0"/>
               </a:xfrm>
               <a:prstGeom prst="line">
                 <a:avLst/>
@@ -12032,121 +11461,16 @@
         </p:grpSp>
         <p:grpSp>
           <p:nvGrpSpPr>
-            <p:cNvPr id="162" name="그룹 161"/>
-            <p:cNvGrpSpPr/>
-            <p:nvPr/>
-          </p:nvGrpSpPr>
-          <p:grpSpPr>
-            <a:xfrm>
-              <a:off x="2860473" y="6162775"/>
-              <a:ext cx="5603311" cy="351142"/>
-              <a:chOff x="3439093" y="1043629"/>
-              <a:chExt cx="5603311" cy="351142"/>
-            </a:xfrm>
-          </p:grpSpPr>
-          <p:cxnSp>
-            <p:nvCxnSpPr>
-              <p:cNvPr id="163" name="직선 연결선 162"/>
-              <p:cNvCxnSpPr/>
-              <p:nvPr/>
-            </p:nvCxnSpPr>
-            <p:spPr>
-              <a:xfrm>
-                <a:off x="3439093" y="1219200"/>
-                <a:ext cx="5603307" cy="0"/>
-              </a:xfrm>
-              <a:prstGeom prst="line">
-                <a:avLst/>
-              </a:prstGeom>
-            </p:spPr>
-            <p:style>
-              <a:lnRef idx="1">
-                <a:schemeClr val="accent1"/>
-              </a:lnRef>
-              <a:fillRef idx="0">
-                <a:schemeClr val="accent1"/>
-              </a:fillRef>
-              <a:effectRef idx="0">
-                <a:schemeClr val="accent1"/>
-              </a:effectRef>
-              <a:fontRef idx="minor">
-                <a:schemeClr val="tx1"/>
-              </a:fontRef>
-            </p:style>
-          </p:cxnSp>
-          <p:cxnSp>
-            <p:nvCxnSpPr>
-              <p:cNvPr id="164" name="직선 연결선 163"/>
-              <p:cNvCxnSpPr/>
-              <p:nvPr/>
-            </p:nvCxnSpPr>
-            <p:spPr>
-              <a:xfrm>
-                <a:off x="8873066" y="1043629"/>
-                <a:ext cx="169334" cy="175571"/>
-              </a:xfrm>
-              <a:prstGeom prst="line">
-                <a:avLst/>
-              </a:prstGeom>
-            </p:spPr>
-            <p:style>
-              <a:lnRef idx="1">
-                <a:schemeClr val="accent1"/>
-              </a:lnRef>
-              <a:fillRef idx="0">
-                <a:schemeClr val="accent1"/>
-              </a:fillRef>
-              <a:effectRef idx="0">
-                <a:schemeClr val="accent1"/>
-              </a:effectRef>
-              <a:fontRef idx="minor">
-                <a:schemeClr val="tx1"/>
-              </a:fontRef>
-            </p:style>
-          </p:cxnSp>
-          <p:cxnSp>
-            <p:nvCxnSpPr>
-              <p:cNvPr id="165" name="직선 연결선 164"/>
-              <p:cNvCxnSpPr/>
-              <p:nvPr/>
-            </p:nvCxnSpPr>
-            <p:spPr>
-              <a:xfrm flipH="1">
-                <a:off x="8831268" y="1219200"/>
-                <a:ext cx="211136" cy="175571"/>
-              </a:xfrm>
-              <a:prstGeom prst="line">
-                <a:avLst/>
-              </a:prstGeom>
-            </p:spPr>
-            <p:style>
-              <a:lnRef idx="1">
-                <a:schemeClr val="accent1"/>
-              </a:lnRef>
-              <a:fillRef idx="0">
-                <a:schemeClr val="accent1"/>
-              </a:fillRef>
-              <a:effectRef idx="0">
-                <a:schemeClr val="accent1"/>
-              </a:effectRef>
-              <a:fontRef idx="minor">
-                <a:schemeClr val="tx1"/>
-              </a:fontRef>
-            </p:style>
-          </p:cxnSp>
-        </p:grpSp>
-        <p:grpSp>
-          <p:nvGrpSpPr>
             <p:cNvPr id="166" name="그룹 165"/>
             <p:cNvGrpSpPr/>
             <p:nvPr/>
           </p:nvGrpSpPr>
           <p:grpSpPr>
             <a:xfrm>
-              <a:off x="8478077" y="6273952"/>
-              <a:ext cx="1970957" cy="351142"/>
-              <a:chOff x="7071447" y="1043629"/>
-              <a:chExt cx="1970957" cy="351142"/>
+              <a:off x="4996930" y="6288234"/>
+              <a:ext cx="4631426" cy="351142"/>
+              <a:chOff x="4410978" y="1043629"/>
+              <a:chExt cx="4631426" cy="351142"/>
             </a:xfrm>
           </p:grpSpPr>
           <p:cxnSp>
@@ -12157,8 +11481,8 @@
             </p:nvCxnSpPr>
             <p:spPr>
               <a:xfrm>
-                <a:off x="7071447" y="1219200"/>
-                <a:ext cx="1970953" cy="0"/>
+                <a:off x="4410978" y="1219200"/>
+                <a:ext cx="4631422" cy="0"/>
               </a:xfrm>
               <a:prstGeom prst="line">
                 <a:avLst/>
@@ -12248,8 +11572,8 @@
           </p:nvSpPr>
           <p:spPr>
             <a:xfrm>
-              <a:off x="1105754" y="6125863"/>
-              <a:ext cx="1620356" cy="307777"/>
+              <a:off x="3501275" y="7305991"/>
+              <a:ext cx="1620356" cy="261610"/>
             </a:xfrm>
             <a:prstGeom prst="rect">
               <a:avLst/>
@@ -12264,23 +11588,211 @@
             <a:p>
               <a:pPr algn="ctr"/>
               <a:r>
-                <a:rPr lang="en-US" altLang="ko-KR" sz="1400" dirty="0" smtClean="0"/>
+                <a:rPr lang="en-US" altLang="ko-KR" sz="1100" dirty="0" smtClean="0"/>
                 <a:t>Send message</a:t>
               </a:r>
-              <a:endParaRPr lang="ko-KR" altLang="en-US" sz="1400" dirty="0"/>
+              <a:endParaRPr lang="ko-KR" altLang="en-US" sz="1100" dirty="0"/>
             </a:p>
           </p:txBody>
         </p:sp>
         <p:sp>
           <p:nvSpPr>
-            <p:cNvPr id="171" name="TextBox 170"/>
+            <p:cNvPr id="119" name="직사각형 118"/>
+            <p:cNvSpPr/>
+            <p:nvPr/>
+          </p:nvSpPr>
+          <p:spPr>
+            <a:xfrm>
+              <a:off x="5699665" y="1926334"/>
+              <a:ext cx="1391811" cy="506499"/>
+            </a:xfrm>
+            <a:prstGeom prst="rect">
+              <a:avLst/>
+            </a:prstGeom>
+            <a:noFill/>
+          </p:spPr>
+          <p:style>
+            <a:lnRef idx="2">
+              <a:schemeClr val="accent1">
+                <a:shade val="50000"/>
+              </a:schemeClr>
+            </a:lnRef>
+            <a:fillRef idx="1">
+              <a:schemeClr val="accent1"/>
+            </a:fillRef>
+            <a:effectRef idx="0">
+              <a:schemeClr val="accent1"/>
+            </a:effectRef>
+            <a:fontRef idx="minor">
+              <a:schemeClr val="lt1"/>
+            </a:fontRef>
+          </p:style>
+          <p:txBody>
+            <a:bodyPr rtlCol="0" anchor="ctr"/>
+            <a:lstStyle/>
+            <a:p>
+              <a:pPr algn="ctr"/>
+              <a:r>
+                <a:rPr lang="en-US" altLang="ko-KR" sz="1400" dirty="0" smtClean="0">
+                  <a:solidFill>
+                    <a:schemeClr val="tx1"/>
+                  </a:solidFill>
+                </a:rPr>
+                <a:t>S</a:t>
+              </a:r>
+            </a:p>
+            <a:p>
+              <a:pPr algn="ctr"/>
+              <a:r>
+                <a:rPr lang="en-US" altLang="ko-KR" sz="1400" dirty="0" smtClean="0">
+                  <a:solidFill>
+                    <a:schemeClr val="tx1"/>
+                  </a:solidFill>
+                </a:rPr>
+                <a:t>[ A&amp;S Socket ]</a:t>
+              </a:r>
+              <a:endParaRPr lang="ko-KR" altLang="en-US" sz="1400" dirty="0">
+                <a:solidFill>
+                  <a:schemeClr val="tx1"/>
+                </a:solidFill>
+              </a:endParaRPr>
+            </a:p>
+          </p:txBody>
+        </p:sp>
+        <p:sp>
+          <p:nvSpPr>
+            <p:cNvPr id="132" name="직사각형 131"/>
+            <p:cNvSpPr/>
+            <p:nvPr/>
+          </p:nvSpPr>
+          <p:spPr>
+            <a:xfrm>
+              <a:off x="7321985" y="1921848"/>
+              <a:ext cx="1391811" cy="519897"/>
+            </a:xfrm>
+            <a:prstGeom prst="rect">
+              <a:avLst/>
+            </a:prstGeom>
+            <a:noFill/>
+          </p:spPr>
+          <p:style>
+            <a:lnRef idx="2">
+              <a:schemeClr val="accent1">
+                <a:shade val="50000"/>
+              </a:schemeClr>
+            </a:lnRef>
+            <a:fillRef idx="1">
+              <a:schemeClr val="accent1"/>
+            </a:fillRef>
+            <a:effectRef idx="0">
+              <a:schemeClr val="accent1"/>
+            </a:effectRef>
+            <a:fontRef idx="minor">
+              <a:schemeClr val="lt1"/>
+            </a:fontRef>
+          </p:style>
+          <p:txBody>
+            <a:bodyPr rtlCol="0" anchor="ctr"/>
+            <a:lstStyle/>
+            <a:p>
+              <a:pPr algn="ctr"/>
+              <a:r>
+                <a:rPr lang="en-US" altLang="ko-KR" sz="1400" dirty="0" smtClean="0">
+                  <a:solidFill>
+                    <a:schemeClr val="tx1"/>
+                  </a:solidFill>
+                </a:rPr>
+                <a:t>S</a:t>
+              </a:r>
+            </a:p>
+            <a:p>
+              <a:pPr algn="ctr"/>
+              <a:r>
+                <a:rPr lang="en-US" altLang="ko-KR" sz="1400" dirty="0" smtClean="0">
+                  <a:solidFill>
+                    <a:schemeClr val="tx1"/>
+                  </a:solidFill>
+                </a:rPr>
+                <a:t>[ S&amp;C Socket ]</a:t>
+              </a:r>
+              <a:endParaRPr lang="ko-KR" altLang="en-US" sz="1400" dirty="0">
+                <a:solidFill>
+                  <a:schemeClr val="tx1"/>
+                </a:solidFill>
+              </a:endParaRPr>
+            </a:p>
+          </p:txBody>
+        </p:sp>
+        <p:cxnSp>
+          <p:nvCxnSpPr>
+            <p:cNvPr id="133" name="직선 연결선 132"/>
+            <p:cNvCxnSpPr/>
+            <p:nvPr/>
+          </p:nvCxnSpPr>
+          <p:spPr>
+            <a:xfrm flipH="1">
+              <a:off x="6395571" y="2440512"/>
+              <a:ext cx="1" cy="5368174"/>
+            </a:xfrm>
+            <a:prstGeom prst="line">
+              <a:avLst/>
+            </a:prstGeom>
+          </p:spPr>
+          <p:style>
+            <a:lnRef idx="1">
+              <a:schemeClr val="accent1"/>
+            </a:lnRef>
+            <a:fillRef idx="0">
+              <a:schemeClr val="accent1"/>
+            </a:fillRef>
+            <a:effectRef idx="0">
+              <a:schemeClr val="accent1"/>
+            </a:effectRef>
+            <a:fontRef idx="minor">
+              <a:schemeClr val="tx1"/>
+            </a:fontRef>
+          </p:style>
+        </p:cxnSp>
+        <p:cxnSp>
+          <p:nvCxnSpPr>
+            <p:cNvPr id="134" name="직선 연결선 133"/>
+            <p:cNvCxnSpPr/>
+            <p:nvPr/>
+          </p:nvCxnSpPr>
+          <p:spPr>
+            <a:xfrm flipH="1">
+              <a:off x="8025232" y="2444061"/>
+              <a:ext cx="1" cy="5364625"/>
+            </a:xfrm>
+            <a:prstGeom prst="line">
+              <a:avLst/>
+            </a:prstGeom>
+          </p:spPr>
+          <p:style>
+            <a:lnRef idx="1">
+              <a:schemeClr val="accent1"/>
+            </a:lnRef>
+            <a:fillRef idx="0">
+              <a:schemeClr val="accent1"/>
+            </a:fillRef>
+            <a:effectRef idx="0">
+              <a:schemeClr val="accent1"/>
+            </a:effectRef>
+            <a:fontRef idx="minor">
+              <a:schemeClr val="tx1"/>
+            </a:fontRef>
+          </p:style>
+        </p:cxnSp>
+        <p:sp>
+          <p:nvSpPr>
+            <p:cNvPr id="154" name="TextBox 153"/>
             <p:cNvSpPr txBox="1"/>
             <p:nvPr/>
           </p:nvSpPr>
           <p:spPr>
             <a:xfrm>
-              <a:off x="8687579" y="6408231"/>
-              <a:ext cx="1620356" cy="307777"/>
+              <a:off x="3646185" y="3765239"/>
+              <a:ext cx="763351" cy="261610"/>
             </a:xfrm>
             <a:prstGeom prst="rect">
               <a:avLst/>
@@ -12288,17 +11800,1030 @@
             <a:noFill/>
           </p:spPr>
           <p:txBody>
-            <a:bodyPr wrap="square" rtlCol="0">
+            <a:bodyPr wrap="none" rtlCol="0">
               <a:spAutoFit/>
             </a:bodyPr>
             <a:lstStyle/>
             <a:p>
               <a:pPr algn="ctr"/>
               <a:r>
-                <a:rPr lang="en-US" altLang="ko-KR" sz="1400" dirty="0" smtClean="0"/>
-                <a:t>Send message</a:t>
+                <a:rPr lang="en-US" altLang="ko-KR" sz="1100" dirty="0" smtClean="0"/>
+                <a:t>Connect </a:t>
               </a:r>
-              <a:endParaRPr lang="ko-KR" altLang="en-US" sz="1400" dirty="0"/>
+              <a:endParaRPr lang="ko-KR" altLang="en-US" sz="1100" dirty="0"/>
+            </a:p>
+          </p:txBody>
+        </p:sp>
+        <p:grpSp>
+          <p:nvGrpSpPr>
+            <p:cNvPr id="155" name="그룹 154"/>
+            <p:cNvGrpSpPr/>
+            <p:nvPr/>
+          </p:nvGrpSpPr>
+          <p:grpSpPr>
+            <a:xfrm rot="10800000">
+              <a:off x="6409610" y="4116942"/>
+              <a:ext cx="1615629" cy="351142"/>
+              <a:chOff x="7426775" y="1043629"/>
+              <a:chExt cx="1615629" cy="351142"/>
+            </a:xfrm>
+          </p:grpSpPr>
+          <p:cxnSp>
+            <p:nvCxnSpPr>
+              <p:cNvPr id="156" name="직선 연결선 155"/>
+              <p:cNvCxnSpPr/>
+              <p:nvPr/>
+            </p:nvCxnSpPr>
+            <p:spPr>
+              <a:xfrm rot="10800000" flipH="1">
+                <a:off x="7426775" y="1219199"/>
+                <a:ext cx="1615625" cy="1"/>
+              </a:xfrm>
+              <a:prstGeom prst="line">
+                <a:avLst/>
+              </a:prstGeom>
+            </p:spPr>
+            <p:style>
+              <a:lnRef idx="1">
+                <a:schemeClr val="accent1"/>
+              </a:lnRef>
+              <a:fillRef idx="0">
+                <a:schemeClr val="accent1"/>
+              </a:fillRef>
+              <a:effectRef idx="0">
+                <a:schemeClr val="accent1"/>
+              </a:effectRef>
+              <a:fontRef idx="minor">
+                <a:schemeClr val="tx1"/>
+              </a:fontRef>
+            </p:style>
+          </p:cxnSp>
+          <p:cxnSp>
+            <p:nvCxnSpPr>
+              <p:cNvPr id="157" name="직선 연결선 156"/>
+              <p:cNvCxnSpPr/>
+              <p:nvPr/>
+            </p:nvCxnSpPr>
+            <p:spPr>
+              <a:xfrm>
+                <a:off x="8873066" y="1043629"/>
+                <a:ext cx="169334" cy="175571"/>
+              </a:xfrm>
+              <a:prstGeom prst="line">
+                <a:avLst/>
+              </a:prstGeom>
+            </p:spPr>
+            <p:style>
+              <a:lnRef idx="1">
+                <a:schemeClr val="accent1"/>
+              </a:lnRef>
+              <a:fillRef idx="0">
+                <a:schemeClr val="accent1"/>
+              </a:fillRef>
+              <a:effectRef idx="0">
+                <a:schemeClr val="accent1"/>
+              </a:effectRef>
+              <a:fontRef idx="minor">
+                <a:schemeClr val="tx1"/>
+              </a:fontRef>
+            </p:style>
+          </p:cxnSp>
+          <p:cxnSp>
+            <p:nvCxnSpPr>
+              <p:cNvPr id="172" name="직선 연결선 171"/>
+              <p:cNvCxnSpPr/>
+              <p:nvPr/>
+            </p:nvCxnSpPr>
+            <p:spPr>
+              <a:xfrm flipH="1">
+                <a:off x="8831268" y="1219200"/>
+                <a:ext cx="211136" cy="175571"/>
+              </a:xfrm>
+              <a:prstGeom prst="line">
+                <a:avLst/>
+              </a:prstGeom>
+            </p:spPr>
+            <p:style>
+              <a:lnRef idx="1">
+                <a:schemeClr val="accent1"/>
+              </a:lnRef>
+              <a:fillRef idx="0">
+                <a:schemeClr val="accent1"/>
+              </a:fillRef>
+              <a:effectRef idx="0">
+                <a:schemeClr val="accent1"/>
+              </a:effectRef>
+              <a:fontRef idx="minor">
+                <a:schemeClr val="tx1"/>
+              </a:fontRef>
+            </p:style>
+          </p:cxnSp>
+        </p:grpSp>
+        <p:sp>
+          <p:nvSpPr>
+            <p:cNvPr id="173" name="TextBox 172"/>
+            <p:cNvSpPr txBox="1"/>
+            <p:nvPr/>
+          </p:nvSpPr>
+          <p:spPr>
+            <a:xfrm>
+              <a:off x="6590490" y="4312896"/>
+              <a:ext cx="1253869" cy="261610"/>
+            </a:xfrm>
+            <a:prstGeom prst="rect">
+              <a:avLst/>
+            </a:prstGeom>
+            <a:noFill/>
+          </p:spPr>
+          <p:txBody>
+            <a:bodyPr wrap="none" rtlCol="0">
+              <a:spAutoFit/>
+            </a:bodyPr>
+            <a:lstStyle/>
+            <a:p>
+              <a:pPr algn="ctr"/>
+              <a:r>
+                <a:rPr lang="en-US" altLang="ko-KR" sz="1100" dirty="0" smtClean="0"/>
+                <a:t>Connect Success</a:t>
+              </a:r>
+              <a:endParaRPr lang="ko-KR" altLang="en-US" sz="1100" dirty="0"/>
+            </a:p>
+          </p:txBody>
+        </p:sp>
+        <p:grpSp>
+          <p:nvGrpSpPr>
+            <p:cNvPr id="174" name="그룹 173"/>
+            <p:cNvGrpSpPr/>
+            <p:nvPr/>
+          </p:nvGrpSpPr>
+          <p:grpSpPr>
+            <a:xfrm rot="10800000">
+              <a:off x="5012147" y="4218133"/>
+              <a:ext cx="1383423" cy="351142"/>
+              <a:chOff x="7658981" y="1043629"/>
+              <a:chExt cx="1383423" cy="351142"/>
+            </a:xfrm>
+          </p:grpSpPr>
+          <p:cxnSp>
+            <p:nvCxnSpPr>
+              <p:cNvPr id="175" name="직선 연결선 174"/>
+              <p:cNvCxnSpPr/>
+              <p:nvPr/>
+            </p:nvCxnSpPr>
+            <p:spPr>
+              <a:xfrm rot="10800000" flipH="1" flipV="1">
+                <a:off x="7658981" y="1208221"/>
+                <a:ext cx="1383419" cy="10978"/>
+              </a:xfrm>
+              <a:prstGeom prst="line">
+                <a:avLst/>
+              </a:prstGeom>
+            </p:spPr>
+            <p:style>
+              <a:lnRef idx="1">
+                <a:schemeClr val="accent1"/>
+              </a:lnRef>
+              <a:fillRef idx="0">
+                <a:schemeClr val="accent1"/>
+              </a:fillRef>
+              <a:effectRef idx="0">
+                <a:schemeClr val="accent1"/>
+              </a:effectRef>
+              <a:fontRef idx="minor">
+                <a:schemeClr val="tx1"/>
+              </a:fontRef>
+            </p:style>
+          </p:cxnSp>
+          <p:cxnSp>
+            <p:nvCxnSpPr>
+              <p:cNvPr id="176" name="직선 연결선 175"/>
+              <p:cNvCxnSpPr/>
+              <p:nvPr/>
+            </p:nvCxnSpPr>
+            <p:spPr>
+              <a:xfrm>
+                <a:off x="8873066" y="1043629"/>
+                <a:ext cx="169334" cy="175571"/>
+              </a:xfrm>
+              <a:prstGeom prst="line">
+                <a:avLst/>
+              </a:prstGeom>
+            </p:spPr>
+            <p:style>
+              <a:lnRef idx="1">
+                <a:schemeClr val="accent1"/>
+              </a:lnRef>
+              <a:fillRef idx="0">
+                <a:schemeClr val="accent1"/>
+              </a:fillRef>
+              <a:effectRef idx="0">
+                <a:schemeClr val="accent1"/>
+              </a:effectRef>
+              <a:fontRef idx="minor">
+                <a:schemeClr val="tx1"/>
+              </a:fontRef>
+            </p:style>
+          </p:cxnSp>
+          <p:cxnSp>
+            <p:nvCxnSpPr>
+              <p:cNvPr id="177" name="직선 연결선 176"/>
+              <p:cNvCxnSpPr/>
+              <p:nvPr/>
+            </p:nvCxnSpPr>
+            <p:spPr>
+              <a:xfrm flipH="1">
+                <a:off x="8831268" y="1219200"/>
+                <a:ext cx="211136" cy="175571"/>
+              </a:xfrm>
+              <a:prstGeom prst="line">
+                <a:avLst/>
+              </a:prstGeom>
+            </p:spPr>
+            <p:style>
+              <a:lnRef idx="1">
+                <a:schemeClr val="accent1"/>
+              </a:lnRef>
+              <a:fillRef idx="0">
+                <a:schemeClr val="accent1"/>
+              </a:fillRef>
+              <a:effectRef idx="0">
+                <a:schemeClr val="accent1"/>
+              </a:effectRef>
+              <a:fontRef idx="minor">
+                <a:schemeClr val="tx1"/>
+              </a:fontRef>
+            </p:style>
+          </p:cxnSp>
+        </p:grpSp>
+        <p:sp>
+          <p:nvSpPr>
+            <p:cNvPr id="178" name="TextBox 177"/>
+            <p:cNvSpPr txBox="1"/>
+            <p:nvPr/>
+          </p:nvSpPr>
+          <p:spPr>
+            <a:xfrm>
+              <a:off x="3646185" y="4804088"/>
+              <a:ext cx="1253869" cy="261610"/>
+            </a:xfrm>
+            <a:prstGeom prst="rect">
+              <a:avLst/>
+            </a:prstGeom>
+            <a:noFill/>
+          </p:spPr>
+          <p:txBody>
+            <a:bodyPr wrap="none" rtlCol="0">
+              <a:spAutoFit/>
+            </a:bodyPr>
+            <a:lstStyle/>
+            <a:p>
+              <a:pPr algn="ctr"/>
+              <a:r>
+                <a:rPr lang="en-US" altLang="ko-KR" sz="1100" dirty="0" smtClean="0"/>
+                <a:t>Connect Success</a:t>
+              </a:r>
+              <a:endParaRPr lang="ko-KR" altLang="en-US" sz="1100" dirty="0"/>
+            </a:p>
+          </p:txBody>
+        </p:sp>
+        <p:grpSp>
+          <p:nvGrpSpPr>
+            <p:cNvPr id="179" name="그룹 178"/>
+            <p:cNvGrpSpPr/>
+            <p:nvPr/>
+          </p:nvGrpSpPr>
+          <p:grpSpPr>
+            <a:xfrm>
+              <a:off x="1953853" y="5532039"/>
+              <a:ext cx="1607716" cy="351142"/>
+              <a:chOff x="7021553" y="1043629"/>
+              <a:chExt cx="2020851" cy="351142"/>
+            </a:xfrm>
+          </p:grpSpPr>
+          <p:cxnSp>
+            <p:nvCxnSpPr>
+              <p:cNvPr id="180" name="직선 연결선 179"/>
+              <p:cNvCxnSpPr/>
+              <p:nvPr/>
+            </p:nvCxnSpPr>
+            <p:spPr>
+              <a:xfrm>
+                <a:off x="7021553" y="1219200"/>
+                <a:ext cx="2020847" cy="0"/>
+              </a:xfrm>
+              <a:prstGeom prst="line">
+                <a:avLst/>
+              </a:prstGeom>
+            </p:spPr>
+            <p:style>
+              <a:lnRef idx="1">
+                <a:schemeClr val="accent1"/>
+              </a:lnRef>
+              <a:fillRef idx="0">
+                <a:schemeClr val="accent1"/>
+              </a:fillRef>
+              <a:effectRef idx="0">
+                <a:schemeClr val="accent1"/>
+              </a:effectRef>
+              <a:fontRef idx="minor">
+                <a:schemeClr val="tx1"/>
+              </a:fontRef>
+            </p:style>
+          </p:cxnSp>
+          <p:cxnSp>
+            <p:nvCxnSpPr>
+              <p:cNvPr id="181" name="직선 연결선 180"/>
+              <p:cNvCxnSpPr/>
+              <p:nvPr/>
+            </p:nvCxnSpPr>
+            <p:spPr>
+              <a:xfrm>
+                <a:off x="8873066" y="1043629"/>
+                <a:ext cx="169334" cy="175571"/>
+              </a:xfrm>
+              <a:prstGeom prst="line">
+                <a:avLst/>
+              </a:prstGeom>
+            </p:spPr>
+            <p:style>
+              <a:lnRef idx="1">
+                <a:schemeClr val="accent1"/>
+              </a:lnRef>
+              <a:fillRef idx="0">
+                <a:schemeClr val="accent1"/>
+              </a:fillRef>
+              <a:effectRef idx="0">
+                <a:schemeClr val="accent1"/>
+              </a:effectRef>
+              <a:fontRef idx="minor">
+                <a:schemeClr val="tx1"/>
+              </a:fontRef>
+            </p:style>
+          </p:cxnSp>
+          <p:cxnSp>
+            <p:nvCxnSpPr>
+              <p:cNvPr id="182" name="직선 연결선 181"/>
+              <p:cNvCxnSpPr/>
+              <p:nvPr/>
+            </p:nvCxnSpPr>
+            <p:spPr>
+              <a:xfrm flipH="1">
+                <a:off x="8831268" y="1219200"/>
+                <a:ext cx="211136" cy="175571"/>
+              </a:xfrm>
+              <a:prstGeom prst="line">
+                <a:avLst/>
+              </a:prstGeom>
+            </p:spPr>
+            <p:style>
+              <a:lnRef idx="1">
+                <a:schemeClr val="accent1"/>
+              </a:lnRef>
+              <a:fillRef idx="0">
+                <a:schemeClr val="accent1"/>
+              </a:fillRef>
+              <a:effectRef idx="0">
+                <a:schemeClr val="accent1"/>
+              </a:effectRef>
+              <a:fontRef idx="minor">
+                <a:schemeClr val="tx1"/>
+              </a:fontRef>
+            </p:style>
+          </p:cxnSp>
+        </p:grpSp>
+        <p:grpSp>
+          <p:nvGrpSpPr>
+            <p:cNvPr id="183" name="그룹 182"/>
+            <p:cNvGrpSpPr/>
+            <p:nvPr/>
+          </p:nvGrpSpPr>
+          <p:grpSpPr>
+            <a:xfrm>
+              <a:off x="3583988" y="5684439"/>
+              <a:ext cx="1400608" cy="351142"/>
+              <a:chOff x="7281882" y="1043629"/>
+              <a:chExt cx="1760522" cy="351142"/>
+            </a:xfrm>
+          </p:grpSpPr>
+          <p:cxnSp>
+            <p:nvCxnSpPr>
+              <p:cNvPr id="184" name="직선 연결선 183"/>
+              <p:cNvCxnSpPr/>
+              <p:nvPr/>
+            </p:nvCxnSpPr>
+            <p:spPr>
+              <a:xfrm>
+                <a:off x="7281882" y="1219200"/>
+                <a:ext cx="1760519" cy="0"/>
+              </a:xfrm>
+              <a:prstGeom prst="line">
+                <a:avLst/>
+              </a:prstGeom>
+            </p:spPr>
+            <p:style>
+              <a:lnRef idx="1">
+                <a:schemeClr val="accent1"/>
+              </a:lnRef>
+              <a:fillRef idx="0">
+                <a:schemeClr val="accent1"/>
+              </a:fillRef>
+              <a:effectRef idx="0">
+                <a:schemeClr val="accent1"/>
+              </a:effectRef>
+              <a:fontRef idx="minor">
+                <a:schemeClr val="tx1"/>
+              </a:fontRef>
+            </p:style>
+          </p:cxnSp>
+          <p:cxnSp>
+            <p:nvCxnSpPr>
+              <p:cNvPr id="185" name="직선 연결선 184"/>
+              <p:cNvCxnSpPr/>
+              <p:nvPr/>
+            </p:nvCxnSpPr>
+            <p:spPr>
+              <a:xfrm>
+                <a:off x="8873066" y="1043629"/>
+                <a:ext cx="169334" cy="175571"/>
+              </a:xfrm>
+              <a:prstGeom prst="line">
+                <a:avLst/>
+              </a:prstGeom>
+            </p:spPr>
+            <p:style>
+              <a:lnRef idx="1">
+                <a:schemeClr val="accent1"/>
+              </a:lnRef>
+              <a:fillRef idx="0">
+                <a:schemeClr val="accent1"/>
+              </a:fillRef>
+              <a:effectRef idx="0">
+                <a:schemeClr val="accent1"/>
+              </a:effectRef>
+              <a:fontRef idx="minor">
+                <a:schemeClr val="tx1"/>
+              </a:fontRef>
+            </p:style>
+          </p:cxnSp>
+          <p:cxnSp>
+            <p:nvCxnSpPr>
+              <p:cNvPr id="186" name="직선 연결선 185"/>
+              <p:cNvCxnSpPr/>
+              <p:nvPr/>
+            </p:nvCxnSpPr>
+            <p:spPr>
+              <a:xfrm flipH="1">
+                <a:off x="8831268" y="1219200"/>
+                <a:ext cx="211136" cy="175571"/>
+              </a:xfrm>
+              <a:prstGeom prst="line">
+                <a:avLst/>
+              </a:prstGeom>
+            </p:spPr>
+            <p:style>
+              <a:lnRef idx="1">
+                <a:schemeClr val="accent1"/>
+              </a:lnRef>
+              <a:fillRef idx="0">
+                <a:schemeClr val="accent1"/>
+              </a:fillRef>
+              <a:effectRef idx="0">
+                <a:schemeClr val="accent1"/>
+              </a:effectRef>
+              <a:fontRef idx="minor">
+                <a:schemeClr val="tx1"/>
+              </a:fontRef>
+            </p:style>
+          </p:cxnSp>
+        </p:grpSp>
+        <p:grpSp>
+          <p:nvGrpSpPr>
+            <p:cNvPr id="187" name="그룹 186"/>
+            <p:cNvGrpSpPr/>
+            <p:nvPr/>
+          </p:nvGrpSpPr>
+          <p:grpSpPr>
+            <a:xfrm>
+              <a:off x="5013874" y="5966040"/>
+              <a:ext cx="435112" cy="472792"/>
+              <a:chOff x="8876043" y="4277448"/>
+              <a:chExt cx="435112" cy="472792"/>
+            </a:xfrm>
+          </p:grpSpPr>
+          <p:cxnSp>
+            <p:nvCxnSpPr>
+              <p:cNvPr id="188" name="직선 연결선 187"/>
+              <p:cNvCxnSpPr/>
+              <p:nvPr/>
+            </p:nvCxnSpPr>
+            <p:spPr>
+              <a:xfrm flipH="1">
+                <a:off x="8876047" y="4562477"/>
+                <a:ext cx="435108" cy="0"/>
+              </a:xfrm>
+              <a:prstGeom prst="line">
+                <a:avLst/>
+              </a:prstGeom>
+            </p:spPr>
+            <p:style>
+              <a:lnRef idx="1">
+                <a:schemeClr val="accent1"/>
+              </a:lnRef>
+              <a:fillRef idx="0">
+                <a:schemeClr val="accent1"/>
+              </a:fillRef>
+              <a:effectRef idx="0">
+                <a:schemeClr val="accent1"/>
+              </a:effectRef>
+              <a:fontRef idx="minor">
+                <a:schemeClr val="tx1"/>
+              </a:fontRef>
+            </p:style>
+          </p:cxnSp>
+          <p:cxnSp>
+            <p:nvCxnSpPr>
+              <p:cNvPr id="189" name="직선 연결선 188"/>
+              <p:cNvCxnSpPr/>
+              <p:nvPr/>
+            </p:nvCxnSpPr>
+            <p:spPr>
+              <a:xfrm rot="10800000">
+                <a:off x="8876047" y="4574669"/>
+                <a:ext cx="169334" cy="175571"/>
+              </a:xfrm>
+              <a:prstGeom prst="line">
+                <a:avLst/>
+              </a:prstGeom>
+            </p:spPr>
+            <p:style>
+              <a:lnRef idx="1">
+                <a:schemeClr val="accent1"/>
+              </a:lnRef>
+              <a:fillRef idx="0">
+                <a:schemeClr val="accent1"/>
+              </a:fillRef>
+              <a:effectRef idx="0">
+                <a:schemeClr val="accent1"/>
+              </a:effectRef>
+              <a:fontRef idx="minor">
+                <a:schemeClr val="tx1"/>
+              </a:fontRef>
+            </p:style>
+          </p:cxnSp>
+          <p:cxnSp>
+            <p:nvCxnSpPr>
+              <p:cNvPr id="190" name="직선 연결선 189"/>
+              <p:cNvCxnSpPr/>
+              <p:nvPr/>
+            </p:nvCxnSpPr>
+            <p:spPr>
+              <a:xfrm rot="10800000" flipH="1">
+                <a:off x="8876043" y="4386906"/>
+                <a:ext cx="211136" cy="175571"/>
+              </a:xfrm>
+              <a:prstGeom prst="line">
+                <a:avLst/>
+              </a:prstGeom>
+            </p:spPr>
+            <p:style>
+              <a:lnRef idx="1">
+                <a:schemeClr val="accent1"/>
+              </a:lnRef>
+              <a:fillRef idx="0">
+                <a:schemeClr val="accent1"/>
+              </a:fillRef>
+              <a:effectRef idx="0">
+                <a:schemeClr val="accent1"/>
+              </a:effectRef>
+              <a:fontRef idx="minor">
+                <a:schemeClr val="tx1"/>
+              </a:fontRef>
+            </p:style>
+          </p:cxnSp>
+          <p:cxnSp>
+            <p:nvCxnSpPr>
+              <p:cNvPr id="191" name="직선 연결선 190"/>
+              <p:cNvCxnSpPr/>
+              <p:nvPr/>
+            </p:nvCxnSpPr>
+            <p:spPr>
+              <a:xfrm>
+                <a:off x="8876043" y="4277448"/>
+                <a:ext cx="435112" cy="0"/>
+              </a:xfrm>
+              <a:prstGeom prst="line">
+                <a:avLst/>
+              </a:prstGeom>
+            </p:spPr>
+            <p:style>
+              <a:lnRef idx="1">
+                <a:schemeClr val="accent1"/>
+              </a:lnRef>
+              <a:fillRef idx="0">
+                <a:schemeClr val="accent1"/>
+              </a:fillRef>
+              <a:effectRef idx="0">
+                <a:schemeClr val="accent1"/>
+              </a:effectRef>
+              <a:fontRef idx="minor">
+                <a:schemeClr val="tx1"/>
+              </a:fontRef>
+            </p:style>
+          </p:cxnSp>
+          <p:cxnSp>
+            <p:nvCxnSpPr>
+              <p:cNvPr id="192" name="직선 연결선 191"/>
+              <p:cNvCxnSpPr/>
+              <p:nvPr/>
+            </p:nvCxnSpPr>
+            <p:spPr>
+              <a:xfrm>
+                <a:off x="9311155" y="4277448"/>
+                <a:ext cx="0" cy="284749"/>
+              </a:xfrm>
+              <a:prstGeom prst="line">
+                <a:avLst/>
+              </a:prstGeom>
+            </p:spPr>
+            <p:style>
+              <a:lnRef idx="1">
+                <a:schemeClr val="accent1"/>
+              </a:lnRef>
+              <a:fillRef idx="0">
+                <a:schemeClr val="accent1"/>
+              </a:fillRef>
+              <a:effectRef idx="0">
+                <a:schemeClr val="accent1"/>
+              </a:effectRef>
+              <a:fontRef idx="minor">
+                <a:schemeClr val="tx1"/>
+              </a:fontRef>
+            </p:style>
+          </p:cxnSp>
+        </p:grpSp>
+        <p:sp>
+          <p:nvSpPr>
+            <p:cNvPr id="193" name="직사각형 192"/>
+            <p:cNvSpPr/>
+            <p:nvPr/>
+          </p:nvSpPr>
+          <p:spPr>
+            <a:xfrm>
+              <a:off x="12270111" y="1918718"/>
+              <a:ext cx="923669" cy="515409"/>
+            </a:xfrm>
+            <a:prstGeom prst="rect">
+              <a:avLst/>
+            </a:prstGeom>
+            <a:noFill/>
+          </p:spPr>
+          <p:style>
+            <a:lnRef idx="2">
+              <a:schemeClr val="accent1">
+                <a:shade val="50000"/>
+              </a:schemeClr>
+            </a:lnRef>
+            <a:fillRef idx="1">
+              <a:schemeClr val="accent1"/>
+            </a:fillRef>
+            <a:effectRef idx="0">
+              <a:schemeClr val="accent1"/>
+            </a:effectRef>
+            <a:fontRef idx="minor">
+              <a:schemeClr val="lt1"/>
+            </a:fontRef>
+          </p:style>
+          <p:txBody>
+            <a:bodyPr rtlCol="0" anchor="ctr"/>
+            <a:lstStyle/>
+            <a:p>
+              <a:pPr algn="ctr"/>
+              <a:r>
+                <a:rPr lang="en-US" altLang="ko-KR" sz="1400" dirty="0" smtClean="0">
+                  <a:solidFill>
+                    <a:schemeClr val="tx1"/>
+                  </a:solidFill>
+                </a:rPr>
+                <a:t>C</a:t>
+              </a:r>
+            </a:p>
+            <a:p>
+              <a:pPr algn="ctr"/>
+              <a:r>
+                <a:rPr lang="en-US" altLang="ko-KR" sz="1400" dirty="0" smtClean="0">
+                  <a:solidFill>
+                    <a:schemeClr val="tx1"/>
+                  </a:solidFill>
+                </a:rPr>
+                <a:t>[ Client ]</a:t>
+              </a:r>
+              <a:endParaRPr lang="ko-KR" altLang="en-US" sz="1400" dirty="0">
+                <a:solidFill>
+                  <a:schemeClr val="tx1"/>
+                </a:solidFill>
+              </a:endParaRPr>
+            </a:p>
+          </p:txBody>
+        </p:sp>
+        <p:cxnSp>
+          <p:nvCxnSpPr>
+            <p:cNvPr id="194" name="직선 연결선 193"/>
+            <p:cNvCxnSpPr/>
+            <p:nvPr/>
+          </p:nvCxnSpPr>
+          <p:spPr>
+            <a:xfrm flipH="1">
+              <a:off x="12731947" y="2443680"/>
+              <a:ext cx="1" cy="5365006"/>
+            </a:xfrm>
+            <a:prstGeom prst="line">
+              <a:avLst/>
+            </a:prstGeom>
+          </p:spPr>
+          <p:style>
+            <a:lnRef idx="1">
+              <a:schemeClr val="accent1"/>
+            </a:lnRef>
+            <a:fillRef idx="0">
+              <a:schemeClr val="accent1"/>
+            </a:fillRef>
+            <a:effectRef idx="0">
+              <a:schemeClr val="accent1"/>
+            </a:effectRef>
+            <a:fontRef idx="minor">
+              <a:schemeClr val="tx1"/>
+            </a:fontRef>
+          </p:style>
+        </p:cxnSp>
+        <p:grpSp>
+          <p:nvGrpSpPr>
+            <p:cNvPr id="195" name="그룹 194"/>
+            <p:cNvGrpSpPr/>
+            <p:nvPr/>
+          </p:nvGrpSpPr>
+          <p:grpSpPr>
+            <a:xfrm>
+              <a:off x="11368889" y="6536900"/>
+              <a:ext cx="1357062" cy="351142"/>
+              <a:chOff x="7685342" y="1043629"/>
+              <a:chExt cx="1357062" cy="351142"/>
+            </a:xfrm>
+          </p:grpSpPr>
+          <p:cxnSp>
+            <p:nvCxnSpPr>
+              <p:cNvPr id="196" name="직선 연결선 195"/>
+              <p:cNvCxnSpPr/>
+              <p:nvPr/>
+            </p:nvCxnSpPr>
+            <p:spPr>
+              <a:xfrm>
+                <a:off x="7685342" y="1219200"/>
+                <a:ext cx="1357058" cy="0"/>
+              </a:xfrm>
+              <a:prstGeom prst="line">
+                <a:avLst/>
+              </a:prstGeom>
+            </p:spPr>
+            <p:style>
+              <a:lnRef idx="1">
+                <a:schemeClr val="accent1"/>
+              </a:lnRef>
+              <a:fillRef idx="0">
+                <a:schemeClr val="accent1"/>
+              </a:fillRef>
+              <a:effectRef idx="0">
+                <a:schemeClr val="accent1"/>
+              </a:effectRef>
+              <a:fontRef idx="minor">
+                <a:schemeClr val="tx1"/>
+              </a:fontRef>
+            </p:style>
+          </p:cxnSp>
+          <p:cxnSp>
+            <p:nvCxnSpPr>
+              <p:cNvPr id="197" name="직선 연결선 196"/>
+              <p:cNvCxnSpPr/>
+              <p:nvPr/>
+            </p:nvCxnSpPr>
+            <p:spPr>
+              <a:xfrm>
+                <a:off x="8873066" y="1043629"/>
+                <a:ext cx="169334" cy="175571"/>
+              </a:xfrm>
+              <a:prstGeom prst="line">
+                <a:avLst/>
+              </a:prstGeom>
+            </p:spPr>
+            <p:style>
+              <a:lnRef idx="1">
+                <a:schemeClr val="accent1"/>
+              </a:lnRef>
+              <a:fillRef idx="0">
+                <a:schemeClr val="accent1"/>
+              </a:fillRef>
+              <a:effectRef idx="0">
+                <a:schemeClr val="accent1"/>
+              </a:effectRef>
+              <a:fontRef idx="minor">
+                <a:schemeClr val="tx1"/>
+              </a:fontRef>
+            </p:style>
+          </p:cxnSp>
+          <p:cxnSp>
+            <p:nvCxnSpPr>
+              <p:cNvPr id="198" name="직선 연결선 197"/>
+              <p:cNvCxnSpPr/>
+              <p:nvPr/>
+            </p:nvCxnSpPr>
+            <p:spPr>
+              <a:xfrm flipH="1">
+                <a:off x="8831268" y="1219200"/>
+                <a:ext cx="211136" cy="175571"/>
+              </a:xfrm>
+              <a:prstGeom prst="line">
+                <a:avLst/>
+              </a:prstGeom>
+            </p:spPr>
+            <p:style>
+              <a:lnRef idx="1">
+                <a:schemeClr val="accent1"/>
+              </a:lnRef>
+              <a:fillRef idx="0">
+                <a:schemeClr val="accent1"/>
+              </a:fillRef>
+              <a:effectRef idx="0">
+                <a:schemeClr val="accent1"/>
+              </a:effectRef>
+              <a:fontRef idx="minor">
+                <a:schemeClr val="tx1"/>
+              </a:fontRef>
+            </p:style>
+          </p:cxnSp>
+        </p:grpSp>
+        <p:grpSp>
+          <p:nvGrpSpPr>
+            <p:cNvPr id="207" name="그룹 206"/>
+            <p:cNvGrpSpPr/>
+            <p:nvPr/>
+          </p:nvGrpSpPr>
+          <p:grpSpPr>
+            <a:xfrm rot="10800000">
+              <a:off x="8025233" y="6785742"/>
+              <a:ext cx="4706715" cy="351142"/>
+              <a:chOff x="4335689" y="1043629"/>
+              <a:chExt cx="4706715" cy="351142"/>
+            </a:xfrm>
+          </p:grpSpPr>
+          <p:cxnSp>
+            <p:nvCxnSpPr>
+              <p:cNvPr id="208" name="직선 연결선 207"/>
+              <p:cNvCxnSpPr/>
+              <p:nvPr/>
+            </p:nvCxnSpPr>
+            <p:spPr>
+              <a:xfrm rot="10800000" flipH="1">
+                <a:off x="4335689" y="1219197"/>
+                <a:ext cx="4706709" cy="0"/>
+              </a:xfrm>
+              <a:prstGeom prst="line">
+                <a:avLst/>
+              </a:prstGeom>
+            </p:spPr>
+            <p:style>
+              <a:lnRef idx="1">
+                <a:schemeClr val="accent1"/>
+              </a:lnRef>
+              <a:fillRef idx="0">
+                <a:schemeClr val="accent1"/>
+              </a:fillRef>
+              <a:effectRef idx="0">
+                <a:schemeClr val="accent1"/>
+              </a:effectRef>
+              <a:fontRef idx="minor">
+                <a:schemeClr val="tx1"/>
+              </a:fontRef>
+            </p:style>
+          </p:cxnSp>
+          <p:cxnSp>
+            <p:nvCxnSpPr>
+              <p:cNvPr id="209" name="직선 연결선 208"/>
+              <p:cNvCxnSpPr/>
+              <p:nvPr/>
+            </p:nvCxnSpPr>
+            <p:spPr>
+              <a:xfrm>
+                <a:off x="8873066" y="1043629"/>
+                <a:ext cx="169334" cy="175571"/>
+              </a:xfrm>
+              <a:prstGeom prst="line">
+                <a:avLst/>
+              </a:prstGeom>
+            </p:spPr>
+            <p:style>
+              <a:lnRef idx="1">
+                <a:schemeClr val="accent1"/>
+              </a:lnRef>
+              <a:fillRef idx="0">
+                <a:schemeClr val="accent1"/>
+              </a:fillRef>
+              <a:effectRef idx="0">
+                <a:schemeClr val="accent1"/>
+              </a:effectRef>
+              <a:fontRef idx="minor">
+                <a:schemeClr val="tx1"/>
+              </a:fontRef>
+            </p:style>
+          </p:cxnSp>
+          <p:cxnSp>
+            <p:nvCxnSpPr>
+              <p:cNvPr id="210" name="직선 연결선 209"/>
+              <p:cNvCxnSpPr/>
+              <p:nvPr/>
+            </p:nvCxnSpPr>
+            <p:spPr>
+              <a:xfrm flipH="1">
+                <a:off x="8831268" y="1219200"/>
+                <a:ext cx="211136" cy="175571"/>
+              </a:xfrm>
+              <a:prstGeom prst="line">
+                <a:avLst/>
+              </a:prstGeom>
+            </p:spPr>
+            <p:style>
+              <a:lnRef idx="1">
+                <a:schemeClr val="accent1"/>
+              </a:lnRef>
+              <a:fillRef idx="0">
+                <a:schemeClr val="accent1"/>
+              </a:fillRef>
+              <a:effectRef idx="0">
+                <a:schemeClr val="accent1"/>
+              </a:effectRef>
+              <a:fontRef idx="minor">
+                <a:schemeClr val="tx1"/>
+              </a:fontRef>
+            </p:style>
+          </p:cxnSp>
+        </p:grpSp>
+        <p:sp>
+          <p:nvSpPr>
+            <p:cNvPr id="216" name="TextBox 215"/>
+            <p:cNvSpPr txBox="1"/>
+            <p:nvPr/>
+          </p:nvSpPr>
+          <p:spPr>
+            <a:xfrm>
+              <a:off x="9701911" y="6698479"/>
+              <a:ext cx="763351" cy="261610"/>
+            </a:xfrm>
+            <a:prstGeom prst="rect">
+              <a:avLst/>
+            </a:prstGeom>
+            <a:noFill/>
+          </p:spPr>
+          <p:txBody>
+            <a:bodyPr wrap="none" rtlCol="0">
+              <a:spAutoFit/>
+            </a:bodyPr>
+            <a:lstStyle/>
+            <a:p>
+              <a:pPr algn="ctr"/>
+              <a:r>
+                <a:rPr lang="en-US" altLang="ko-KR" sz="1100" dirty="0" smtClean="0"/>
+                <a:t>Connect </a:t>
+              </a:r>
+              <a:endParaRPr lang="ko-KR" altLang="en-US" sz="1100" dirty="0"/>
+            </a:p>
+          </p:txBody>
+        </p:sp>
+        <p:sp>
+          <p:nvSpPr>
+            <p:cNvPr id="219" name="TextBox 218"/>
+            <p:cNvSpPr txBox="1"/>
+            <p:nvPr/>
+          </p:nvSpPr>
+          <p:spPr>
+            <a:xfrm>
+              <a:off x="6686865" y="6184792"/>
+              <a:ext cx="1348447" cy="261610"/>
+            </a:xfrm>
+            <a:prstGeom prst="rect">
+              <a:avLst/>
+            </a:prstGeom>
+            <a:noFill/>
+          </p:spPr>
+          <p:txBody>
+            <a:bodyPr wrap="none" rtlCol="0">
+              <a:spAutoFit/>
+            </a:bodyPr>
+            <a:lstStyle/>
+            <a:p>
+              <a:pPr algn="ctr"/>
+              <a:r>
+                <a:rPr lang="en-US" altLang="ko-KR" sz="1100" dirty="0" smtClean="0"/>
+                <a:t>Notify connect IP </a:t>
+              </a:r>
+              <a:endParaRPr lang="ko-KR" altLang="en-US" sz="1100" dirty="0"/>
             </a:p>
           </p:txBody>
         </p:sp>
@@ -15311,7 +15836,7 @@
           <p:nvPr>
             <p:extLst>
               <p:ext uri="{D42A27DB-BD31-4B8C-83A1-F6EECF244321}">
-                <p14:modId xmlns:p14="http://schemas.microsoft.com/office/powerpoint/2010/main" val="773723123"/>
+                <p14:modId xmlns:p14="http://schemas.microsoft.com/office/powerpoint/2010/main" val="2562863926"/>
               </p:ext>
             </p:extLst>
           </p:nvPr>
@@ -15481,12 +16006,8 @@
                     <a:p>
                       <a:pPr algn="ctr" latinLnBrk="1"/>
                       <a:r>
-                        <a:rPr lang="en-US" altLang="ko-KR" dirty="0" smtClean="0"/>
-                        <a:t>PASSWORD(</a:t>
-                      </a:r>
-                      <a:r>
                         <a:rPr lang="en-US" altLang="ko-KR" baseline="0" dirty="0" smtClean="0"/>
-                        <a:t> VARCHAR(20) )</a:t>
+                        <a:t>VARCHAR(100)</a:t>
                       </a:r>
                       <a:endParaRPr lang="ko-KR" altLang="en-US" dirty="0"/>
                     </a:p>
@@ -15502,6 +16023,469 @@
     <p:extLst>
       <p:ext uri="{BB962C8B-B14F-4D97-AF65-F5344CB8AC3E}">
         <p14:creationId xmlns:p14="http://schemas.microsoft.com/office/powerpoint/2010/main" val="433247511"/>
+      </p:ext>
+    </p:extLst>
+  </p:cSld>
+  <p:clrMapOvr>
+    <a:masterClrMapping/>
+  </p:clrMapOvr>
+  <p:timing>
+    <p:tnLst>
+      <p:par>
+        <p:cTn id="1" dur="indefinite" restart="never" nodeType="tmRoot"/>
+      </p:par>
+    </p:tnLst>
+  </p:timing>
+</p:sld>
+</file>
+
+<file path=ppt/slides/slide7.xml><?xml version="1.0" encoding="utf-8"?>
+<p:sld xmlns:a="http://schemas.openxmlformats.org/drawingml/2006/main" xmlns:r="http://schemas.openxmlformats.org/officeDocument/2006/relationships" xmlns:p="http://schemas.openxmlformats.org/presentationml/2006/main">
+  <p:cSld>
+    <p:spTree>
+      <p:nvGrpSpPr>
+        <p:cNvPr id="1" name=""/>
+        <p:cNvGrpSpPr/>
+        <p:nvPr/>
+      </p:nvGrpSpPr>
+      <p:grpSpPr>
+        <a:xfrm>
+          <a:off x="0" y="0"/>
+          <a:ext cx="0" cy="0"/>
+          <a:chOff x="0" y="0"/>
+          <a:chExt cx="0" cy="0"/>
+        </a:xfrm>
+      </p:grpSpPr>
+      <p:grpSp>
+        <p:nvGrpSpPr>
+          <p:cNvPr id="13" name="그룹 12"/>
+          <p:cNvGrpSpPr/>
+          <p:nvPr/>
+        </p:nvGrpSpPr>
+        <p:grpSpPr>
+          <a:xfrm>
+            <a:off x="4647656" y="321340"/>
+            <a:ext cx="1318162" cy="1214238"/>
+            <a:chOff x="4578893" y="214412"/>
+            <a:chExt cx="1896457" cy="2045198"/>
+          </a:xfrm>
+        </p:grpSpPr>
+        <p:grpSp>
+          <p:nvGrpSpPr>
+            <p:cNvPr id="10" name="그룹 9"/>
+            <p:cNvGrpSpPr/>
+            <p:nvPr/>
+          </p:nvGrpSpPr>
+          <p:grpSpPr>
+            <a:xfrm>
+              <a:off x="4578893" y="214412"/>
+              <a:ext cx="1896457" cy="2045198"/>
+              <a:chOff x="2521163" y="757379"/>
+              <a:chExt cx="1896457" cy="2045198"/>
+            </a:xfrm>
+          </p:grpSpPr>
+          <p:sp>
+            <p:nvSpPr>
+              <p:cNvPr id="8" name="직사각형 7"/>
+              <p:cNvSpPr/>
+              <p:nvPr/>
+            </p:nvSpPr>
+            <p:spPr>
+              <a:xfrm>
+                <a:off x="2521163" y="757379"/>
+                <a:ext cx="1896457" cy="362857"/>
+              </a:xfrm>
+              <a:prstGeom prst="rect">
+                <a:avLst/>
+              </a:prstGeom>
+              <a:noFill/>
+            </p:spPr>
+            <p:style>
+              <a:lnRef idx="2">
+                <a:schemeClr val="accent1">
+                  <a:shade val="50000"/>
+                </a:schemeClr>
+              </a:lnRef>
+              <a:fillRef idx="1">
+                <a:schemeClr val="accent1"/>
+              </a:fillRef>
+              <a:effectRef idx="0">
+                <a:schemeClr val="accent1"/>
+              </a:effectRef>
+              <a:fontRef idx="minor">
+                <a:schemeClr val="lt1"/>
+              </a:fontRef>
+            </p:style>
+            <p:txBody>
+              <a:bodyPr rtlCol="0" anchor="ctr"/>
+              <a:lstStyle/>
+              <a:p>
+                <a:pPr algn="ctr"/>
+                <a:r>
+                  <a:rPr lang="en-US" altLang="ko-KR" sz="1200" dirty="0" smtClean="0">
+                    <a:solidFill>
+                      <a:schemeClr val="tx1"/>
+                    </a:solidFill>
+                  </a:rPr>
+                  <a:t>A</a:t>
+                </a:r>
+                <a:endParaRPr lang="ko-KR" altLang="en-US" sz="1200" dirty="0">
+                  <a:solidFill>
+                    <a:schemeClr val="tx1"/>
+                  </a:solidFill>
+                </a:endParaRPr>
+              </a:p>
+            </p:txBody>
+          </p:sp>
+          <p:sp>
+            <p:nvSpPr>
+              <p:cNvPr id="9" name="직사각형 8"/>
+              <p:cNvSpPr/>
+              <p:nvPr/>
+            </p:nvSpPr>
+            <p:spPr>
+              <a:xfrm>
+                <a:off x="2521165" y="1120236"/>
+                <a:ext cx="1896455" cy="1682341"/>
+              </a:xfrm>
+              <a:prstGeom prst="rect">
+                <a:avLst/>
+              </a:prstGeom>
+              <a:noFill/>
+            </p:spPr>
+            <p:style>
+              <a:lnRef idx="2">
+                <a:schemeClr val="accent1">
+                  <a:shade val="50000"/>
+                </a:schemeClr>
+              </a:lnRef>
+              <a:fillRef idx="1">
+                <a:schemeClr val="accent1"/>
+              </a:fillRef>
+              <a:effectRef idx="0">
+                <a:schemeClr val="accent1"/>
+              </a:effectRef>
+              <a:fontRef idx="minor">
+                <a:schemeClr val="lt1"/>
+              </a:fontRef>
+            </p:style>
+            <p:txBody>
+              <a:bodyPr rtlCol="0" anchor="ctr"/>
+              <a:lstStyle/>
+              <a:p>
+                <a:pPr algn="ctr"/>
+                <a:endParaRPr lang="ko-KR" altLang="en-US" sz="1200" dirty="0">
+                  <a:solidFill>
+                    <a:schemeClr val="tx1"/>
+                  </a:solidFill>
+                </a:endParaRPr>
+              </a:p>
+            </p:txBody>
+          </p:sp>
+        </p:grpSp>
+        <p:sp>
+          <p:nvSpPr>
+            <p:cNvPr id="11" name="직사각형 10"/>
+            <p:cNvSpPr/>
+            <p:nvPr/>
+          </p:nvSpPr>
+          <p:spPr>
+            <a:xfrm>
+              <a:off x="4883246" y="872830"/>
+              <a:ext cx="1270660" cy="362857"/>
+            </a:xfrm>
+            <a:prstGeom prst="rect">
+              <a:avLst/>
+            </a:prstGeom>
+            <a:noFill/>
+          </p:spPr>
+          <p:style>
+            <a:lnRef idx="2">
+              <a:schemeClr val="accent1">
+                <a:shade val="50000"/>
+              </a:schemeClr>
+            </a:lnRef>
+            <a:fillRef idx="1">
+              <a:schemeClr val="accent1"/>
+            </a:fillRef>
+            <a:effectRef idx="0">
+              <a:schemeClr val="accent1"/>
+            </a:effectRef>
+            <a:fontRef idx="minor">
+              <a:schemeClr val="lt1"/>
+            </a:fontRef>
+          </p:style>
+          <p:txBody>
+            <a:bodyPr rtlCol="0" anchor="ctr"/>
+            <a:lstStyle/>
+            <a:p>
+              <a:pPr algn="ctr"/>
+              <a:r>
+                <a:rPr lang="en-US" altLang="ko-KR" sz="1200" dirty="0" smtClean="0">
+                  <a:solidFill>
+                    <a:schemeClr val="tx1"/>
+                  </a:solidFill>
+                </a:rPr>
+                <a:t>CRUD</a:t>
+              </a:r>
+              <a:endParaRPr lang="ko-KR" altLang="en-US" sz="1200" dirty="0">
+                <a:solidFill>
+                  <a:schemeClr val="tx1"/>
+                </a:solidFill>
+              </a:endParaRPr>
+            </a:p>
+          </p:txBody>
+        </p:sp>
+        <p:sp>
+          <p:nvSpPr>
+            <p:cNvPr id="12" name="직사각형 11"/>
+            <p:cNvSpPr/>
+            <p:nvPr/>
+          </p:nvSpPr>
+          <p:spPr>
+            <a:xfrm>
+              <a:off x="4883246" y="1619260"/>
+              <a:ext cx="1270660" cy="362857"/>
+            </a:xfrm>
+            <a:prstGeom prst="rect">
+              <a:avLst/>
+            </a:prstGeom>
+            <a:noFill/>
+          </p:spPr>
+          <p:style>
+            <a:lnRef idx="2">
+              <a:schemeClr val="accent1">
+                <a:shade val="50000"/>
+              </a:schemeClr>
+            </a:lnRef>
+            <a:fillRef idx="1">
+              <a:schemeClr val="accent1"/>
+            </a:fillRef>
+            <a:effectRef idx="0">
+              <a:schemeClr val="accent1"/>
+            </a:effectRef>
+            <a:fontRef idx="minor">
+              <a:schemeClr val="lt1"/>
+            </a:fontRef>
+          </p:style>
+          <p:txBody>
+            <a:bodyPr rtlCol="0" anchor="ctr"/>
+            <a:lstStyle/>
+            <a:p>
+              <a:pPr algn="ctr"/>
+              <a:r>
+                <a:rPr lang="en-US" altLang="ko-KR" sz="1200" dirty="0" smtClean="0">
+                  <a:solidFill>
+                    <a:schemeClr val="tx1"/>
+                  </a:solidFill>
+                </a:rPr>
+                <a:t>Socket</a:t>
+              </a:r>
+              <a:endParaRPr lang="ko-KR" altLang="en-US" sz="1200" dirty="0">
+                <a:solidFill>
+                  <a:schemeClr val="tx1"/>
+                </a:solidFill>
+              </a:endParaRPr>
+            </a:p>
+          </p:txBody>
+        </p:sp>
+      </p:grpSp>
+      <p:grpSp>
+        <p:nvGrpSpPr>
+          <p:cNvPr id="14" name="그룹 13"/>
+          <p:cNvGrpSpPr/>
+          <p:nvPr/>
+        </p:nvGrpSpPr>
+        <p:grpSpPr>
+          <a:xfrm>
+            <a:off x="1536762" y="1865671"/>
+            <a:ext cx="1318162" cy="782527"/>
+            <a:chOff x="4578893" y="214412"/>
+            <a:chExt cx="1896457" cy="1482683"/>
+          </a:xfrm>
+        </p:grpSpPr>
+        <p:grpSp>
+          <p:nvGrpSpPr>
+            <p:cNvPr id="15" name="그룹 14"/>
+            <p:cNvGrpSpPr/>
+            <p:nvPr/>
+          </p:nvGrpSpPr>
+          <p:grpSpPr>
+            <a:xfrm>
+              <a:off x="4578893" y="214412"/>
+              <a:ext cx="1896457" cy="1482683"/>
+              <a:chOff x="2521163" y="757379"/>
+              <a:chExt cx="1896457" cy="1482683"/>
+            </a:xfrm>
+          </p:grpSpPr>
+          <p:sp>
+            <p:nvSpPr>
+              <p:cNvPr id="18" name="직사각형 17"/>
+              <p:cNvSpPr/>
+              <p:nvPr/>
+            </p:nvSpPr>
+            <p:spPr>
+              <a:xfrm>
+                <a:off x="2521163" y="757379"/>
+                <a:ext cx="1896457" cy="362857"/>
+              </a:xfrm>
+              <a:prstGeom prst="rect">
+                <a:avLst/>
+              </a:prstGeom>
+              <a:noFill/>
+            </p:spPr>
+            <p:style>
+              <a:lnRef idx="2">
+                <a:schemeClr val="accent1">
+                  <a:shade val="50000"/>
+                </a:schemeClr>
+              </a:lnRef>
+              <a:fillRef idx="1">
+                <a:schemeClr val="accent1"/>
+              </a:fillRef>
+              <a:effectRef idx="0">
+                <a:schemeClr val="accent1"/>
+              </a:effectRef>
+              <a:fontRef idx="minor">
+                <a:schemeClr val="lt1"/>
+              </a:fontRef>
+            </p:style>
+            <p:txBody>
+              <a:bodyPr rtlCol="0" anchor="ctr"/>
+              <a:lstStyle/>
+              <a:p>
+                <a:pPr algn="ctr"/>
+                <a:r>
+                  <a:rPr lang="en-US" altLang="ko-KR" sz="1200" dirty="0">
+                    <a:solidFill>
+                      <a:schemeClr val="tx1"/>
+                    </a:solidFill>
+                  </a:rPr>
+                  <a:t>R</a:t>
+                </a:r>
+                <a:endParaRPr lang="ko-KR" altLang="en-US" sz="1200" dirty="0">
+                  <a:solidFill>
+                    <a:schemeClr val="tx1"/>
+                  </a:solidFill>
+                </a:endParaRPr>
+              </a:p>
+            </p:txBody>
+          </p:sp>
+          <p:sp>
+            <p:nvSpPr>
+              <p:cNvPr id="19" name="직사각형 18"/>
+              <p:cNvSpPr/>
+              <p:nvPr/>
+            </p:nvSpPr>
+            <p:spPr>
+              <a:xfrm>
+                <a:off x="2521164" y="1120236"/>
+                <a:ext cx="1896456" cy="1119826"/>
+              </a:xfrm>
+              <a:prstGeom prst="rect">
+                <a:avLst/>
+              </a:prstGeom>
+              <a:noFill/>
+            </p:spPr>
+            <p:style>
+              <a:lnRef idx="2">
+                <a:schemeClr val="accent1">
+                  <a:shade val="50000"/>
+                </a:schemeClr>
+              </a:lnRef>
+              <a:fillRef idx="1">
+                <a:schemeClr val="accent1"/>
+              </a:fillRef>
+              <a:effectRef idx="0">
+                <a:schemeClr val="accent1"/>
+              </a:effectRef>
+              <a:fontRef idx="minor">
+                <a:schemeClr val="lt1"/>
+              </a:fontRef>
+            </p:style>
+            <p:txBody>
+              <a:bodyPr rtlCol="0" anchor="ctr"/>
+              <a:lstStyle/>
+              <a:p>
+                <a:pPr algn="ctr"/>
+                <a:endParaRPr lang="ko-KR" altLang="en-US" sz="1200" dirty="0">
+                  <a:solidFill>
+                    <a:schemeClr val="tx1"/>
+                  </a:solidFill>
+                </a:endParaRPr>
+              </a:p>
+            </p:txBody>
+          </p:sp>
+        </p:grpSp>
+        <p:sp>
+          <p:nvSpPr>
+            <p:cNvPr id="16" name="직사각형 15"/>
+            <p:cNvSpPr/>
+            <p:nvPr/>
+          </p:nvSpPr>
+          <p:spPr>
+            <a:xfrm>
+              <a:off x="4883246" y="737831"/>
+              <a:ext cx="1270660" cy="824264"/>
+            </a:xfrm>
+            <a:prstGeom prst="rect">
+              <a:avLst/>
+            </a:prstGeom>
+            <a:noFill/>
+          </p:spPr>
+          <p:style>
+            <a:lnRef idx="2">
+              <a:schemeClr val="accent1">
+                <a:shade val="50000"/>
+              </a:schemeClr>
+            </a:lnRef>
+            <a:fillRef idx="1">
+              <a:schemeClr val="accent1"/>
+            </a:fillRef>
+            <a:effectRef idx="0">
+              <a:schemeClr val="accent1"/>
+            </a:effectRef>
+            <a:fontRef idx="minor">
+              <a:schemeClr val="lt1"/>
+            </a:fontRef>
+          </p:style>
+          <p:txBody>
+            <a:bodyPr rtlCol="0" anchor="ctr"/>
+            <a:lstStyle/>
+            <a:p>
+              <a:pPr algn="ctr"/>
+              <a:r>
+                <a:rPr lang="en-US" altLang="ko-KR" sz="1200" dirty="0" smtClean="0">
+                  <a:solidFill>
+                    <a:schemeClr val="tx1"/>
+                  </a:solidFill>
+                </a:rPr>
+                <a:t>Router</a:t>
+              </a:r>
+            </a:p>
+            <a:p>
+              <a:pPr algn="ctr"/>
+              <a:r>
+                <a:rPr lang="en-US" altLang="ko-KR" sz="1200" dirty="0" smtClean="0">
+                  <a:solidFill>
+                    <a:schemeClr val="tx1"/>
+                  </a:solidFill>
+                </a:rPr>
+                <a:t>Table</a:t>
+              </a:r>
+              <a:endParaRPr lang="ko-KR" altLang="en-US" sz="1200" dirty="0">
+                <a:solidFill>
+                  <a:schemeClr val="tx1"/>
+                </a:solidFill>
+              </a:endParaRPr>
+            </a:p>
+          </p:txBody>
+        </p:sp>
+      </p:grpSp>
+    </p:spTree>
+    <p:extLst>
+      <p:ext uri="{BB962C8B-B14F-4D97-AF65-F5344CB8AC3E}">
+        <p14:creationId xmlns:p14="http://schemas.microsoft.com/office/powerpoint/2010/main" val="230542954"/>
       </p:ext>
     </p:extLst>
   </p:cSld>
@@ -15773,7 +16757,7 @@
   <a:extraClrSchemeLst/>
   <a:extLst>
     <a:ext uri="{05A4C25C-085E-4340-85A3-A5531E510DB2}">
-      <thm15:themeFamily xmlns:thm15="http://schemas.microsoft.com/office/thememl/2012/main" name="Office Theme" id="{62F939B6-93AF-4DB8-9C6B-D6C7DFDC589F}" vid="{4A3C46E8-61CC-4603-A589-7422A47A8E4A}"/>
+      <thm15:themeFamily xmlns="" xmlns:thm15="http://schemas.microsoft.com/office/thememl/2012/main" name="Office Theme" id="{62F939B6-93AF-4DB8-9C6B-D6C7DFDC589F}" vid="{4A3C46E8-61CC-4603-A589-7422A47A8E4A}"/>
     </a:ext>
   </a:extLst>
 </a:theme>

</xml_diff>

<commit_message>
ss Signed-off-by: YooSeongHyun <wtnghw@naver.com>
</commit_message>
<xml_diff>
--- a/flow.pptx
+++ b/flow.pptx
@@ -112,7 +112,18 @@
   </p:defaultTextStyle>
   <p:extLst>
     <p:ext uri="{EFAFB233-063F-42B5-8137-9DF3F51BA10A}">
-      <p15:sldGuideLst xmlns="" xmlns:p15="http://schemas.microsoft.com/office/powerpoint/2012/main"/>
+      <p15:sldGuideLst xmlns:p15="http://schemas.microsoft.com/office/powerpoint/2012/main">
+        <p15:guide id="1" orient="horz" pos="2160">
+          <p15:clr>
+            <a:srgbClr val="A4A3A4"/>
+          </p15:clr>
+        </p15:guide>
+        <p15:guide id="2" pos="3840">
+          <p15:clr>
+            <a:srgbClr val="A4A3A4"/>
+          </p15:clr>
+        </p15:guide>
+      </p15:sldGuideLst>
     </p:ext>
   </p:extLst>
 </p:presentation>
@@ -257,7 +268,7 @@
           <a:p>
             <a:fld id="{1B541D74-F2E1-4D1F-86F4-0EB70622BA76}" type="datetimeFigureOut">
               <a:rPr lang="ko-KR" altLang="en-US" smtClean="0"/>
-              <a:t>2015-09-30</a:t>
+              <a:t>2015-10-01</a:t>
             </a:fld>
             <a:endParaRPr lang="ko-KR" altLang="en-US"/>
           </a:p>
@@ -427,7 +438,7 @@
           <a:p>
             <a:fld id="{1B541D74-F2E1-4D1F-86F4-0EB70622BA76}" type="datetimeFigureOut">
               <a:rPr lang="ko-KR" altLang="en-US" smtClean="0"/>
-              <a:t>2015-09-30</a:t>
+              <a:t>2015-10-01</a:t>
             </a:fld>
             <a:endParaRPr lang="ko-KR" altLang="en-US"/>
           </a:p>
@@ -607,7 +618,7 @@
           <a:p>
             <a:fld id="{1B541D74-F2E1-4D1F-86F4-0EB70622BA76}" type="datetimeFigureOut">
               <a:rPr lang="ko-KR" altLang="en-US" smtClean="0"/>
-              <a:t>2015-09-30</a:t>
+              <a:t>2015-10-01</a:t>
             </a:fld>
             <a:endParaRPr lang="ko-KR" altLang="en-US"/>
           </a:p>
@@ -777,7 +788,7 @@
           <a:p>
             <a:fld id="{1B541D74-F2E1-4D1F-86F4-0EB70622BA76}" type="datetimeFigureOut">
               <a:rPr lang="ko-KR" altLang="en-US" smtClean="0"/>
-              <a:t>2015-09-30</a:t>
+              <a:t>2015-10-01</a:t>
             </a:fld>
             <a:endParaRPr lang="ko-KR" altLang="en-US"/>
           </a:p>
@@ -1023,7 +1034,7 @@
           <a:p>
             <a:fld id="{1B541D74-F2E1-4D1F-86F4-0EB70622BA76}" type="datetimeFigureOut">
               <a:rPr lang="ko-KR" altLang="en-US" smtClean="0"/>
-              <a:t>2015-09-30</a:t>
+              <a:t>2015-10-01</a:t>
             </a:fld>
             <a:endParaRPr lang="ko-KR" altLang="en-US"/>
           </a:p>
@@ -1255,7 +1266,7 @@
           <a:p>
             <a:fld id="{1B541D74-F2E1-4D1F-86F4-0EB70622BA76}" type="datetimeFigureOut">
               <a:rPr lang="ko-KR" altLang="en-US" smtClean="0"/>
-              <a:t>2015-09-30</a:t>
+              <a:t>2015-10-01</a:t>
             </a:fld>
             <a:endParaRPr lang="ko-KR" altLang="en-US"/>
           </a:p>
@@ -1622,7 +1633,7 @@
           <a:p>
             <a:fld id="{1B541D74-F2E1-4D1F-86F4-0EB70622BA76}" type="datetimeFigureOut">
               <a:rPr lang="ko-KR" altLang="en-US" smtClean="0"/>
-              <a:t>2015-09-30</a:t>
+              <a:t>2015-10-01</a:t>
             </a:fld>
             <a:endParaRPr lang="ko-KR" altLang="en-US"/>
           </a:p>
@@ -1740,7 +1751,7 @@
           <a:p>
             <a:fld id="{1B541D74-F2E1-4D1F-86F4-0EB70622BA76}" type="datetimeFigureOut">
               <a:rPr lang="ko-KR" altLang="en-US" smtClean="0"/>
-              <a:t>2015-09-30</a:t>
+              <a:t>2015-10-01</a:t>
             </a:fld>
             <a:endParaRPr lang="ko-KR" altLang="en-US"/>
           </a:p>
@@ -1835,7 +1846,7 @@
           <a:p>
             <a:fld id="{1B541D74-F2E1-4D1F-86F4-0EB70622BA76}" type="datetimeFigureOut">
               <a:rPr lang="ko-KR" altLang="en-US" smtClean="0"/>
-              <a:t>2015-09-30</a:t>
+              <a:t>2015-10-01</a:t>
             </a:fld>
             <a:endParaRPr lang="ko-KR" altLang="en-US"/>
           </a:p>
@@ -2112,7 +2123,7 @@
           <a:p>
             <a:fld id="{1B541D74-F2E1-4D1F-86F4-0EB70622BA76}" type="datetimeFigureOut">
               <a:rPr lang="ko-KR" altLang="en-US" smtClean="0"/>
-              <a:t>2015-09-30</a:t>
+              <a:t>2015-10-01</a:t>
             </a:fld>
             <a:endParaRPr lang="ko-KR" altLang="en-US"/>
           </a:p>
@@ -2365,7 +2376,7 @@
           <a:p>
             <a:fld id="{1B541D74-F2E1-4D1F-86F4-0EB70622BA76}" type="datetimeFigureOut">
               <a:rPr lang="ko-KR" altLang="en-US" smtClean="0"/>
-              <a:t>2015-09-30</a:t>
+              <a:t>2015-10-01</a:t>
             </a:fld>
             <a:endParaRPr lang="ko-KR" altLang="en-US"/>
           </a:p>
@@ -2578,7 +2589,7 @@
           <a:p>
             <a:fld id="{1B541D74-F2E1-4D1F-86F4-0EB70622BA76}" type="datetimeFigureOut">
               <a:rPr lang="ko-KR" altLang="en-US" smtClean="0"/>
-              <a:t>2015-09-30</a:t>
+              <a:t>2015-10-01</a:t>
             </a:fld>
             <a:endParaRPr lang="ko-KR" altLang="en-US"/>
           </a:p>
@@ -16064,7 +16075,7 @@
         </p:nvGrpSpPr>
         <p:grpSpPr>
           <a:xfrm>
-            <a:off x="4647656" y="321340"/>
+            <a:off x="5481700" y="954621"/>
             <a:ext cx="1318162" cy="1214238"/>
             <a:chOff x="4578893" y="214412"/>
             <a:chExt cx="1896457" cy="2045198"/>
@@ -16279,7 +16290,7 @@
                     <a:schemeClr val="tx1"/>
                   </a:solidFill>
                 </a:rPr>
-                <a:t>Socket</a:t>
+                <a:t>A Socket</a:t>
               </a:r>
               <a:endParaRPr lang="ko-KR" altLang="en-US" sz="1200" dirty="0">
                 <a:solidFill>
@@ -16298,8 +16309,8 @@
         </p:nvGrpSpPr>
         <p:grpSpPr>
           <a:xfrm>
-            <a:off x="1536762" y="1865671"/>
-            <a:ext cx="1318162" cy="782527"/>
+            <a:off x="2289020" y="3010381"/>
+            <a:ext cx="1318162" cy="923620"/>
             <a:chOff x="4578893" y="214412"/>
             <a:chExt cx="1896457" cy="1482683"/>
           </a:xfrm>
@@ -16482,6 +16493,1470 @@
           </p:txBody>
         </p:sp>
       </p:grpSp>
+      <p:grpSp>
+        <p:nvGrpSpPr>
+          <p:cNvPr id="17" name="그룹 16"/>
+          <p:cNvGrpSpPr/>
+          <p:nvPr/>
+        </p:nvGrpSpPr>
+        <p:grpSpPr>
+          <a:xfrm>
+            <a:off x="8798367" y="3010650"/>
+            <a:ext cx="1486444" cy="1214238"/>
+            <a:chOff x="4578893" y="214412"/>
+            <a:chExt cx="1896457" cy="2045198"/>
+          </a:xfrm>
+        </p:grpSpPr>
+        <p:grpSp>
+          <p:nvGrpSpPr>
+            <p:cNvPr id="20" name="그룹 19"/>
+            <p:cNvGrpSpPr/>
+            <p:nvPr/>
+          </p:nvGrpSpPr>
+          <p:grpSpPr>
+            <a:xfrm>
+              <a:off x="4578893" y="214412"/>
+              <a:ext cx="1896457" cy="2045198"/>
+              <a:chOff x="2521163" y="757379"/>
+              <a:chExt cx="1896457" cy="2045198"/>
+            </a:xfrm>
+          </p:grpSpPr>
+          <p:sp>
+            <p:nvSpPr>
+              <p:cNvPr id="23" name="직사각형 22"/>
+              <p:cNvSpPr/>
+              <p:nvPr/>
+            </p:nvSpPr>
+            <p:spPr>
+              <a:xfrm>
+                <a:off x="2521163" y="757379"/>
+                <a:ext cx="1896457" cy="362857"/>
+              </a:xfrm>
+              <a:prstGeom prst="rect">
+                <a:avLst/>
+              </a:prstGeom>
+              <a:noFill/>
+            </p:spPr>
+            <p:style>
+              <a:lnRef idx="2">
+                <a:schemeClr val="accent1">
+                  <a:shade val="50000"/>
+                </a:schemeClr>
+              </a:lnRef>
+              <a:fillRef idx="1">
+                <a:schemeClr val="accent1"/>
+              </a:fillRef>
+              <a:effectRef idx="0">
+                <a:schemeClr val="accent1"/>
+              </a:effectRef>
+              <a:fontRef idx="minor">
+                <a:schemeClr val="lt1"/>
+              </a:fontRef>
+            </p:style>
+            <p:txBody>
+              <a:bodyPr rtlCol="0" anchor="ctr"/>
+              <a:lstStyle/>
+              <a:p>
+                <a:pPr algn="ctr"/>
+                <a:r>
+                  <a:rPr lang="en-US" altLang="ko-KR" sz="1200" dirty="0" smtClean="0">
+                    <a:solidFill>
+                      <a:schemeClr val="tx1"/>
+                    </a:solidFill>
+                  </a:rPr>
+                  <a:t>S</a:t>
+                </a:r>
+                <a:endParaRPr lang="ko-KR" altLang="en-US" sz="1200" dirty="0">
+                  <a:solidFill>
+                    <a:schemeClr val="tx1"/>
+                  </a:solidFill>
+                </a:endParaRPr>
+              </a:p>
+            </p:txBody>
+          </p:sp>
+          <p:sp>
+            <p:nvSpPr>
+              <p:cNvPr id="24" name="직사각형 23"/>
+              <p:cNvSpPr/>
+              <p:nvPr/>
+            </p:nvSpPr>
+            <p:spPr>
+              <a:xfrm>
+                <a:off x="2521165" y="1120236"/>
+                <a:ext cx="1896455" cy="1682341"/>
+              </a:xfrm>
+              <a:prstGeom prst="rect">
+                <a:avLst/>
+              </a:prstGeom>
+              <a:noFill/>
+            </p:spPr>
+            <p:style>
+              <a:lnRef idx="2">
+                <a:schemeClr val="accent1">
+                  <a:shade val="50000"/>
+                </a:schemeClr>
+              </a:lnRef>
+              <a:fillRef idx="1">
+                <a:schemeClr val="accent1"/>
+              </a:fillRef>
+              <a:effectRef idx="0">
+                <a:schemeClr val="accent1"/>
+              </a:effectRef>
+              <a:fontRef idx="minor">
+                <a:schemeClr val="lt1"/>
+              </a:fontRef>
+            </p:style>
+            <p:txBody>
+              <a:bodyPr rtlCol="0" anchor="ctr"/>
+              <a:lstStyle/>
+              <a:p>
+                <a:pPr algn="ctr"/>
+                <a:endParaRPr lang="ko-KR" altLang="en-US" sz="1200" dirty="0">
+                  <a:solidFill>
+                    <a:schemeClr val="tx1"/>
+                  </a:solidFill>
+                </a:endParaRPr>
+              </a:p>
+            </p:txBody>
+          </p:sp>
+        </p:grpSp>
+        <p:sp>
+          <p:nvSpPr>
+            <p:cNvPr id="21" name="직사각형 20"/>
+            <p:cNvSpPr/>
+            <p:nvPr/>
+          </p:nvSpPr>
+          <p:spPr>
+            <a:xfrm>
+              <a:off x="4883244" y="872832"/>
+              <a:ext cx="1286064" cy="361892"/>
+            </a:xfrm>
+            <a:prstGeom prst="rect">
+              <a:avLst/>
+            </a:prstGeom>
+            <a:noFill/>
+          </p:spPr>
+          <p:style>
+            <a:lnRef idx="2">
+              <a:schemeClr val="accent1">
+                <a:shade val="50000"/>
+              </a:schemeClr>
+            </a:lnRef>
+            <a:fillRef idx="1">
+              <a:schemeClr val="accent1"/>
+            </a:fillRef>
+            <a:effectRef idx="0">
+              <a:schemeClr val="accent1"/>
+            </a:effectRef>
+            <a:fontRef idx="minor">
+              <a:schemeClr val="lt1"/>
+            </a:fontRef>
+          </p:style>
+          <p:txBody>
+            <a:bodyPr rtlCol="0" anchor="ctr"/>
+            <a:lstStyle/>
+            <a:p>
+              <a:pPr algn="ctr"/>
+              <a:r>
+                <a:rPr lang="en-US" altLang="ko-KR" sz="1200" dirty="0" smtClean="0">
+                  <a:solidFill>
+                    <a:schemeClr val="tx1"/>
+                  </a:solidFill>
+                </a:rPr>
+                <a:t>A&amp;S Socket</a:t>
+              </a:r>
+              <a:endParaRPr lang="ko-KR" altLang="en-US" sz="1200" dirty="0">
+                <a:solidFill>
+                  <a:schemeClr val="tx1"/>
+                </a:solidFill>
+              </a:endParaRPr>
+            </a:p>
+          </p:txBody>
+        </p:sp>
+        <p:sp>
+          <p:nvSpPr>
+            <p:cNvPr id="22" name="직사각형 21"/>
+            <p:cNvSpPr/>
+            <p:nvPr/>
+          </p:nvSpPr>
+          <p:spPr>
+            <a:xfrm>
+              <a:off x="4883246" y="1619260"/>
+              <a:ext cx="1270660" cy="362857"/>
+            </a:xfrm>
+            <a:prstGeom prst="rect">
+              <a:avLst/>
+            </a:prstGeom>
+            <a:noFill/>
+          </p:spPr>
+          <p:style>
+            <a:lnRef idx="2">
+              <a:schemeClr val="accent1">
+                <a:shade val="50000"/>
+              </a:schemeClr>
+            </a:lnRef>
+            <a:fillRef idx="1">
+              <a:schemeClr val="accent1"/>
+            </a:fillRef>
+            <a:effectRef idx="0">
+              <a:schemeClr val="accent1"/>
+            </a:effectRef>
+            <a:fontRef idx="minor">
+              <a:schemeClr val="lt1"/>
+            </a:fontRef>
+          </p:style>
+          <p:txBody>
+            <a:bodyPr rtlCol="0" anchor="ctr"/>
+            <a:lstStyle/>
+            <a:p>
+              <a:pPr algn="ctr"/>
+              <a:r>
+                <a:rPr lang="en-US" altLang="ko-KR" sz="1200" dirty="0" smtClean="0">
+                  <a:solidFill>
+                    <a:schemeClr val="tx1"/>
+                  </a:solidFill>
+                </a:rPr>
+                <a:t>S&amp;C Socket</a:t>
+              </a:r>
+              <a:endParaRPr lang="ko-KR" altLang="en-US" sz="1200" dirty="0">
+                <a:solidFill>
+                  <a:schemeClr val="tx1"/>
+                </a:solidFill>
+              </a:endParaRPr>
+            </a:p>
+          </p:txBody>
+        </p:sp>
+      </p:grpSp>
+      <p:grpSp>
+        <p:nvGrpSpPr>
+          <p:cNvPr id="25" name="그룹 24"/>
+          <p:cNvGrpSpPr/>
+          <p:nvPr/>
+        </p:nvGrpSpPr>
+        <p:grpSpPr>
+          <a:xfrm>
+            <a:off x="4303495" y="3013814"/>
+            <a:ext cx="1551125" cy="1214238"/>
+            <a:chOff x="4578893" y="214412"/>
+            <a:chExt cx="1896457" cy="2045198"/>
+          </a:xfrm>
+        </p:grpSpPr>
+        <p:grpSp>
+          <p:nvGrpSpPr>
+            <p:cNvPr id="26" name="그룹 25"/>
+            <p:cNvGrpSpPr/>
+            <p:nvPr/>
+          </p:nvGrpSpPr>
+          <p:grpSpPr>
+            <a:xfrm>
+              <a:off x="4578893" y="214412"/>
+              <a:ext cx="1896457" cy="2045198"/>
+              <a:chOff x="2521163" y="757379"/>
+              <a:chExt cx="1896457" cy="2045198"/>
+            </a:xfrm>
+          </p:grpSpPr>
+          <p:sp>
+            <p:nvSpPr>
+              <p:cNvPr id="29" name="직사각형 28"/>
+              <p:cNvSpPr/>
+              <p:nvPr/>
+            </p:nvSpPr>
+            <p:spPr>
+              <a:xfrm>
+                <a:off x="2521163" y="757379"/>
+                <a:ext cx="1896457" cy="362857"/>
+              </a:xfrm>
+              <a:prstGeom prst="rect">
+                <a:avLst/>
+              </a:prstGeom>
+              <a:noFill/>
+            </p:spPr>
+            <p:style>
+              <a:lnRef idx="2">
+                <a:schemeClr val="accent1">
+                  <a:shade val="50000"/>
+                </a:schemeClr>
+              </a:lnRef>
+              <a:fillRef idx="1">
+                <a:schemeClr val="accent1"/>
+              </a:fillRef>
+              <a:effectRef idx="0">
+                <a:schemeClr val="accent1"/>
+              </a:effectRef>
+              <a:fontRef idx="minor">
+                <a:schemeClr val="lt1"/>
+              </a:fontRef>
+            </p:style>
+            <p:txBody>
+              <a:bodyPr rtlCol="0" anchor="ctr"/>
+              <a:lstStyle/>
+              <a:p>
+                <a:pPr algn="ctr"/>
+                <a:r>
+                  <a:rPr lang="en-US" altLang="ko-KR" sz="1200" dirty="0" smtClean="0">
+                    <a:solidFill>
+                      <a:schemeClr val="tx1"/>
+                    </a:solidFill>
+                  </a:rPr>
+                  <a:t>B</a:t>
+                </a:r>
+                <a:endParaRPr lang="ko-KR" altLang="en-US" sz="1200" dirty="0">
+                  <a:solidFill>
+                    <a:schemeClr val="tx1"/>
+                  </a:solidFill>
+                </a:endParaRPr>
+              </a:p>
+            </p:txBody>
+          </p:sp>
+          <p:sp>
+            <p:nvSpPr>
+              <p:cNvPr id="30" name="직사각형 29"/>
+              <p:cNvSpPr/>
+              <p:nvPr/>
+            </p:nvSpPr>
+            <p:spPr>
+              <a:xfrm>
+                <a:off x="2521165" y="1120236"/>
+                <a:ext cx="1896455" cy="1682341"/>
+              </a:xfrm>
+              <a:prstGeom prst="rect">
+                <a:avLst/>
+              </a:prstGeom>
+              <a:noFill/>
+            </p:spPr>
+            <p:style>
+              <a:lnRef idx="2">
+                <a:schemeClr val="accent1">
+                  <a:shade val="50000"/>
+                </a:schemeClr>
+              </a:lnRef>
+              <a:fillRef idx="1">
+                <a:schemeClr val="accent1"/>
+              </a:fillRef>
+              <a:effectRef idx="0">
+                <a:schemeClr val="accent1"/>
+              </a:effectRef>
+              <a:fontRef idx="minor">
+                <a:schemeClr val="lt1"/>
+              </a:fontRef>
+            </p:style>
+            <p:txBody>
+              <a:bodyPr rtlCol="0" anchor="ctr"/>
+              <a:lstStyle/>
+              <a:p>
+                <a:pPr algn="ctr"/>
+                <a:endParaRPr lang="ko-KR" altLang="en-US" sz="1200" dirty="0">
+                  <a:solidFill>
+                    <a:schemeClr val="tx1"/>
+                  </a:solidFill>
+                </a:endParaRPr>
+              </a:p>
+            </p:txBody>
+          </p:sp>
+        </p:grpSp>
+        <p:sp>
+          <p:nvSpPr>
+            <p:cNvPr id="27" name="직사각형 26"/>
+            <p:cNvSpPr/>
+            <p:nvPr/>
+          </p:nvSpPr>
+          <p:spPr>
+            <a:xfrm>
+              <a:off x="4883244" y="872832"/>
+              <a:ext cx="1286064" cy="361892"/>
+            </a:xfrm>
+            <a:prstGeom prst="rect">
+              <a:avLst/>
+            </a:prstGeom>
+            <a:noFill/>
+          </p:spPr>
+          <p:style>
+            <a:lnRef idx="2">
+              <a:schemeClr val="accent1">
+                <a:shade val="50000"/>
+              </a:schemeClr>
+            </a:lnRef>
+            <a:fillRef idx="1">
+              <a:schemeClr val="accent1"/>
+            </a:fillRef>
+            <a:effectRef idx="0">
+              <a:schemeClr val="accent1"/>
+            </a:effectRef>
+            <a:fontRef idx="minor">
+              <a:schemeClr val="lt1"/>
+            </a:fontRef>
+          </p:style>
+          <p:txBody>
+            <a:bodyPr rtlCol="0" anchor="ctr"/>
+            <a:lstStyle/>
+            <a:p>
+              <a:pPr algn="ctr"/>
+              <a:r>
+                <a:rPr lang="en-US" altLang="ko-KR" sz="1200" dirty="0" smtClean="0">
+                  <a:solidFill>
+                    <a:schemeClr val="tx1"/>
+                  </a:solidFill>
+                </a:rPr>
+                <a:t>A&amp;B Socket</a:t>
+              </a:r>
+              <a:endParaRPr lang="ko-KR" altLang="en-US" sz="1200" dirty="0">
+                <a:solidFill>
+                  <a:schemeClr val="tx1"/>
+                </a:solidFill>
+              </a:endParaRPr>
+            </a:p>
+          </p:txBody>
+        </p:sp>
+        <p:sp>
+          <p:nvSpPr>
+            <p:cNvPr id="28" name="직사각형 27"/>
+            <p:cNvSpPr/>
+            <p:nvPr/>
+          </p:nvSpPr>
+          <p:spPr>
+            <a:xfrm>
+              <a:off x="4883246" y="1619260"/>
+              <a:ext cx="1270660" cy="362857"/>
+            </a:xfrm>
+            <a:prstGeom prst="rect">
+              <a:avLst/>
+            </a:prstGeom>
+            <a:noFill/>
+          </p:spPr>
+          <p:style>
+            <a:lnRef idx="2">
+              <a:schemeClr val="accent1">
+                <a:shade val="50000"/>
+              </a:schemeClr>
+            </a:lnRef>
+            <a:fillRef idx="1">
+              <a:schemeClr val="accent1"/>
+            </a:fillRef>
+            <a:effectRef idx="0">
+              <a:schemeClr val="accent1"/>
+            </a:effectRef>
+            <a:fontRef idx="minor">
+              <a:schemeClr val="lt1"/>
+            </a:fontRef>
+          </p:style>
+          <p:txBody>
+            <a:bodyPr rtlCol="0" anchor="ctr"/>
+            <a:lstStyle/>
+            <a:p>
+              <a:pPr algn="ctr"/>
+              <a:r>
+                <a:rPr lang="en-US" altLang="ko-KR" sz="1200" dirty="0">
+                  <a:solidFill>
+                    <a:schemeClr val="tx1"/>
+                  </a:solidFill>
+                </a:rPr>
+                <a:t>B</a:t>
+              </a:r>
+              <a:r>
+                <a:rPr lang="en-US" altLang="ko-KR" sz="1200" dirty="0" smtClean="0">
+                  <a:solidFill>
+                    <a:schemeClr val="tx1"/>
+                  </a:solidFill>
+                </a:rPr>
+                <a:t>&amp;C Socket</a:t>
+              </a:r>
+              <a:endParaRPr lang="ko-KR" altLang="en-US" sz="1200" dirty="0">
+                <a:solidFill>
+                  <a:schemeClr val="tx1"/>
+                </a:solidFill>
+              </a:endParaRPr>
+            </a:p>
+          </p:txBody>
+        </p:sp>
+      </p:grpSp>
+      <p:grpSp>
+        <p:nvGrpSpPr>
+          <p:cNvPr id="31" name="그룹 30"/>
+          <p:cNvGrpSpPr/>
+          <p:nvPr/>
+        </p:nvGrpSpPr>
+        <p:grpSpPr>
+          <a:xfrm>
+            <a:off x="6660422" y="4844709"/>
+            <a:ext cx="1318162" cy="764400"/>
+            <a:chOff x="4578893" y="214412"/>
+            <a:chExt cx="1896457" cy="1227088"/>
+          </a:xfrm>
+        </p:grpSpPr>
+        <p:grpSp>
+          <p:nvGrpSpPr>
+            <p:cNvPr id="32" name="그룹 31"/>
+            <p:cNvGrpSpPr/>
+            <p:nvPr/>
+          </p:nvGrpSpPr>
+          <p:grpSpPr>
+            <a:xfrm>
+              <a:off x="4578893" y="214412"/>
+              <a:ext cx="1896457" cy="1227088"/>
+              <a:chOff x="2521163" y="757379"/>
+              <a:chExt cx="1896457" cy="1227088"/>
+            </a:xfrm>
+          </p:grpSpPr>
+          <p:sp>
+            <p:nvSpPr>
+              <p:cNvPr id="34" name="직사각형 33"/>
+              <p:cNvSpPr/>
+              <p:nvPr/>
+            </p:nvSpPr>
+            <p:spPr>
+              <a:xfrm>
+                <a:off x="2521163" y="757379"/>
+                <a:ext cx="1896457" cy="362857"/>
+              </a:xfrm>
+              <a:prstGeom prst="rect">
+                <a:avLst/>
+              </a:prstGeom>
+              <a:noFill/>
+            </p:spPr>
+            <p:style>
+              <a:lnRef idx="2">
+                <a:schemeClr val="accent1">
+                  <a:shade val="50000"/>
+                </a:schemeClr>
+              </a:lnRef>
+              <a:fillRef idx="1">
+                <a:schemeClr val="accent1"/>
+              </a:fillRef>
+              <a:effectRef idx="0">
+                <a:schemeClr val="accent1"/>
+              </a:effectRef>
+              <a:fontRef idx="minor">
+                <a:schemeClr val="lt1"/>
+              </a:fontRef>
+            </p:style>
+            <p:txBody>
+              <a:bodyPr rtlCol="0" anchor="ctr"/>
+              <a:lstStyle/>
+              <a:p>
+                <a:pPr algn="ctr"/>
+                <a:r>
+                  <a:rPr lang="en-US" altLang="ko-KR" sz="1200" dirty="0" smtClean="0">
+                    <a:solidFill>
+                      <a:schemeClr val="tx1"/>
+                    </a:solidFill>
+                  </a:rPr>
+                  <a:t>C`</a:t>
+                </a:r>
+                <a:endParaRPr lang="ko-KR" altLang="en-US" sz="1200" dirty="0">
+                  <a:solidFill>
+                    <a:schemeClr val="tx1"/>
+                  </a:solidFill>
+                </a:endParaRPr>
+              </a:p>
+            </p:txBody>
+          </p:sp>
+          <p:sp>
+            <p:nvSpPr>
+              <p:cNvPr id="35" name="직사각형 34"/>
+              <p:cNvSpPr/>
+              <p:nvPr/>
+            </p:nvSpPr>
+            <p:spPr>
+              <a:xfrm>
+                <a:off x="2521164" y="1120237"/>
+                <a:ext cx="1896456" cy="864230"/>
+              </a:xfrm>
+              <a:prstGeom prst="rect">
+                <a:avLst/>
+              </a:prstGeom>
+              <a:noFill/>
+            </p:spPr>
+            <p:style>
+              <a:lnRef idx="2">
+                <a:schemeClr val="accent1">
+                  <a:shade val="50000"/>
+                </a:schemeClr>
+              </a:lnRef>
+              <a:fillRef idx="1">
+                <a:schemeClr val="accent1"/>
+              </a:fillRef>
+              <a:effectRef idx="0">
+                <a:schemeClr val="accent1"/>
+              </a:effectRef>
+              <a:fontRef idx="minor">
+                <a:schemeClr val="lt1"/>
+              </a:fontRef>
+            </p:style>
+            <p:txBody>
+              <a:bodyPr rtlCol="0" anchor="ctr"/>
+              <a:lstStyle/>
+              <a:p>
+                <a:pPr algn="ctr"/>
+                <a:endParaRPr lang="ko-KR" altLang="en-US" sz="1200" dirty="0">
+                  <a:solidFill>
+                    <a:schemeClr val="tx1"/>
+                  </a:solidFill>
+                </a:endParaRPr>
+              </a:p>
+            </p:txBody>
+          </p:sp>
+        </p:grpSp>
+        <p:sp>
+          <p:nvSpPr>
+            <p:cNvPr id="33" name="직사각형 32"/>
+            <p:cNvSpPr/>
+            <p:nvPr/>
+          </p:nvSpPr>
+          <p:spPr>
+            <a:xfrm>
+              <a:off x="4883246" y="778606"/>
+              <a:ext cx="1270660" cy="469392"/>
+            </a:xfrm>
+            <a:prstGeom prst="rect">
+              <a:avLst/>
+            </a:prstGeom>
+            <a:noFill/>
+          </p:spPr>
+          <p:style>
+            <a:lnRef idx="2">
+              <a:schemeClr val="accent1">
+                <a:shade val="50000"/>
+              </a:schemeClr>
+            </a:lnRef>
+            <a:fillRef idx="1">
+              <a:schemeClr val="accent1"/>
+            </a:fillRef>
+            <a:effectRef idx="0">
+              <a:schemeClr val="accent1"/>
+            </a:effectRef>
+            <a:fontRef idx="minor">
+              <a:schemeClr val="lt1"/>
+            </a:fontRef>
+          </p:style>
+          <p:txBody>
+            <a:bodyPr rtlCol="0" anchor="ctr"/>
+            <a:lstStyle/>
+            <a:p>
+              <a:pPr algn="ctr"/>
+              <a:r>
+                <a:rPr lang="en-US" altLang="ko-KR" sz="1200" dirty="0" smtClean="0">
+                  <a:solidFill>
+                    <a:schemeClr val="tx1"/>
+                  </a:solidFill>
+                </a:rPr>
+                <a:t>Client</a:t>
+              </a:r>
+              <a:endParaRPr lang="ko-KR" altLang="en-US" sz="1200" dirty="0">
+                <a:solidFill>
+                  <a:schemeClr val="tx1"/>
+                </a:solidFill>
+              </a:endParaRPr>
+            </a:p>
+          </p:txBody>
+        </p:sp>
+      </p:grpSp>
+      <p:grpSp>
+        <p:nvGrpSpPr>
+          <p:cNvPr id="42" name="그룹 41"/>
+          <p:cNvGrpSpPr/>
+          <p:nvPr/>
+        </p:nvGrpSpPr>
+        <p:grpSpPr>
+          <a:xfrm>
+            <a:off x="6550931" y="3012456"/>
+            <a:ext cx="1551125" cy="1214238"/>
+            <a:chOff x="4578893" y="214412"/>
+            <a:chExt cx="1896457" cy="2045198"/>
+          </a:xfrm>
+        </p:grpSpPr>
+        <p:grpSp>
+          <p:nvGrpSpPr>
+            <p:cNvPr id="43" name="그룹 42"/>
+            <p:cNvGrpSpPr/>
+            <p:nvPr/>
+          </p:nvGrpSpPr>
+          <p:grpSpPr>
+            <a:xfrm>
+              <a:off x="4578893" y="214412"/>
+              <a:ext cx="1896457" cy="2045198"/>
+              <a:chOff x="2521163" y="757379"/>
+              <a:chExt cx="1896457" cy="2045198"/>
+            </a:xfrm>
+          </p:grpSpPr>
+          <p:sp>
+            <p:nvSpPr>
+              <p:cNvPr id="46" name="직사각형 45"/>
+              <p:cNvSpPr/>
+              <p:nvPr/>
+            </p:nvSpPr>
+            <p:spPr>
+              <a:xfrm>
+                <a:off x="2521163" y="757379"/>
+                <a:ext cx="1896457" cy="362857"/>
+              </a:xfrm>
+              <a:prstGeom prst="rect">
+                <a:avLst/>
+              </a:prstGeom>
+              <a:noFill/>
+            </p:spPr>
+            <p:style>
+              <a:lnRef idx="2">
+                <a:schemeClr val="accent1">
+                  <a:shade val="50000"/>
+                </a:schemeClr>
+              </a:lnRef>
+              <a:fillRef idx="1">
+                <a:schemeClr val="accent1"/>
+              </a:fillRef>
+              <a:effectRef idx="0">
+                <a:schemeClr val="accent1"/>
+              </a:effectRef>
+              <a:fontRef idx="minor">
+                <a:schemeClr val="lt1"/>
+              </a:fontRef>
+            </p:style>
+            <p:txBody>
+              <a:bodyPr rtlCol="0" anchor="ctr"/>
+              <a:lstStyle/>
+              <a:p>
+                <a:pPr algn="ctr"/>
+                <a:r>
+                  <a:rPr lang="en-US" altLang="ko-KR" sz="1200" dirty="0" smtClean="0">
+                    <a:solidFill>
+                      <a:schemeClr val="tx1"/>
+                    </a:solidFill>
+                  </a:rPr>
+                  <a:t>B`</a:t>
+                </a:r>
+                <a:endParaRPr lang="ko-KR" altLang="en-US" sz="1200" dirty="0">
+                  <a:solidFill>
+                    <a:schemeClr val="tx1"/>
+                  </a:solidFill>
+                </a:endParaRPr>
+              </a:p>
+            </p:txBody>
+          </p:sp>
+          <p:sp>
+            <p:nvSpPr>
+              <p:cNvPr id="47" name="직사각형 46"/>
+              <p:cNvSpPr/>
+              <p:nvPr/>
+            </p:nvSpPr>
+            <p:spPr>
+              <a:xfrm>
+                <a:off x="2521165" y="1120236"/>
+                <a:ext cx="1896455" cy="1682341"/>
+              </a:xfrm>
+              <a:prstGeom prst="rect">
+                <a:avLst/>
+              </a:prstGeom>
+              <a:noFill/>
+            </p:spPr>
+            <p:style>
+              <a:lnRef idx="2">
+                <a:schemeClr val="accent1">
+                  <a:shade val="50000"/>
+                </a:schemeClr>
+              </a:lnRef>
+              <a:fillRef idx="1">
+                <a:schemeClr val="accent1"/>
+              </a:fillRef>
+              <a:effectRef idx="0">
+                <a:schemeClr val="accent1"/>
+              </a:effectRef>
+              <a:fontRef idx="minor">
+                <a:schemeClr val="lt1"/>
+              </a:fontRef>
+            </p:style>
+            <p:txBody>
+              <a:bodyPr rtlCol="0" anchor="ctr"/>
+              <a:lstStyle/>
+              <a:p>
+                <a:pPr algn="ctr"/>
+                <a:endParaRPr lang="ko-KR" altLang="en-US" sz="1200" dirty="0">
+                  <a:solidFill>
+                    <a:schemeClr val="tx1"/>
+                  </a:solidFill>
+                </a:endParaRPr>
+              </a:p>
+            </p:txBody>
+          </p:sp>
+        </p:grpSp>
+        <p:sp>
+          <p:nvSpPr>
+            <p:cNvPr id="44" name="직사각형 43"/>
+            <p:cNvSpPr/>
+            <p:nvPr/>
+          </p:nvSpPr>
+          <p:spPr>
+            <a:xfrm>
+              <a:off x="4883244" y="872832"/>
+              <a:ext cx="1286064" cy="361892"/>
+            </a:xfrm>
+            <a:prstGeom prst="rect">
+              <a:avLst/>
+            </a:prstGeom>
+            <a:noFill/>
+          </p:spPr>
+          <p:style>
+            <a:lnRef idx="2">
+              <a:schemeClr val="accent1">
+                <a:shade val="50000"/>
+              </a:schemeClr>
+            </a:lnRef>
+            <a:fillRef idx="1">
+              <a:schemeClr val="accent1"/>
+            </a:fillRef>
+            <a:effectRef idx="0">
+              <a:schemeClr val="accent1"/>
+            </a:effectRef>
+            <a:fontRef idx="minor">
+              <a:schemeClr val="lt1"/>
+            </a:fontRef>
+          </p:style>
+          <p:txBody>
+            <a:bodyPr rtlCol="0" anchor="ctr"/>
+            <a:lstStyle/>
+            <a:p>
+              <a:pPr algn="ctr"/>
+              <a:r>
+                <a:rPr lang="en-US" altLang="ko-KR" sz="1200" dirty="0" smtClean="0">
+                  <a:solidFill>
+                    <a:schemeClr val="tx1"/>
+                  </a:solidFill>
+                </a:rPr>
+                <a:t>A&amp;B Socket</a:t>
+              </a:r>
+              <a:endParaRPr lang="ko-KR" altLang="en-US" sz="1200" dirty="0">
+                <a:solidFill>
+                  <a:schemeClr val="tx1"/>
+                </a:solidFill>
+              </a:endParaRPr>
+            </a:p>
+          </p:txBody>
+        </p:sp>
+        <p:sp>
+          <p:nvSpPr>
+            <p:cNvPr id="45" name="직사각형 44"/>
+            <p:cNvSpPr/>
+            <p:nvPr/>
+          </p:nvSpPr>
+          <p:spPr>
+            <a:xfrm>
+              <a:off x="4883246" y="1619260"/>
+              <a:ext cx="1270660" cy="362857"/>
+            </a:xfrm>
+            <a:prstGeom prst="rect">
+              <a:avLst/>
+            </a:prstGeom>
+            <a:noFill/>
+          </p:spPr>
+          <p:style>
+            <a:lnRef idx="2">
+              <a:schemeClr val="accent1">
+                <a:shade val="50000"/>
+              </a:schemeClr>
+            </a:lnRef>
+            <a:fillRef idx="1">
+              <a:schemeClr val="accent1"/>
+            </a:fillRef>
+            <a:effectRef idx="0">
+              <a:schemeClr val="accent1"/>
+            </a:effectRef>
+            <a:fontRef idx="minor">
+              <a:schemeClr val="lt1"/>
+            </a:fontRef>
+          </p:style>
+          <p:txBody>
+            <a:bodyPr rtlCol="0" anchor="ctr"/>
+            <a:lstStyle/>
+            <a:p>
+              <a:pPr algn="ctr"/>
+              <a:r>
+                <a:rPr lang="en-US" altLang="ko-KR" sz="1200" dirty="0">
+                  <a:solidFill>
+                    <a:schemeClr val="tx1"/>
+                  </a:solidFill>
+                </a:rPr>
+                <a:t>B</a:t>
+              </a:r>
+              <a:r>
+                <a:rPr lang="en-US" altLang="ko-KR" sz="1200" dirty="0" smtClean="0">
+                  <a:solidFill>
+                    <a:schemeClr val="tx1"/>
+                  </a:solidFill>
+                </a:rPr>
+                <a:t>&amp;C Socket</a:t>
+              </a:r>
+              <a:endParaRPr lang="ko-KR" altLang="en-US" sz="1200" dirty="0">
+                <a:solidFill>
+                  <a:schemeClr val="tx1"/>
+                </a:solidFill>
+              </a:endParaRPr>
+            </a:p>
+          </p:txBody>
+        </p:sp>
+      </p:grpSp>
+      <p:grpSp>
+        <p:nvGrpSpPr>
+          <p:cNvPr id="48" name="그룹 47"/>
+          <p:cNvGrpSpPr/>
+          <p:nvPr/>
+        </p:nvGrpSpPr>
+        <p:grpSpPr>
+          <a:xfrm>
+            <a:off x="4412986" y="4844709"/>
+            <a:ext cx="1318162" cy="764400"/>
+            <a:chOff x="4578893" y="214412"/>
+            <a:chExt cx="1896457" cy="1227088"/>
+          </a:xfrm>
+        </p:grpSpPr>
+        <p:grpSp>
+          <p:nvGrpSpPr>
+            <p:cNvPr id="49" name="그룹 48"/>
+            <p:cNvGrpSpPr/>
+            <p:nvPr/>
+          </p:nvGrpSpPr>
+          <p:grpSpPr>
+            <a:xfrm>
+              <a:off x="4578893" y="214412"/>
+              <a:ext cx="1896457" cy="1227088"/>
+              <a:chOff x="2521163" y="757379"/>
+              <a:chExt cx="1896457" cy="1227088"/>
+            </a:xfrm>
+          </p:grpSpPr>
+          <p:sp>
+            <p:nvSpPr>
+              <p:cNvPr id="51" name="직사각형 50"/>
+              <p:cNvSpPr/>
+              <p:nvPr/>
+            </p:nvSpPr>
+            <p:spPr>
+              <a:xfrm>
+                <a:off x="2521163" y="757379"/>
+                <a:ext cx="1896457" cy="362857"/>
+              </a:xfrm>
+              <a:prstGeom prst="rect">
+                <a:avLst/>
+              </a:prstGeom>
+              <a:noFill/>
+            </p:spPr>
+            <p:style>
+              <a:lnRef idx="2">
+                <a:schemeClr val="accent1">
+                  <a:shade val="50000"/>
+                </a:schemeClr>
+              </a:lnRef>
+              <a:fillRef idx="1">
+                <a:schemeClr val="accent1"/>
+              </a:fillRef>
+              <a:effectRef idx="0">
+                <a:schemeClr val="accent1"/>
+              </a:effectRef>
+              <a:fontRef idx="minor">
+                <a:schemeClr val="lt1"/>
+              </a:fontRef>
+            </p:style>
+            <p:txBody>
+              <a:bodyPr rtlCol="0" anchor="ctr"/>
+              <a:lstStyle/>
+              <a:p>
+                <a:pPr algn="ctr"/>
+                <a:r>
+                  <a:rPr lang="en-US" altLang="ko-KR" sz="1200" dirty="0" smtClean="0">
+                    <a:solidFill>
+                      <a:schemeClr val="tx1"/>
+                    </a:solidFill>
+                  </a:rPr>
+                  <a:t>C</a:t>
+                </a:r>
+                <a:endParaRPr lang="ko-KR" altLang="en-US" sz="1200" dirty="0">
+                  <a:solidFill>
+                    <a:schemeClr val="tx1"/>
+                  </a:solidFill>
+                </a:endParaRPr>
+              </a:p>
+            </p:txBody>
+          </p:sp>
+          <p:sp>
+            <p:nvSpPr>
+              <p:cNvPr id="52" name="직사각형 51"/>
+              <p:cNvSpPr/>
+              <p:nvPr/>
+            </p:nvSpPr>
+            <p:spPr>
+              <a:xfrm>
+                <a:off x="2521164" y="1120237"/>
+                <a:ext cx="1896456" cy="864230"/>
+              </a:xfrm>
+              <a:prstGeom prst="rect">
+                <a:avLst/>
+              </a:prstGeom>
+              <a:noFill/>
+            </p:spPr>
+            <p:style>
+              <a:lnRef idx="2">
+                <a:schemeClr val="accent1">
+                  <a:shade val="50000"/>
+                </a:schemeClr>
+              </a:lnRef>
+              <a:fillRef idx="1">
+                <a:schemeClr val="accent1"/>
+              </a:fillRef>
+              <a:effectRef idx="0">
+                <a:schemeClr val="accent1"/>
+              </a:effectRef>
+              <a:fontRef idx="minor">
+                <a:schemeClr val="lt1"/>
+              </a:fontRef>
+            </p:style>
+            <p:txBody>
+              <a:bodyPr rtlCol="0" anchor="ctr"/>
+              <a:lstStyle/>
+              <a:p>
+                <a:pPr algn="ctr"/>
+                <a:endParaRPr lang="ko-KR" altLang="en-US" sz="1200" dirty="0">
+                  <a:solidFill>
+                    <a:schemeClr val="tx1"/>
+                  </a:solidFill>
+                </a:endParaRPr>
+              </a:p>
+            </p:txBody>
+          </p:sp>
+        </p:grpSp>
+        <p:sp>
+          <p:nvSpPr>
+            <p:cNvPr id="50" name="직사각형 49"/>
+            <p:cNvSpPr/>
+            <p:nvPr/>
+          </p:nvSpPr>
+          <p:spPr>
+            <a:xfrm>
+              <a:off x="4883246" y="778606"/>
+              <a:ext cx="1270660" cy="469392"/>
+            </a:xfrm>
+            <a:prstGeom prst="rect">
+              <a:avLst/>
+            </a:prstGeom>
+            <a:noFill/>
+          </p:spPr>
+          <p:style>
+            <a:lnRef idx="2">
+              <a:schemeClr val="accent1">
+                <a:shade val="50000"/>
+              </a:schemeClr>
+            </a:lnRef>
+            <a:fillRef idx="1">
+              <a:schemeClr val="accent1"/>
+            </a:fillRef>
+            <a:effectRef idx="0">
+              <a:schemeClr val="accent1"/>
+            </a:effectRef>
+            <a:fontRef idx="minor">
+              <a:schemeClr val="lt1"/>
+            </a:fontRef>
+          </p:style>
+          <p:txBody>
+            <a:bodyPr rtlCol="0" anchor="ctr"/>
+            <a:lstStyle/>
+            <a:p>
+              <a:pPr algn="ctr"/>
+              <a:r>
+                <a:rPr lang="en-US" altLang="ko-KR" sz="1200" dirty="0" smtClean="0">
+                  <a:solidFill>
+                    <a:schemeClr val="tx1"/>
+                  </a:solidFill>
+                </a:rPr>
+                <a:t>Client</a:t>
+              </a:r>
+              <a:endParaRPr lang="ko-KR" altLang="en-US" sz="1200" dirty="0">
+                <a:solidFill>
+                  <a:schemeClr val="tx1"/>
+                </a:solidFill>
+              </a:endParaRPr>
+            </a:p>
+          </p:txBody>
+        </p:sp>
+      </p:grpSp>
+      <p:cxnSp>
+        <p:nvCxnSpPr>
+          <p:cNvPr id="65" name="꺾인 연결선 64"/>
+          <p:cNvCxnSpPr>
+            <a:stCxn id="9" idx="1"/>
+            <a:endCxn id="18" idx="0"/>
+          </p:cNvCxnSpPr>
+          <p:nvPr/>
+        </p:nvCxnSpPr>
+        <p:spPr>
+          <a:xfrm rot="10800000" flipV="1">
+            <a:off x="2948101" y="1669455"/>
+            <a:ext cx="2533600" cy="1340926"/>
+          </a:xfrm>
+          <a:prstGeom prst="bentConnector2">
+            <a:avLst/>
+          </a:prstGeom>
+          <a:ln>
+            <a:solidFill>
+              <a:srgbClr val="FF0000"/>
+            </a:solidFill>
+          </a:ln>
+        </p:spPr>
+        <p:style>
+          <a:lnRef idx="1">
+            <a:schemeClr val="accent1"/>
+          </a:lnRef>
+          <a:fillRef idx="0">
+            <a:schemeClr val="accent1"/>
+          </a:fillRef>
+          <a:effectRef idx="0">
+            <a:schemeClr val="accent1"/>
+          </a:effectRef>
+          <a:fontRef idx="minor">
+            <a:schemeClr val="tx1"/>
+          </a:fontRef>
+        </p:style>
+      </p:cxnSp>
+      <p:cxnSp>
+        <p:nvCxnSpPr>
+          <p:cNvPr id="67" name="꺾인 연결선 66"/>
+          <p:cNvCxnSpPr>
+            <a:stCxn id="9" idx="3"/>
+            <a:endCxn id="23" idx="0"/>
+          </p:cNvCxnSpPr>
+          <p:nvPr/>
+        </p:nvCxnSpPr>
+        <p:spPr>
+          <a:xfrm>
+            <a:off x="6799862" y="1669455"/>
+            <a:ext cx="2741727" cy="1341195"/>
+          </a:xfrm>
+          <a:prstGeom prst="bentConnector2">
+            <a:avLst/>
+          </a:prstGeom>
+          <a:ln>
+            <a:solidFill>
+              <a:srgbClr val="FF0000"/>
+            </a:solidFill>
+          </a:ln>
+        </p:spPr>
+        <p:style>
+          <a:lnRef idx="1">
+            <a:schemeClr val="accent1"/>
+          </a:lnRef>
+          <a:fillRef idx="0">
+            <a:schemeClr val="accent1"/>
+          </a:fillRef>
+          <a:effectRef idx="0">
+            <a:schemeClr val="accent1"/>
+          </a:effectRef>
+          <a:fontRef idx="minor">
+            <a:schemeClr val="tx1"/>
+          </a:fontRef>
+        </p:style>
+      </p:cxnSp>
+      <p:cxnSp>
+        <p:nvCxnSpPr>
+          <p:cNvPr id="71" name="직선 연결선 70"/>
+          <p:cNvCxnSpPr>
+            <a:stCxn id="30" idx="2"/>
+            <a:endCxn id="51" idx="0"/>
+          </p:cNvCxnSpPr>
+          <p:nvPr/>
+        </p:nvCxnSpPr>
+        <p:spPr>
+          <a:xfrm flipH="1">
+            <a:off x="5072067" y="4228052"/>
+            <a:ext cx="6992" cy="616657"/>
+          </a:xfrm>
+          <a:prstGeom prst="line">
+            <a:avLst/>
+          </a:prstGeom>
+          <a:ln>
+            <a:solidFill>
+              <a:srgbClr val="FF0000"/>
+            </a:solidFill>
+          </a:ln>
+        </p:spPr>
+        <p:style>
+          <a:lnRef idx="1">
+            <a:schemeClr val="accent1"/>
+          </a:lnRef>
+          <a:fillRef idx="0">
+            <a:schemeClr val="accent1"/>
+          </a:fillRef>
+          <a:effectRef idx="0">
+            <a:schemeClr val="accent1"/>
+          </a:effectRef>
+          <a:fontRef idx="minor">
+            <a:schemeClr val="tx1"/>
+          </a:fontRef>
+        </p:style>
+      </p:cxnSp>
+      <p:cxnSp>
+        <p:nvCxnSpPr>
+          <p:cNvPr id="73" name="직선 연결선 72"/>
+          <p:cNvCxnSpPr>
+            <a:stCxn id="47" idx="2"/>
+            <a:endCxn id="34" idx="0"/>
+          </p:cNvCxnSpPr>
+          <p:nvPr/>
+        </p:nvCxnSpPr>
+        <p:spPr>
+          <a:xfrm flipH="1">
+            <a:off x="7319503" y="4226694"/>
+            <a:ext cx="6992" cy="618015"/>
+          </a:xfrm>
+          <a:prstGeom prst="line">
+            <a:avLst/>
+          </a:prstGeom>
+          <a:ln>
+            <a:solidFill>
+              <a:srgbClr val="FF0000"/>
+            </a:solidFill>
+          </a:ln>
+        </p:spPr>
+        <p:style>
+          <a:lnRef idx="1">
+            <a:schemeClr val="accent1"/>
+          </a:lnRef>
+          <a:fillRef idx="0">
+            <a:schemeClr val="accent1"/>
+          </a:fillRef>
+          <a:effectRef idx="0">
+            <a:schemeClr val="accent1"/>
+          </a:effectRef>
+          <a:fontRef idx="minor">
+            <a:schemeClr val="tx1"/>
+          </a:fontRef>
+        </p:style>
+      </p:cxnSp>
+      <p:cxnSp>
+        <p:nvCxnSpPr>
+          <p:cNvPr id="75" name="꺾인 연결선 74"/>
+          <p:cNvCxnSpPr>
+            <a:stCxn id="19" idx="2"/>
+            <a:endCxn id="52" idx="1"/>
+          </p:cNvCxnSpPr>
+          <p:nvPr/>
+        </p:nvCxnSpPr>
+        <p:spPr>
+          <a:xfrm rot="16200000" flipH="1">
+            <a:off x="2977581" y="3904521"/>
+            <a:ext cx="1405927" cy="1464885"/>
+          </a:xfrm>
+          <a:prstGeom prst="bentConnector2">
+            <a:avLst/>
+          </a:prstGeom>
+          <a:ln>
+            <a:solidFill>
+              <a:srgbClr val="FF0000"/>
+            </a:solidFill>
+          </a:ln>
+        </p:spPr>
+        <p:style>
+          <a:lnRef idx="1">
+            <a:schemeClr val="accent1"/>
+          </a:lnRef>
+          <a:fillRef idx="0">
+            <a:schemeClr val="accent1"/>
+          </a:fillRef>
+          <a:effectRef idx="0">
+            <a:schemeClr val="accent1"/>
+          </a:effectRef>
+          <a:fontRef idx="minor">
+            <a:schemeClr val="tx1"/>
+          </a:fontRef>
+        </p:style>
+      </p:cxnSp>
+      <p:cxnSp>
+        <p:nvCxnSpPr>
+          <p:cNvPr id="77" name="꺾인 연결선 76"/>
+          <p:cNvCxnSpPr>
+            <a:stCxn id="24" idx="2"/>
+            <a:endCxn id="35" idx="3"/>
+          </p:cNvCxnSpPr>
+          <p:nvPr/>
+        </p:nvCxnSpPr>
+        <p:spPr>
+          <a:xfrm rot="5400000">
+            <a:off x="8202567" y="4000905"/>
+            <a:ext cx="1115040" cy="1563006"/>
+          </a:xfrm>
+          <a:prstGeom prst="bentConnector2">
+            <a:avLst/>
+          </a:prstGeom>
+          <a:ln>
+            <a:solidFill>
+              <a:srgbClr val="FF0000"/>
+            </a:solidFill>
+          </a:ln>
+        </p:spPr>
+        <p:style>
+          <a:lnRef idx="1">
+            <a:schemeClr val="accent1"/>
+          </a:lnRef>
+          <a:fillRef idx="0">
+            <a:schemeClr val="accent1"/>
+          </a:fillRef>
+          <a:effectRef idx="0">
+            <a:schemeClr val="accent1"/>
+          </a:effectRef>
+          <a:fontRef idx="minor">
+            <a:schemeClr val="tx1"/>
+          </a:fontRef>
+        </p:style>
+      </p:cxnSp>
+      <p:cxnSp>
+        <p:nvCxnSpPr>
+          <p:cNvPr id="87" name="꺾인 연결선 86"/>
+          <p:cNvCxnSpPr>
+            <a:stCxn id="52" idx="2"/>
+            <a:endCxn id="24" idx="2"/>
+          </p:cNvCxnSpPr>
+          <p:nvPr/>
+        </p:nvCxnSpPr>
+        <p:spPr>
+          <a:xfrm rot="5400000" flipH="1" flipV="1">
+            <a:off x="6614718" y="2682238"/>
+            <a:ext cx="1384221" cy="4469522"/>
+          </a:xfrm>
+          <a:prstGeom prst="bentConnector3">
+            <a:avLst>
+              <a:gd name="adj1" fmla="val -28442"/>
+            </a:avLst>
+          </a:prstGeom>
+          <a:ln>
+            <a:solidFill>
+              <a:srgbClr val="FF0000"/>
+            </a:solidFill>
+          </a:ln>
+        </p:spPr>
+        <p:style>
+          <a:lnRef idx="1">
+            <a:schemeClr val="accent1"/>
+          </a:lnRef>
+          <a:fillRef idx="0">
+            <a:schemeClr val="accent1"/>
+          </a:fillRef>
+          <a:effectRef idx="0">
+            <a:schemeClr val="accent1"/>
+          </a:effectRef>
+          <a:fontRef idx="minor">
+            <a:schemeClr val="tx1"/>
+          </a:fontRef>
+        </p:style>
+      </p:cxnSp>
+      <p:cxnSp>
+        <p:nvCxnSpPr>
+          <p:cNvPr id="89" name="꺾인 연결선 88"/>
+          <p:cNvCxnSpPr>
+            <a:stCxn id="35" idx="2"/>
+            <a:endCxn id="19" idx="2"/>
+          </p:cNvCxnSpPr>
+          <p:nvPr/>
+        </p:nvCxnSpPr>
+        <p:spPr>
+          <a:xfrm rot="5400000" flipH="1">
+            <a:off x="4296249" y="2585854"/>
+            <a:ext cx="1675108" cy="4371402"/>
+          </a:xfrm>
+          <a:prstGeom prst="bentConnector3">
+            <a:avLst>
+              <a:gd name="adj1" fmla="val -13647"/>
+            </a:avLst>
+          </a:prstGeom>
+          <a:ln>
+            <a:solidFill>
+              <a:srgbClr val="FF0000"/>
+            </a:solidFill>
+          </a:ln>
+        </p:spPr>
+        <p:style>
+          <a:lnRef idx="1">
+            <a:schemeClr val="accent1"/>
+          </a:lnRef>
+          <a:fillRef idx="0">
+            <a:schemeClr val="accent1"/>
+          </a:fillRef>
+          <a:effectRef idx="0">
+            <a:schemeClr val="accent1"/>
+          </a:effectRef>
+          <a:fontRef idx="minor">
+            <a:schemeClr val="tx1"/>
+          </a:fontRef>
+        </p:style>
+      </p:cxnSp>
+      <p:cxnSp>
+        <p:nvCxnSpPr>
+          <p:cNvPr id="92" name="꺾인 연결선 91"/>
+          <p:cNvCxnSpPr>
+            <a:stCxn id="29" idx="0"/>
+            <a:endCxn id="9" idx="2"/>
+          </p:cNvCxnSpPr>
+          <p:nvPr/>
+        </p:nvCxnSpPr>
+        <p:spPr>
+          <a:xfrm rot="5400000" flipH="1" flipV="1">
+            <a:off x="5187443" y="2060475"/>
+            <a:ext cx="844955" cy="1061724"/>
+          </a:xfrm>
+          <a:prstGeom prst="bentConnector3">
+            <a:avLst/>
+          </a:prstGeom>
+          <a:ln>
+            <a:solidFill>
+              <a:srgbClr val="FF0000"/>
+            </a:solidFill>
+          </a:ln>
+        </p:spPr>
+        <p:style>
+          <a:lnRef idx="1">
+            <a:schemeClr val="accent1"/>
+          </a:lnRef>
+          <a:fillRef idx="0">
+            <a:schemeClr val="accent1"/>
+          </a:fillRef>
+          <a:effectRef idx="0">
+            <a:schemeClr val="accent1"/>
+          </a:effectRef>
+          <a:fontRef idx="minor">
+            <a:schemeClr val="tx1"/>
+          </a:fontRef>
+        </p:style>
+      </p:cxnSp>
+      <p:cxnSp>
+        <p:nvCxnSpPr>
+          <p:cNvPr id="94" name="꺾인 연결선 93"/>
+          <p:cNvCxnSpPr>
+            <a:stCxn id="46" idx="0"/>
+            <a:endCxn id="9" idx="2"/>
+          </p:cNvCxnSpPr>
+          <p:nvPr/>
+        </p:nvCxnSpPr>
+        <p:spPr>
+          <a:xfrm rot="16200000" flipV="1">
+            <a:off x="6311840" y="1997802"/>
+            <a:ext cx="843597" cy="1185712"/>
+          </a:xfrm>
+          <a:prstGeom prst="bentConnector3">
+            <a:avLst/>
+          </a:prstGeom>
+          <a:ln>
+            <a:solidFill>
+              <a:srgbClr val="FF0000"/>
+            </a:solidFill>
+          </a:ln>
+        </p:spPr>
+        <p:style>
+          <a:lnRef idx="1">
+            <a:schemeClr val="accent1"/>
+          </a:lnRef>
+          <a:fillRef idx="0">
+            <a:schemeClr val="accent1"/>
+          </a:fillRef>
+          <a:effectRef idx="0">
+            <a:schemeClr val="accent1"/>
+          </a:effectRef>
+          <a:fontRef idx="minor">
+            <a:schemeClr val="tx1"/>
+          </a:fontRef>
+        </p:style>
+      </p:cxnSp>
     </p:spTree>
     <p:extLst>
       <p:ext uri="{BB962C8B-B14F-4D97-AF65-F5344CB8AC3E}">
@@ -16757,7 +18232,7 @@
   <a:extraClrSchemeLst/>
   <a:extLst>
     <a:ext uri="{05A4C25C-085E-4340-85A3-A5531E510DB2}">
-      <thm15:themeFamily xmlns="" xmlns:thm15="http://schemas.microsoft.com/office/thememl/2012/main" name="Office Theme" id="{62F939B6-93AF-4DB8-9C6B-D6C7DFDC589F}" vid="{4A3C46E8-61CC-4603-A589-7422A47A8E4A}"/>
+      <thm15:themeFamily xmlns:thm15="http://schemas.microsoft.com/office/thememl/2012/main" name="Office Theme" id="{62F939B6-93AF-4DB8-9C6B-D6C7DFDC589F}" vid="{4A3C46E8-61CC-4603-A589-7422A47A8E4A}"/>
     </a:ext>
   </a:extLst>
 </a:theme>

</xml_diff>